<commit_message>
Nova forma de fazer a amarração entre Items x Brother.
</commit_message>
<xml_diff>
--- a/ButecoCalc/Calculadora de Buteco.pptx
+++ b/ButecoCalc/Calculadora de Buteco.pptx
@@ -7,9 +7,10 @@
   <p:sldIdLst>
     <p:sldId id="256" r:id="rId2"/>
     <p:sldId id="258" r:id="rId3"/>
-    <p:sldId id="259" r:id="rId4"/>
-    <p:sldId id="257" r:id="rId5"/>
-    <p:sldId id="260" r:id="rId6"/>
+    <p:sldId id="261" r:id="rId4"/>
+    <p:sldId id="259" r:id="rId5"/>
+    <p:sldId id="257" r:id="rId6"/>
+    <p:sldId id="260" r:id="rId7"/>
   </p:sldIdLst>
   <p:sldSz cx="9144000" cy="6858000" type="screen4x3"/>
   <p:notesSz cx="6858000" cy="9144000"/>
@@ -293,7 +294,7 @@
             <a:fld id="{1A395A12-FCC0-4B92-B8E6-968BBAC1CEEF}" type="datetimeFigureOut">
               <a:rPr lang="pt-BR" smtClean="0"/>
               <a:pPr/>
-              <a:t>11/07/2013</a:t>
+              <a:t>12/07/2013</a:t>
             </a:fld>
             <a:endParaRPr lang="pt-BR"/>
           </a:p>
@@ -460,7 +461,7 @@
             <a:fld id="{1A395A12-FCC0-4B92-B8E6-968BBAC1CEEF}" type="datetimeFigureOut">
               <a:rPr lang="pt-BR" smtClean="0"/>
               <a:pPr/>
-              <a:t>11/07/2013</a:t>
+              <a:t>12/07/2013</a:t>
             </a:fld>
             <a:endParaRPr lang="pt-BR"/>
           </a:p>
@@ -637,7 +638,7 @@
             <a:fld id="{1A395A12-FCC0-4B92-B8E6-968BBAC1CEEF}" type="datetimeFigureOut">
               <a:rPr lang="pt-BR" smtClean="0"/>
               <a:pPr/>
-              <a:t>11/07/2013</a:t>
+              <a:t>12/07/2013</a:t>
             </a:fld>
             <a:endParaRPr lang="pt-BR"/>
           </a:p>
@@ -804,7 +805,7 @@
             <a:fld id="{1A395A12-FCC0-4B92-B8E6-968BBAC1CEEF}" type="datetimeFigureOut">
               <a:rPr lang="pt-BR" smtClean="0"/>
               <a:pPr/>
-              <a:t>11/07/2013</a:t>
+              <a:t>12/07/2013</a:t>
             </a:fld>
             <a:endParaRPr lang="pt-BR"/>
           </a:p>
@@ -1047,7 +1048,7 @@
             <a:fld id="{1A395A12-FCC0-4B92-B8E6-968BBAC1CEEF}" type="datetimeFigureOut">
               <a:rPr lang="pt-BR" smtClean="0"/>
               <a:pPr/>
-              <a:t>11/07/2013</a:t>
+              <a:t>12/07/2013</a:t>
             </a:fld>
             <a:endParaRPr lang="pt-BR"/>
           </a:p>
@@ -1332,7 +1333,7 @@
             <a:fld id="{1A395A12-FCC0-4B92-B8E6-968BBAC1CEEF}" type="datetimeFigureOut">
               <a:rPr lang="pt-BR" smtClean="0"/>
               <a:pPr/>
-              <a:t>11/07/2013</a:t>
+              <a:t>12/07/2013</a:t>
             </a:fld>
             <a:endParaRPr lang="pt-BR"/>
           </a:p>
@@ -1751,7 +1752,7 @@
             <a:fld id="{1A395A12-FCC0-4B92-B8E6-968BBAC1CEEF}" type="datetimeFigureOut">
               <a:rPr lang="pt-BR" smtClean="0"/>
               <a:pPr/>
-              <a:t>11/07/2013</a:t>
+              <a:t>12/07/2013</a:t>
             </a:fld>
             <a:endParaRPr lang="pt-BR"/>
           </a:p>
@@ -1866,7 +1867,7 @@
             <a:fld id="{1A395A12-FCC0-4B92-B8E6-968BBAC1CEEF}" type="datetimeFigureOut">
               <a:rPr lang="pt-BR" smtClean="0"/>
               <a:pPr/>
-              <a:t>11/07/2013</a:t>
+              <a:t>12/07/2013</a:t>
             </a:fld>
             <a:endParaRPr lang="pt-BR"/>
           </a:p>
@@ -1958,7 +1959,7 @@
             <a:fld id="{1A395A12-FCC0-4B92-B8E6-968BBAC1CEEF}" type="datetimeFigureOut">
               <a:rPr lang="pt-BR" smtClean="0"/>
               <a:pPr/>
-              <a:t>11/07/2013</a:t>
+              <a:t>12/07/2013</a:t>
             </a:fld>
             <a:endParaRPr lang="pt-BR"/>
           </a:p>
@@ -2232,7 +2233,7 @@
             <a:fld id="{1A395A12-FCC0-4B92-B8E6-968BBAC1CEEF}" type="datetimeFigureOut">
               <a:rPr lang="pt-BR" smtClean="0"/>
               <a:pPr/>
-              <a:t>11/07/2013</a:t>
+              <a:t>12/07/2013</a:t>
             </a:fld>
             <a:endParaRPr lang="pt-BR"/>
           </a:p>
@@ -2482,7 +2483,7 @@
             <a:fld id="{1A395A12-FCC0-4B92-B8E6-968BBAC1CEEF}" type="datetimeFigureOut">
               <a:rPr lang="pt-BR" smtClean="0"/>
               <a:pPr/>
-              <a:t>11/07/2013</a:t>
+              <a:t>12/07/2013</a:t>
             </a:fld>
             <a:endParaRPr lang="pt-BR"/>
           </a:p>
@@ -2692,7 +2693,7 @@
             <a:fld id="{1A395A12-FCC0-4B92-B8E6-968BBAC1CEEF}" type="datetimeFigureOut">
               <a:rPr lang="pt-BR" smtClean="0"/>
               <a:pPr/>
-              <a:t>11/07/2013</a:t>
+              <a:t>12/07/2013</a:t>
             </a:fld>
             <a:endParaRPr lang="pt-BR"/>
           </a:p>
@@ -4046,7 +4047,12 @@
             <p:ph idx="1"/>
           </p:nvPr>
         </p:nvSpPr>
-        <p:spPr/>
+        <p:spPr>
+          <a:xfrm>
+            <a:off x="457200" y="1600200"/>
+            <a:ext cx="6203032" cy="4525963"/>
+          </a:xfrm>
+        </p:spPr>
         <p:txBody>
           <a:bodyPr/>
           <a:lstStyle/>
@@ -4112,20 +4118,12 @@
               <a:t>para</a:t>
             </a:r>
             <a:r>
-              <a:rPr lang="en-US" smtClean="0"/>
-              <a:t> </a:t>
-            </a:r>
-            <a:r>
-              <a:rPr lang="en-US" smtClean="0"/>
-              <a:t>somente</a:t>
-            </a:r>
-            <a:r>
               <a:rPr lang="en-US" dirty="0" smtClean="0"/>
               <a:t> </a:t>
             </a:r>
             <a:r>
               <a:rPr lang="en-US" dirty="0" err="1" smtClean="0"/>
-              <a:t>marcar</a:t>
+              <a:t>somente</a:t>
             </a:r>
             <a:r>
               <a:rPr lang="en-US" dirty="0" smtClean="0"/>
@@ -4133,6 +4131,14 @@
             </a:r>
             <a:r>
               <a:rPr lang="en-US" dirty="0" err="1" smtClean="0"/>
+              <a:t>marcar</a:t>
+            </a:r>
+            <a:r>
+              <a:rPr lang="en-US" dirty="0" smtClean="0"/>
+              <a:t> </a:t>
+            </a:r>
+            <a:r>
+              <a:rPr lang="en-US" dirty="0" err="1" smtClean="0"/>
               <a:t>qual</a:t>
             </a:r>
             <a:r>
@@ -4169,15 +4175,15 @@
       </p:sp>
       <p:graphicFrame>
         <p:nvGraphicFramePr>
-          <p:cNvPr id="4" name="Tabela 3"/>
+          <p:cNvPr id="9" name="Tabela 8"/>
           <p:cNvGraphicFramePr>
             <a:graphicFrameLocks noGrp="1"/>
           </p:cNvGraphicFramePr>
           <p:nvPr/>
         </p:nvGraphicFramePr>
         <p:xfrm>
-          <a:off x="395536" y="3803744"/>
-          <a:ext cx="8352928" cy="2595880"/>
+          <a:off x="6588224" y="4807014"/>
+          <a:ext cx="1764196" cy="1737360"/>
         </p:xfrm>
         <a:graphic>
           <a:graphicData uri="http://schemas.openxmlformats.org/drawingml/2006/table">
@@ -4186,868 +4192,781 @@
                 <a:tableStyleId>{5C22544A-7EE6-4342-B048-85BDC9FD1C3A}</a:tableStyleId>
               </a:tblPr>
               <a:tblGrid>
-                <a:gridCol w="1440160"/>
-                <a:gridCol w="792088"/>
-                <a:gridCol w="900100"/>
-                <a:gridCol w="1044116"/>
-                <a:gridCol w="1044116"/>
-                <a:gridCol w="1044116"/>
-                <a:gridCol w="1044116"/>
-                <a:gridCol w="1044116"/>
+                <a:gridCol w="360040"/>
+                <a:gridCol w="1404156"/>
               </a:tblGrid>
-              <a:tr h="370840">
-                <a:tc>
-                  <a:txBody>
-                    <a:bodyPr/>
-                    <a:lstStyle/>
-                    <a:p>
-                      <a:endParaRPr lang="pt-BR" sz="1400" dirty="0"/>
-                    </a:p>
-                  </a:txBody>
-                  <a:tcPr/>
-                </a:tc>
-                <a:tc>
-                  <a:txBody>
-                    <a:bodyPr/>
-                    <a:lstStyle/>
-                    <a:p>
-                      <a:pPr algn="ctr"/>
-                      <a:r>
-                        <a:rPr lang="en-US" sz="1400" dirty="0" err="1" smtClean="0"/>
-                        <a:t>Beto</a:t>
-                      </a:r>
-                      <a:endParaRPr lang="pt-BR" sz="1400" dirty="0"/>
-                    </a:p>
-                  </a:txBody>
-                  <a:tcPr/>
-                </a:tc>
-                <a:tc>
-                  <a:txBody>
-                    <a:bodyPr/>
-                    <a:lstStyle/>
-                    <a:p>
-                      <a:pPr algn="ctr"/>
-                      <a:r>
-                        <a:rPr lang="en-US" sz="1400" dirty="0" err="1" smtClean="0"/>
-                        <a:t>Rara</a:t>
-                      </a:r>
-                      <a:endParaRPr lang="pt-BR" sz="1400" dirty="0"/>
-                    </a:p>
-                  </a:txBody>
-                  <a:tcPr/>
-                </a:tc>
-                <a:tc>
-                  <a:txBody>
-                    <a:bodyPr/>
-                    <a:lstStyle/>
-                    <a:p>
-                      <a:pPr algn="ctr"/>
-                      <a:r>
-                        <a:rPr lang="en-US" sz="1400" dirty="0" err="1" smtClean="0"/>
-                        <a:t>Caca</a:t>
-                      </a:r>
-                      <a:endParaRPr lang="pt-BR" sz="1400" dirty="0"/>
-                    </a:p>
-                  </a:txBody>
-                  <a:tcPr/>
-                </a:tc>
-                <a:tc>
-                  <a:txBody>
-                    <a:bodyPr/>
-                    <a:lstStyle/>
-                    <a:p>
-                      <a:pPr algn="ctr"/>
-                      <a:r>
-                        <a:rPr lang="en-US" sz="1400" dirty="0" smtClean="0"/>
-                        <a:t>Martha</a:t>
-                      </a:r>
-                      <a:endParaRPr lang="pt-BR" sz="1400" dirty="0"/>
-                    </a:p>
-                  </a:txBody>
-                  <a:tcPr/>
-                </a:tc>
-                <a:tc>
-                  <a:txBody>
-                    <a:bodyPr/>
-                    <a:lstStyle/>
-                    <a:p>
-                      <a:pPr algn="ctr"/>
-                      <a:r>
-                        <a:rPr lang="en-US" sz="1400" dirty="0" err="1" smtClean="0"/>
-                        <a:t>Gleina</a:t>
-                      </a:r>
-                      <a:endParaRPr lang="pt-BR" sz="1400" dirty="0"/>
-                    </a:p>
-                  </a:txBody>
-                  <a:tcPr/>
-                </a:tc>
-                <a:tc>
-                  <a:txBody>
-                    <a:bodyPr/>
-                    <a:lstStyle/>
-                    <a:p>
-                      <a:pPr algn="ctr"/>
-                      <a:r>
-                        <a:rPr lang="en-US" sz="1400" dirty="0" err="1" smtClean="0"/>
-                        <a:t>Tati</a:t>
-                      </a:r>
-                      <a:endParaRPr lang="pt-BR" sz="1400" dirty="0"/>
-                    </a:p>
-                  </a:txBody>
-                  <a:tcPr/>
-                </a:tc>
-                <a:tc>
-                  <a:txBody>
-                    <a:bodyPr/>
-                    <a:lstStyle/>
-                    <a:p>
-                      <a:pPr algn="ctr"/>
-                      <a:r>
-                        <a:rPr lang="en-US" sz="1400" dirty="0" err="1" smtClean="0"/>
-                        <a:t>Tio</a:t>
-                      </a:r>
-                      <a:r>
-                        <a:rPr lang="en-US" sz="1400" dirty="0" smtClean="0"/>
-                        <a:t> </a:t>
-                      </a:r>
-                      <a:r>
-                        <a:rPr lang="en-US" sz="1400" dirty="0" err="1" smtClean="0"/>
-                        <a:t>Adilson</a:t>
-                      </a:r>
-                      <a:endParaRPr lang="pt-BR" sz="1400" dirty="0"/>
+              <a:tr h="168019">
+                <a:tc gridSpan="2">
+                  <a:txBody>
+                    <a:bodyPr/>
+                    <a:lstStyle/>
+                    <a:p>
+                      <a:r>
+                        <a:rPr lang="en-US" sz="1200" dirty="0" err="1" smtClean="0"/>
+                        <a:t>Martitha</a:t>
+                      </a:r>
+                      <a:endParaRPr lang="pt-BR" sz="1200" dirty="0"/>
+                    </a:p>
+                  </a:txBody>
+                  <a:tcPr/>
+                </a:tc>
+                <a:tc hMerge="1">
+                  <a:txBody>
+                    <a:bodyPr/>
+                    <a:lstStyle/>
+                    <a:p>
+                      <a:endParaRPr lang="pt-BR" sz="1200" dirty="0"/>
                     </a:p>
                   </a:txBody>
                   <a:tcPr/>
                 </a:tc>
               </a:tr>
-              <a:tr h="370840">
-                <a:tc>
-                  <a:txBody>
-                    <a:bodyPr/>
-                    <a:lstStyle/>
-                    <a:p>
-                      <a:r>
-                        <a:rPr lang="en-US" sz="1400" dirty="0" err="1" smtClean="0"/>
+              <a:tr h="168019">
+                <a:tc>
+                  <a:txBody>
+                    <a:bodyPr/>
+                    <a:lstStyle/>
+                    <a:p>
+                      <a:pPr marL="0" algn="ctr"/>
+                      <a:endParaRPr lang="pt-BR" sz="1000" dirty="0"/>
+                    </a:p>
+                  </a:txBody>
+                  <a:tcPr/>
+                </a:tc>
+                <a:tc>
+                  <a:txBody>
+                    <a:bodyPr/>
+                    <a:lstStyle/>
+                    <a:p>
+                      <a:pPr marL="180000"/>
+                      <a:r>
+                        <a:rPr lang="en-US" sz="1000" dirty="0" err="1" smtClean="0"/>
                         <a:t>Cerveja</a:t>
                       </a:r>
-                      <a:endParaRPr lang="pt-BR" sz="1400" dirty="0"/>
-                    </a:p>
-                  </a:txBody>
-                  <a:tcPr/>
-                </a:tc>
-                <a:tc>
-                  <a:txBody>
-                    <a:bodyPr/>
-                    <a:lstStyle/>
-                    <a:p>
-                      <a:pPr algn="ctr"/>
-                      <a:r>
-                        <a:rPr lang="pt-BR" sz="1800" dirty="0" smtClean="0">
+                      <a:endParaRPr lang="pt-BR" sz="1000" dirty="0"/>
+                    </a:p>
+                  </a:txBody>
+                  <a:tcPr/>
+                </a:tc>
+              </a:tr>
+              <a:tr h="168019">
+                <a:tc>
+                  <a:txBody>
+                    <a:bodyPr/>
+                    <a:lstStyle/>
+                    <a:p>
+                      <a:pPr marL="0" algn="ctr"/>
+                      <a:endParaRPr lang="pt-BR" sz="1000" dirty="0"/>
+                    </a:p>
+                  </a:txBody>
+                  <a:tcPr/>
+                </a:tc>
+                <a:tc>
+                  <a:txBody>
+                    <a:bodyPr/>
+                    <a:lstStyle/>
+                    <a:p>
+                      <a:pPr marL="180000"/>
+                      <a:r>
+                        <a:rPr lang="en-US" sz="1000" dirty="0" err="1" smtClean="0"/>
+                        <a:t>Tropeiro</a:t>
+                      </a:r>
+                      <a:r>
+                        <a:rPr lang="en-US" sz="1000" dirty="0" smtClean="0"/>
+                        <a:t> simples</a:t>
+                      </a:r>
+                      <a:endParaRPr lang="pt-BR" sz="1000" dirty="0"/>
+                    </a:p>
+                  </a:txBody>
+                  <a:tcPr/>
+                </a:tc>
+              </a:tr>
+              <a:tr h="168019">
+                <a:tc>
+                  <a:txBody>
+                    <a:bodyPr/>
+                    <a:lstStyle/>
+                    <a:p>
+                      <a:pPr marL="0" algn="ctr"/>
+                      <a:r>
+                        <a:rPr lang="pt-BR" sz="1000" dirty="0" smtClean="0">
                           <a:latin typeface="OpenSymbol"/>
                           <a:ea typeface="OpenSymbol"/>
                         </a:rPr>
                         <a:t>✓</a:t>
                       </a:r>
-                      <a:endParaRPr lang="pt-BR" sz="1800" dirty="0"/>
-                    </a:p>
-                  </a:txBody>
-                  <a:tcPr/>
-                </a:tc>
-                <a:tc>
-                  <a:txBody>
-                    <a:bodyPr/>
-                    <a:lstStyle/>
-                    <a:p>
-                      <a:pPr algn="ctr"/>
-                      <a:r>
-                        <a:rPr lang="pt-BR" sz="1800" dirty="0" smtClean="0">
+                      <a:endParaRPr lang="pt-BR" sz="1000" dirty="0"/>
+                    </a:p>
+                  </a:txBody>
+                  <a:tcPr/>
+                </a:tc>
+                <a:tc>
+                  <a:txBody>
+                    <a:bodyPr/>
+                    <a:lstStyle/>
+                    <a:p>
+                      <a:pPr marL="180000"/>
+                      <a:r>
+                        <a:rPr lang="en-US" sz="1000" dirty="0" err="1" smtClean="0"/>
+                        <a:t>Caipirinha</a:t>
+                      </a:r>
+                      <a:endParaRPr lang="pt-BR" sz="1000" dirty="0"/>
+                    </a:p>
+                  </a:txBody>
+                  <a:tcPr/>
+                </a:tc>
+              </a:tr>
+              <a:tr h="168019">
+                <a:tc>
+                  <a:txBody>
+                    <a:bodyPr/>
+                    <a:lstStyle/>
+                    <a:p>
+                      <a:pPr marL="0" algn="ctr"/>
+                      <a:r>
+                        <a:rPr lang="pt-BR" sz="1000" dirty="0" smtClean="0">
                           <a:latin typeface="OpenSymbol"/>
                           <a:ea typeface="OpenSymbol"/>
                         </a:rPr>
                         <a:t>✓</a:t>
                       </a:r>
-                      <a:endParaRPr lang="pt-BR" sz="1800" dirty="0"/>
-                    </a:p>
-                  </a:txBody>
-                  <a:tcPr/>
-                </a:tc>
-                <a:tc>
-                  <a:txBody>
-                    <a:bodyPr/>
-                    <a:lstStyle/>
-                    <a:p>
-                      <a:pPr algn="ctr"/>
-                      <a:r>
-                        <a:rPr lang="pt-BR" sz="1800" dirty="0" smtClean="0">
+                      <a:endParaRPr lang="pt-BR" sz="1000" dirty="0"/>
+                    </a:p>
+                  </a:txBody>
+                  <a:tcPr/>
+                </a:tc>
+                <a:tc>
+                  <a:txBody>
+                    <a:bodyPr/>
+                    <a:lstStyle/>
+                    <a:p>
+                      <a:pPr marL="180000"/>
+                      <a:r>
+                        <a:rPr lang="en-US" sz="1000" dirty="0" err="1" smtClean="0"/>
+                        <a:t>Batatas</a:t>
+                      </a:r>
+                      <a:endParaRPr lang="pt-BR" sz="1000" dirty="0"/>
+                    </a:p>
+                  </a:txBody>
+                  <a:tcPr/>
+                </a:tc>
+              </a:tr>
+              <a:tr h="168019">
+                <a:tc>
+                  <a:txBody>
+                    <a:bodyPr/>
+                    <a:lstStyle/>
+                    <a:p>
+                      <a:pPr marL="0" algn="ctr"/>
+                      <a:endParaRPr lang="pt-BR" sz="1000" dirty="0"/>
+                    </a:p>
+                  </a:txBody>
+                  <a:tcPr/>
+                </a:tc>
+                <a:tc>
+                  <a:txBody>
+                    <a:bodyPr/>
+                    <a:lstStyle/>
+                    <a:p>
+                      <a:pPr marL="180000"/>
+                      <a:r>
+                        <a:rPr lang="en-US" sz="1000" dirty="0" err="1" smtClean="0"/>
+                        <a:t>Chopp</a:t>
+                      </a:r>
+                      <a:endParaRPr lang="pt-BR" sz="1000" dirty="0"/>
+                    </a:p>
+                  </a:txBody>
+                  <a:tcPr/>
+                </a:tc>
+              </a:tr>
+              <a:tr h="168019">
+                <a:tc>
+                  <a:txBody>
+                    <a:bodyPr/>
+                    <a:lstStyle/>
+                    <a:p>
+                      <a:pPr marL="0" algn="ctr"/>
+                      <a:r>
+                        <a:rPr lang="pt-BR" sz="1000" dirty="0" smtClean="0">
                           <a:latin typeface="OpenSymbol"/>
                           <a:ea typeface="OpenSymbol"/>
                         </a:rPr>
                         <a:t>✓</a:t>
                       </a:r>
-                      <a:endParaRPr lang="pt-BR" sz="1800" dirty="0"/>
-                    </a:p>
-                  </a:txBody>
-                  <a:tcPr/>
-                </a:tc>
-                <a:tc>
-                  <a:txBody>
-                    <a:bodyPr/>
-                    <a:lstStyle/>
-                    <a:p>
-                      <a:pPr algn="ctr"/>
-                      <a:endParaRPr lang="pt-BR" sz="1800"/>
-                    </a:p>
-                  </a:txBody>
-                  <a:tcPr/>
-                </a:tc>
-                <a:tc>
-                  <a:txBody>
-                    <a:bodyPr/>
-                    <a:lstStyle/>
-                    <a:p>
-                      <a:pPr algn="ctr"/>
-                      <a:endParaRPr lang="pt-BR" sz="1800"/>
-                    </a:p>
-                  </a:txBody>
-                  <a:tcPr/>
-                </a:tc>
-                <a:tc>
-                  <a:txBody>
-                    <a:bodyPr/>
-                    <a:lstStyle/>
-                    <a:p>
-                      <a:pPr algn="ctr"/>
-                      <a:endParaRPr lang="pt-BR" sz="1800"/>
-                    </a:p>
-                  </a:txBody>
-                  <a:tcPr/>
-                </a:tc>
-                <a:tc>
-                  <a:txBody>
-                    <a:bodyPr/>
-                    <a:lstStyle/>
-                    <a:p>
-                      <a:pPr algn="ctr"/>
-                      <a:r>
-                        <a:rPr lang="pt-BR" sz="1800" dirty="0" smtClean="0">
+                      <a:endParaRPr lang="pt-BR" sz="1000" dirty="0"/>
+                    </a:p>
+                  </a:txBody>
+                  <a:tcPr/>
+                </a:tc>
+                <a:tc>
+                  <a:txBody>
+                    <a:bodyPr/>
+                    <a:lstStyle/>
+                    <a:p>
+                      <a:pPr marL="180000"/>
+                      <a:r>
+                        <a:rPr lang="en-US" sz="1000" dirty="0" err="1" smtClean="0"/>
+                        <a:t>Água</a:t>
+                      </a:r>
+                      <a:endParaRPr lang="pt-BR" sz="1000" dirty="0"/>
+                    </a:p>
+                  </a:txBody>
+                  <a:tcPr/>
+                </a:tc>
+              </a:tr>
+            </a:tbl>
+          </a:graphicData>
+        </a:graphic>
+      </p:graphicFrame>
+      <p:cxnSp>
+        <p:nvCxnSpPr>
+          <p:cNvPr id="11" name="Conector reto 10"/>
+          <p:cNvCxnSpPr/>
+          <p:nvPr/>
+        </p:nvCxnSpPr>
+        <p:spPr>
+          <a:xfrm>
+            <a:off x="8460432" y="1340768"/>
+            <a:ext cx="0" cy="5184576"/>
+          </a:xfrm>
+          <a:prstGeom prst="line">
+            <a:avLst/>
+          </a:prstGeom>
+          <a:ln w="69850">
+            <a:solidFill>
+              <a:schemeClr val="bg1">
+                <a:lumMod val="75000"/>
+              </a:schemeClr>
+            </a:solidFill>
+          </a:ln>
+        </p:spPr>
+        <p:style>
+          <a:lnRef idx="1">
+            <a:schemeClr val="accent1"/>
+          </a:lnRef>
+          <a:fillRef idx="0">
+            <a:schemeClr val="accent1"/>
+          </a:fillRef>
+          <a:effectRef idx="0">
+            <a:schemeClr val="accent1"/>
+          </a:effectRef>
+          <a:fontRef idx="minor">
+            <a:schemeClr val="tx1"/>
+          </a:fontRef>
+        </p:style>
+      </p:cxnSp>
+      <p:cxnSp>
+        <p:nvCxnSpPr>
+          <p:cNvPr id="12" name="Conector reto 11"/>
+          <p:cNvCxnSpPr/>
+          <p:nvPr/>
+        </p:nvCxnSpPr>
+        <p:spPr>
+          <a:xfrm>
+            <a:off x="8460432" y="1988840"/>
+            <a:ext cx="0" cy="648072"/>
+          </a:xfrm>
+          <a:prstGeom prst="line">
+            <a:avLst/>
+          </a:prstGeom>
+          <a:ln w="69850">
+            <a:solidFill>
+              <a:schemeClr val="tx1">
+                <a:lumMod val="75000"/>
+                <a:lumOff val="25000"/>
+              </a:schemeClr>
+            </a:solidFill>
+          </a:ln>
+        </p:spPr>
+        <p:style>
+          <a:lnRef idx="1">
+            <a:schemeClr val="accent1"/>
+          </a:lnRef>
+          <a:fillRef idx="0">
+            <a:schemeClr val="accent1"/>
+          </a:fillRef>
+          <a:effectRef idx="0">
+            <a:schemeClr val="accent1"/>
+          </a:effectRef>
+          <a:fontRef idx="minor">
+            <a:schemeClr val="tx1"/>
+          </a:fontRef>
+        </p:style>
+      </p:cxnSp>
+      <p:graphicFrame>
+        <p:nvGraphicFramePr>
+          <p:cNvPr id="15" name="Tabela 14"/>
+          <p:cNvGraphicFramePr>
+            <a:graphicFrameLocks noGrp="1"/>
+          </p:cNvGraphicFramePr>
+          <p:nvPr/>
+        </p:nvGraphicFramePr>
+        <p:xfrm>
+          <a:off x="6588224" y="3068960"/>
+          <a:ext cx="1764196" cy="1737360"/>
+        </p:xfrm>
+        <a:graphic>
+          <a:graphicData uri="http://schemas.openxmlformats.org/drawingml/2006/table">
+            <a:tbl>
+              <a:tblPr firstRow="1" bandRow="1">
+                <a:tableStyleId>{5C22544A-7EE6-4342-B048-85BDC9FD1C3A}</a:tableStyleId>
+              </a:tblPr>
+              <a:tblGrid>
+                <a:gridCol w="360040"/>
+                <a:gridCol w="1404156"/>
+              </a:tblGrid>
+              <a:tr h="168019">
+                <a:tc gridSpan="2">
+                  <a:txBody>
+                    <a:bodyPr/>
+                    <a:lstStyle/>
+                    <a:p>
+                      <a:r>
+                        <a:rPr lang="en-US" sz="1200" dirty="0" err="1" smtClean="0"/>
+                        <a:t>Rara</a:t>
+                      </a:r>
+                      <a:endParaRPr lang="pt-BR" sz="1200" dirty="0"/>
+                    </a:p>
+                  </a:txBody>
+                  <a:tcPr/>
+                </a:tc>
+                <a:tc hMerge="1">
+                  <a:txBody>
+                    <a:bodyPr/>
+                    <a:lstStyle/>
+                    <a:p>
+                      <a:endParaRPr lang="pt-BR" sz="1200" dirty="0"/>
+                    </a:p>
+                  </a:txBody>
+                  <a:tcPr/>
+                </a:tc>
+              </a:tr>
+              <a:tr h="168019">
+                <a:tc>
+                  <a:txBody>
+                    <a:bodyPr/>
+                    <a:lstStyle/>
+                    <a:p>
+                      <a:pPr marL="0" algn="ctr"/>
+                      <a:r>
+                        <a:rPr lang="pt-BR" sz="1000" dirty="0" smtClean="0">
                           <a:latin typeface="OpenSymbol"/>
                           <a:ea typeface="OpenSymbol"/>
                         </a:rPr>
                         <a:t>✓</a:t>
                       </a:r>
-                      <a:endParaRPr lang="pt-BR" sz="1800" dirty="0"/>
+                      <a:endParaRPr lang="pt-BR" sz="1000" dirty="0"/>
+                    </a:p>
+                  </a:txBody>
+                  <a:tcPr/>
+                </a:tc>
+                <a:tc>
+                  <a:txBody>
+                    <a:bodyPr/>
+                    <a:lstStyle/>
+                    <a:p>
+                      <a:pPr marL="180000"/>
+                      <a:r>
+                        <a:rPr lang="en-US" sz="1000" dirty="0" err="1" smtClean="0"/>
+                        <a:t>Cerveja</a:t>
+                      </a:r>
+                      <a:endParaRPr lang="pt-BR" sz="1000" dirty="0"/>
                     </a:p>
                   </a:txBody>
                   <a:tcPr/>
                 </a:tc>
               </a:tr>
-              <a:tr h="370840">
-                <a:tc>
-                  <a:txBody>
-                    <a:bodyPr/>
-                    <a:lstStyle/>
-                    <a:p>
-                      <a:r>
-                        <a:rPr lang="en-US" sz="1400" dirty="0" err="1" smtClean="0"/>
-                        <a:t>Tropeiro</a:t>
-                      </a:r>
-                      <a:r>
-                        <a:rPr lang="en-US" sz="1400" dirty="0" smtClean="0"/>
-                        <a:t> simples</a:t>
-                      </a:r>
-                      <a:endParaRPr lang="pt-BR" sz="1400" dirty="0"/>
-                    </a:p>
-                  </a:txBody>
-                  <a:tcPr/>
-                </a:tc>
-                <a:tc>
-                  <a:txBody>
-                    <a:bodyPr/>
-                    <a:lstStyle/>
-                    <a:p>
-                      <a:pPr marL="0" marR="0" indent="0" algn="ctr" defTabSz="914400" rtl="0" eaLnBrk="1" fontAlgn="auto" latinLnBrk="0" hangingPunct="1">
-                        <a:lnSpc>
-                          <a:spcPct val="100000"/>
-                        </a:lnSpc>
-                        <a:spcBef>
-                          <a:spcPts val="0"/>
-                        </a:spcBef>
-                        <a:spcAft>
-                          <a:spcPts val="0"/>
-                        </a:spcAft>
-                        <a:buClrTx/>
-                        <a:buSzTx/>
-                        <a:buFontTx/>
-                        <a:buNone/>
-                        <a:tabLst/>
-                        <a:defRPr/>
-                      </a:pPr>
-                      <a:r>
-                        <a:rPr lang="pt-BR" sz="1800" dirty="0" smtClean="0">
+              <a:tr h="168019">
+                <a:tc>
+                  <a:txBody>
+                    <a:bodyPr/>
+                    <a:lstStyle/>
+                    <a:p>
+                      <a:pPr marL="0" algn="ctr"/>
+                      <a:r>
+                        <a:rPr lang="pt-BR" sz="1000" dirty="0" smtClean="0">
                           <a:latin typeface="OpenSymbol"/>
                           <a:ea typeface="OpenSymbol"/>
                         </a:rPr>
                         <a:t>✓</a:t>
                       </a:r>
-                      <a:endParaRPr lang="pt-BR" sz="1800" dirty="0" smtClean="0"/>
-                    </a:p>
-                  </a:txBody>
-                  <a:tcPr/>
-                </a:tc>
-                <a:tc>
-                  <a:txBody>
-                    <a:bodyPr/>
-                    <a:lstStyle/>
-                    <a:p>
-                      <a:pPr marL="0" marR="0" indent="0" algn="ctr" defTabSz="914400" rtl="0" eaLnBrk="1" fontAlgn="auto" latinLnBrk="0" hangingPunct="1">
-                        <a:lnSpc>
-                          <a:spcPct val="100000"/>
-                        </a:lnSpc>
-                        <a:spcBef>
-                          <a:spcPts val="0"/>
-                        </a:spcBef>
-                        <a:spcAft>
-                          <a:spcPts val="0"/>
-                        </a:spcAft>
-                        <a:buClrTx/>
-                        <a:buSzTx/>
-                        <a:buFontTx/>
-                        <a:buNone/>
-                        <a:tabLst/>
-                        <a:defRPr/>
-                      </a:pPr>
-                      <a:r>
-                        <a:rPr lang="pt-BR" sz="1800" dirty="0" smtClean="0">
+                      <a:endParaRPr lang="pt-BR" sz="1000" dirty="0"/>
+                    </a:p>
+                  </a:txBody>
+                  <a:tcPr/>
+                </a:tc>
+                <a:tc>
+                  <a:txBody>
+                    <a:bodyPr/>
+                    <a:lstStyle/>
+                    <a:p>
+                      <a:pPr marL="180000"/>
+                      <a:r>
+                        <a:rPr lang="en-US" sz="1000" dirty="0" err="1" smtClean="0"/>
+                        <a:t>Tropeiro</a:t>
+                      </a:r>
+                      <a:r>
+                        <a:rPr lang="en-US" sz="1000" dirty="0" smtClean="0"/>
+                        <a:t> simples</a:t>
+                      </a:r>
+                      <a:endParaRPr lang="pt-BR" sz="1000" dirty="0"/>
+                    </a:p>
+                  </a:txBody>
+                  <a:tcPr/>
+                </a:tc>
+              </a:tr>
+              <a:tr h="168019">
+                <a:tc>
+                  <a:txBody>
+                    <a:bodyPr/>
+                    <a:lstStyle/>
+                    <a:p>
+                      <a:pPr marL="0" algn="ctr"/>
+                      <a:endParaRPr lang="pt-BR" sz="1000" dirty="0"/>
+                    </a:p>
+                  </a:txBody>
+                  <a:tcPr/>
+                </a:tc>
+                <a:tc>
+                  <a:txBody>
+                    <a:bodyPr/>
+                    <a:lstStyle/>
+                    <a:p>
+                      <a:pPr marL="180000"/>
+                      <a:r>
+                        <a:rPr lang="en-US" sz="1000" dirty="0" err="1" smtClean="0"/>
+                        <a:t>Caipirinha</a:t>
+                      </a:r>
+                      <a:endParaRPr lang="pt-BR" sz="1000" dirty="0"/>
+                    </a:p>
+                  </a:txBody>
+                  <a:tcPr/>
+                </a:tc>
+              </a:tr>
+              <a:tr h="168019">
+                <a:tc>
+                  <a:txBody>
+                    <a:bodyPr/>
+                    <a:lstStyle/>
+                    <a:p>
+                      <a:pPr marL="0" algn="ctr"/>
+                      <a:r>
+                        <a:rPr lang="pt-BR" sz="1000" dirty="0" smtClean="0">
                           <a:latin typeface="OpenSymbol"/>
                           <a:ea typeface="OpenSymbol"/>
                         </a:rPr>
                         <a:t>✓</a:t>
                       </a:r>
-                      <a:endParaRPr lang="pt-BR" sz="1800" dirty="0" smtClean="0"/>
-                    </a:p>
-                  </a:txBody>
-                  <a:tcPr/>
-                </a:tc>
-                <a:tc>
-                  <a:txBody>
-                    <a:bodyPr/>
-                    <a:lstStyle/>
-                    <a:p>
-                      <a:pPr algn="ctr"/>
-                      <a:endParaRPr lang="pt-BR" sz="1800" dirty="0"/>
-                    </a:p>
-                  </a:txBody>
-                  <a:tcPr/>
-                </a:tc>
-                <a:tc>
-                  <a:txBody>
-                    <a:bodyPr/>
-                    <a:lstStyle/>
-                    <a:p>
-                      <a:pPr marL="0" marR="0" indent="0" algn="ctr" defTabSz="914400" rtl="0" eaLnBrk="1" fontAlgn="auto" latinLnBrk="0" hangingPunct="1">
-                        <a:lnSpc>
-                          <a:spcPct val="100000"/>
-                        </a:lnSpc>
-                        <a:spcBef>
-                          <a:spcPts val="0"/>
-                        </a:spcBef>
-                        <a:spcAft>
-                          <a:spcPts val="0"/>
-                        </a:spcAft>
-                        <a:buClrTx/>
-                        <a:buSzTx/>
-                        <a:buFontTx/>
-                        <a:buNone/>
-                        <a:tabLst/>
-                        <a:defRPr/>
-                      </a:pPr>
-                      <a:r>
-                        <a:rPr lang="pt-BR" sz="1800" dirty="0" smtClean="0">
+                      <a:endParaRPr lang="pt-BR" sz="1000" dirty="0"/>
+                    </a:p>
+                  </a:txBody>
+                  <a:tcPr/>
+                </a:tc>
+                <a:tc>
+                  <a:txBody>
+                    <a:bodyPr/>
+                    <a:lstStyle/>
+                    <a:p>
+                      <a:pPr marL="180000"/>
+                      <a:r>
+                        <a:rPr lang="en-US" sz="1000" dirty="0" err="1" smtClean="0"/>
+                        <a:t>Batatas</a:t>
+                      </a:r>
+                      <a:endParaRPr lang="pt-BR" sz="1000" dirty="0"/>
+                    </a:p>
+                  </a:txBody>
+                  <a:tcPr/>
+                </a:tc>
+              </a:tr>
+              <a:tr h="168019">
+                <a:tc>
+                  <a:txBody>
+                    <a:bodyPr/>
+                    <a:lstStyle/>
+                    <a:p>
+                      <a:pPr marL="0" algn="ctr"/>
+                      <a:endParaRPr lang="pt-BR" sz="1000" dirty="0"/>
+                    </a:p>
+                  </a:txBody>
+                  <a:tcPr/>
+                </a:tc>
+                <a:tc>
+                  <a:txBody>
+                    <a:bodyPr/>
+                    <a:lstStyle/>
+                    <a:p>
+                      <a:pPr marL="180000"/>
+                      <a:r>
+                        <a:rPr lang="en-US" sz="1000" dirty="0" err="1" smtClean="0"/>
+                        <a:t>Chopp</a:t>
+                      </a:r>
+                      <a:endParaRPr lang="pt-BR" sz="1000" dirty="0"/>
+                    </a:p>
+                  </a:txBody>
+                  <a:tcPr/>
+                </a:tc>
+              </a:tr>
+              <a:tr h="168019">
+                <a:tc>
+                  <a:txBody>
+                    <a:bodyPr/>
+                    <a:lstStyle/>
+                    <a:p>
+                      <a:pPr marL="0" algn="ctr"/>
+                      <a:endParaRPr lang="pt-BR" sz="1000" dirty="0"/>
+                    </a:p>
+                  </a:txBody>
+                  <a:tcPr/>
+                </a:tc>
+                <a:tc>
+                  <a:txBody>
+                    <a:bodyPr/>
+                    <a:lstStyle/>
+                    <a:p>
+                      <a:pPr marL="180000"/>
+                      <a:r>
+                        <a:rPr lang="en-US" sz="1000" dirty="0" err="1" smtClean="0"/>
+                        <a:t>Água</a:t>
+                      </a:r>
+                      <a:endParaRPr lang="pt-BR" sz="1000" dirty="0"/>
+                    </a:p>
+                  </a:txBody>
+                  <a:tcPr/>
+                </a:tc>
+              </a:tr>
+            </a:tbl>
+          </a:graphicData>
+        </a:graphic>
+      </p:graphicFrame>
+      <p:graphicFrame>
+        <p:nvGraphicFramePr>
+          <p:cNvPr id="16" name="Tabela 15"/>
+          <p:cNvGraphicFramePr>
+            <a:graphicFrameLocks noGrp="1"/>
+          </p:cNvGraphicFramePr>
+          <p:nvPr/>
+        </p:nvGraphicFramePr>
+        <p:xfrm>
+          <a:off x="6588224" y="1332584"/>
+          <a:ext cx="1764196" cy="1737360"/>
+        </p:xfrm>
+        <a:graphic>
+          <a:graphicData uri="http://schemas.openxmlformats.org/drawingml/2006/table">
+            <a:tbl>
+              <a:tblPr firstRow="1" bandRow="1">
+                <a:tableStyleId>{5C22544A-7EE6-4342-B048-85BDC9FD1C3A}</a:tableStyleId>
+              </a:tblPr>
+              <a:tblGrid>
+                <a:gridCol w="360040"/>
+                <a:gridCol w="1404156"/>
+              </a:tblGrid>
+              <a:tr h="168019">
+                <a:tc gridSpan="2">
+                  <a:txBody>
+                    <a:bodyPr/>
+                    <a:lstStyle/>
+                    <a:p>
+                      <a:r>
+                        <a:rPr lang="en-US" sz="1200" dirty="0" err="1" smtClean="0"/>
+                        <a:t>Beto</a:t>
+                      </a:r>
+                      <a:endParaRPr lang="pt-BR" sz="1200" dirty="0"/>
+                    </a:p>
+                  </a:txBody>
+                  <a:tcPr/>
+                </a:tc>
+                <a:tc hMerge="1">
+                  <a:txBody>
+                    <a:bodyPr/>
+                    <a:lstStyle/>
+                    <a:p>
+                      <a:endParaRPr lang="pt-BR" sz="1200" dirty="0"/>
+                    </a:p>
+                  </a:txBody>
+                  <a:tcPr/>
+                </a:tc>
+              </a:tr>
+              <a:tr h="168019">
+                <a:tc>
+                  <a:txBody>
+                    <a:bodyPr/>
+                    <a:lstStyle/>
+                    <a:p>
+                      <a:pPr marL="0" algn="ctr"/>
+                      <a:r>
+                        <a:rPr lang="pt-BR" sz="1000" dirty="0" smtClean="0">
                           <a:latin typeface="OpenSymbol"/>
                           <a:ea typeface="OpenSymbol"/>
                         </a:rPr>
                         <a:t>✓</a:t>
                       </a:r>
-                      <a:endParaRPr lang="pt-BR" sz="1800" dirty="0" smtClean="0"/>
-                    </a:p>
-                  </a:txBody>
-                  <a:tcPr/>
-                </a:tc>
-                <a:tc>
-                  <a:txBody>
-                    <a:bodyPr/>
-                    <a:lstStyle/>
-                    <a:p>
-                      <a:pPr algn="ctr"/>
-                      <a:endParaRPr lang="pt-BR" sz="1800"/>
-                    </a:p>
-                  </a:txBody>
-                  <a:tcPr/>
-                </a:tc>
-                <a:tc>
-                  <a:txBody>
-                    <a:bodyPr/>
-                    <a:lstStyle/>
-                    <a:p>
-                      <a:pPr marL="0" marR="0" indent="0" algn="ctr" defTabSz="914400" rtl="0" eaLnBrk="1" fontAlgn="auto" latinLnBrk="0" hangingPunct="1">
-                        <a:lnSpc>
-                          <a:spcPct val="100000"/>
-                        </a:lnSpc>
-                        <a:spcBef>
-                          <a:spcPts val="0"/>
-                        </a:spcBef>
-                        <a:spcAft>
-                          <a:spcPts val="0"/>
-                        </a:spcAft>
-                        <a:buClrTx/>
-                        <a:buSzTx/>
-                        <a:buFontTx/>
-                        <a:buNone/>
-                        <a:tabLst/>
-                        <a:defRPr/>
-                      </a:pPr>
-                      <a:r>
-                        <a:rPr lang="pt-BR" sz="1800" dirty="0" smtClean="0">
+                      <a:endParaRPr lang="pt-BR" sz="1000" dirty="0"/>
+                    </a:p>
+                  </a:txBody>
+                  <a:tcPr/>
+                </a:tc>
+                <a:tc>
+                  <a:txBody>
+                    <a:bodyPr/>
+                    <a:lstStyle/>
+                    <a:p>
+                      <a:pPr marL="180000"/>
+                      <a:r>
+                        <a:rPr lang="en-US" sz="1000" dirty="0" err="1" smtClean="0"/>
+                        <a:t>Cerveja</a:t>
+                      </a:r>
+                      <a:endParaRPr lang="pt-BR" sz="1000" dirty="0"/>
+                    </a:p>
+                  </a:txBody>
+                  <a:tcPr/>
+                </a:tc>
+              </a:tr>
+              <a:tr h="168019">
+                <a:tc>
+                  <a:txBody>
+                    <a:bodyPr/>
+                    <a:lstStyle/>
+                    <a:p>
+                      <a:pPr marL="0" algn="ctr"/>
+                      <a:r>
+                        <a:rPr lang="pt-BR" sz="1000" dirty="0" smtClean="0">
                           <a:latin typeface="OpenSymbol"/>
                           <a:ea typeface="OpenSymbol"/>
                         </a:rPr>
                         <a:t>✓</a:t>
                       </a:r>
-                      <a:endParaRPr lang="pt-BR" sz="1800" dirty="0" smtClean="0"/>
-                    </a:p>
-                  </a:txBody>
-                  <a:tcPr/>
-                </a:tc>
-                <a:tc>
-                  <a:txBody>
-                    <a:bodyPr/>
-                    <a:lstStyle/>
-                    <a:p>
-                      <a:pPr algn="ctr"/>
-                      <a:endParaRPr lang="pt-BR" sz="1800"/>
+                      <a:endParaRPr lang="pt-BR" sz="1000" dirty="0"/>
+                    </a:p>
+                  </a:txBody>
+                  <a:tcPr/>
+                </a:tc>
+                <a:tc>
+                  <a:txBody>
+                    <a:bodyPr/>
+                    <a:lstStyle/>
+                    <a:p>
+                      <a:pPr marL="180000"/>
+                      <a:r>
+                        <a:rPr lang="en-US" sz="1000" dirty="0" err="1" smtClean="0"/>
+                        <a:t>Tropeiro</a:t>
+                      </a:r>
+                      <a:r>
+                        <a:rPr lang="en-US" sz="1000" dirty="0" smtClean="0"/>
+                        <a:t> simples</a:t>
+                      </a:r>
+                      <a:endParaRPr lang="pt-BR" sz="1000" dirty="0"/>
                     </a:p>
                   </a:txBody>
                   <a:tcPr/>
                 </a:tc>
               </a:tr>
-              <a:tr h="370840">
-                <a:tc>
-                  <a:txBody>
-                    <a:bodyPr/>
-                    <a:lstStyle/>
-                    <a:p>
-                      <a:r>
-                        <a:rPr lang="en-US" sz="1400" dirty="0" err="1" smtClean="0"/>
+              <a:tr h="168019">
+                <a:tc>
+                  <a:txBody>
+                    <a:bodyPr/>
+                    <a:lstStyle/>
+                    <a:p>
+                      <a:pPr marL="0" algn="ctr"/>
+                      <a:endParaRPr lang="pt-BR" sz="1000" dirty="0"/>
+                    </a:p>
+                  </a:txBody>
+                  <a:tcPr/>
+                </a:tc>
+                <a:tc>
+                  <a:txBody>
+                    <a:bodyPr/>
+                    <a:lstStyle/>
+                    <a:p>
+                      <a:pPr marL="180000"/>
+                      <a:r>
+                        <a:rPr lang="en-US" sz="1000" dirty="0" err="1" smtClean="0"/>
                         <a:t>Caipirinha</a:t>
                       </a:r>
-                      <a:endParaRPr lang="pt-BR" sz="1400" dirty="0"/>
-                    </a:p>
-                  </a:txBody>
-                  <a:tcPr/>
-                </a:tc>
-                <a:tc>
-                  <a:txBody>
-                    <a:bodyPr/>
-                    <a:lstStyle/>
-                    <a:p>
-                      <a:pPr algn="ctr"/>
-                      <a:endParaRPr lang="pt-BR" sz="1800"/>
-                    </a:p>
-                  </a:txBody>
-                  <a:tcPr/>
-                </a:tc>
-                <a:tc>
-                  <a:txBody>
-                    <a:bodyPr/>
-                    <a:lstStyle/>
-                    <a:p>
-                      <a:pPr algn="ctr"/>
-                      <a:endParaRPr lang="pt-BR" sz="1800" dirty="0"/>
-                    </a:p>
-                  </a:txBody>
-                  <a:tcPr/>
-                </a:tc>
-                <a:tc>
-                  <a:txBody>
-                    <a:bodyPr/>
-                    <a:lstStyle/>
-                    <a:p>
-                      <a:pPr algn="ctr"/>
-                      <a:endParaRPr lang="pt-BR" sz="1800" dirty="0"/>
-                    </a:p>
-                  </a:txBody>
-                  <a:tcPr/>
-                </a:tc>
-                <a:tc>
-                  <a:txBody>
-                    <a:bodyPr/>
-                    <a:lstStyle/>
-                    <a:p>
-                      <a:pPr algn="ctr"/>
-                      <a:r>
-                        <a:rPr lang="pt-BR" sz="1800" dirty="0" smtClean="0">
-                          <a:latin typeface="OpenSymbol"/>
-                          <a:ea typeface="OpenSymbol"/>
-                        </a:rPr>
-                        <a:t>✓</a:t>
-                      </a:r>
-                      <a:endParaRPr lang="pt-BR" sz="1800" dirty="0"/>
-                    </a:p>
-                  </a:txBody>
-                  <a:tcPr/>
-                </a:tc>
-                <a:tc>
-                  <a:txBody>
-                    <a:bodyPr/>
-                    <a:lstStyle/>
-                    <a:p>
-                      <a:pPr algn="ctr"/>
-                      <a:endParaRPr lang="pt-BR" sz="1800" dirty="0"/>
-                    </a:p>
-                  </a:txBody>
-                  <a:tcPr/>
-                </a:tc>
-                <a:tc>
-                  <a:txBody>
-                    <a:bodyPr/>
-                    <a:lstStyle/>
-                    <a:p>
-                      <a:pPr algn="ctr"/>
-                      <a:endParaRPr lang="pt-BR" sz="1800"/>
-                    </a:p>
-                  </a:txBody>
-                  <a:tcPr/>
-                </a:tc>
-                <a:tc>
-                  <a:txBody>
-                    <a:bodyPr/>
-                    <a:lstStyle/>
-                    <a:p>
-                      <a:pPr algn="ctr"/>
-                      <a:endParaRPr lang="pt-BR" sz="1800"/>
+                      <a:endParaRPr lang="pt-BR" sz="1000" dirty="0"/>
                     </a:p>
                   </a:txBody>
                   <a:tcPr/>
                 </a:tc>
               </a:tr>
-              <a:tr h="370840">
-                <a:tc>
-                  <a:txBody>
-                    <a:bodyPr/>
-                    <a:lstStyle/>
-                    <a:p>
-                      <a:r>
-                        <a:rPr lang="en-US" sz="1400" dirty="0" err="1" smtClean="0"/>
+              <a:tr h="168019">
+                <a:tc>
+                  <a:txBody>
+                    <a:bodyPr/>
+                    <a:lstStyle/>
+                    <a:p>
+                      <a:pPr marL="0" algn="ctr"/>
+                      <a:endParaRPr lang="pt-BR" sz="1000" dirty="0"/>
+                    </a:p>
+                  </a:txBody>
+                  <a:tcPr/>
+                </a:tc>
+                <a:tc>
+                  <a:txBody>
+                    <a:bodyPr/>
+                    <a:lstStyle/>
+                    <a:p>
+                      <a:pPr marL="180000"/>
+                      <a:r>
+                        <a:rPr lang="en-US" sz="1000" dirty="0" err="1" smtClean="0"/>
                         <a:t>Batatas</a:t>
                       </a:r>
-                      <a:endParaRPr lang="pt-BR" sz="1400" dirty="0"/>
-                    </a:p>
-                  </a:txBody>
-                  <a:tcPr/>
-                </a:tc>
-                <a:tc>
-                  <a:txBody>
-                    <a:bodyPr/>
-                    <a:lstStyle/>
-                    <a:p>
-                      <a:pPr algn="ctr"/>
-                      <a:endParaRPr lang="pt-BR" sz="1800"/>
-                    </a:p>
-                  </a:txBody>
-                  <a:tcPr/>
-                </a:tc>
-                <a:tc>
-                  <a:txBody>
-                    <a:bodyPr/>
-                    <a:lstStyle/>
-                    <a:p>
-                      <a:pPr algn="ctr"/>
-                      <a:endParaRPr lang="pt-BR" sz="1800"/>
-                    </a:p>
-                  </a:txBody>
-                  <a:tcPr/>
-                </a:tc>
-                <a:tc>
-                  <a:txBody>
-                    <a:bodyPr/>
-                    <a:lstStyle/>
-                    <a:p>
-                      <a:pPr algn="ctr"/>
-                      <a:r>
-                        <a:rPr lang="pt-BR" sz="1800" dirty="0" smtClean="0">
-                          <a:latin typeface="OpenSymbol"/>
-                          <a:ea typeface="OpenSymbol"/>
-                        </a:rPr>
-                        <a:t>✓</a:t>
-                      </a:r>
-                      <a:endParaRPr lang="pt-BR" sz="1800" dirty="0"/>
-                    </a:p>
-                  </a:txBody>
-                  <a:tcPr/>
-                </a:tc>
-                <a:tc>
-                  <a:txBody>
-                    <a:bodyPr/>
-                    <a:lstStyle/>
-                    <a:p>
-                      <a:pPr algn="ctr"/>
-                      <a:endParaRPr lang="pt-BR" sz="1800" dirty="0"/>
-                    </a:p>
-                  </a:txBody>
-                  <a:tcPr/>
-                </a:tc>
-                <a:tc>
-                  <a:txBody>
-                    <a:bodyPr/>
-                    <a:lstStyle/>
-                    <a:p>
-                      <a:pPr algn="ctr"/>
-                      <a:r>
-                        <a:rPr lang="pt-BR" sz="1800" dirty="0" smtClean="0">
-                          <a:latin typeface="OpenSymbol"/>
-                          <a:ea typeface="OpenSymbol"/>
-                        </a:rPr>
-                        <a:t>✓</a:t>
-                      </a:r>
-                      <a:endParaRPr lang="pt-BR" sz="1800" dirty="0"/>
-                    </a:p>
-                  </a:txBody>
-                  <a:tcPr/>
-                </a:tc>
-                <a:tc>
-                  <a:txBody>
-                    <a:bodyPr/>
-                    <a:lstStyle/>
-                    <a:p>
-                      <a:pPr algn="ctr"/>
-                      <a:endParaRPr lang="pt-BR" sz="1800" dirty="0"/>
-                    </a:p>
-                  </a:txBody>
-                  <a:tcPr/>
-                </a:tc>
-                <a:tc>
-                  <a:txBody>
-                    <a:bodyPr/>
-                    <a:lstStyle/>
-                    <a:p>
-                      <a:pPr algn="ctr"/>
-                      <a:endParaRPr lang="pt-BR" sz="1800" dirty="0"/>
+                      <a:endParaRPr lang="pt-BR" sz="1000" dirty="0"/>
                     </a:p>
                   </a:txBody>
                   <a:tcPr/>
                 </a:tc>
               </a:tr>
-              <a:tr h="370840">
-                <a:tc>
-                  <a:txBody>
-                    <a:bodyPr/>
-                    <a:lstStyle/>
-                    <a:p>
-                      <a:r>
-                        <a:rPr lang="en-US" sz="1400" dirty="0" err="1" smtClean="0"/>
+              <a:tr h="168019">
+                <a:tc>
+                  <a:txBody>
+                    <a:bodyPr/>
+                    <a:lstStyle/>
+                    <a:p>
+                      <a:pPr marL="0" algn="ctr"/>
+                      <a:endParaRPr lang="pt-BR" sz="1000" dirty="0"/>
+                    </a:p>
+                  </a:txBody>
+                  <a:tcPr/>
+                </a:tc>
+                <a:tc>
+                  <a:txBody>
+                    <a:bodyPr/>
+                    <a:lstStyle/>
+                    <a:p>
+                      <a:pPr marL="180000"/>
+                      <a:r>
+                        <a:rPr lang="en-US" sz="1000" dirty="0" err="1" smtClean="0"/>
                         <a:t>Chopp</a:t>
                       </a:r>
-                      <a:endParaRPr lang="pt-BR" sz="1400" dirty="0"/>
-                    </a:p>
-                  </a:txBody>
-                  <a:tcPr/>
-                </a:tc>
-                <a:tc>
-                  <a:txBody>
-                    <a:bodyPr/>
-                    <a:lstStyle/>
-                    <a:p>
-                      <a:pPr algn="ctr"/>
-                      <a:endParaRPr lang="pt-BR" sz="1800"/>
-                    </a:p>
-                  </a:txBody>
-                  <a:tcPr/>
-                </a:tc>
-                <a:tc>
-                  <a:txBody>
-                    <a:bodyPr/>
-                    <a:lstStyle/>
-                    <a:p>
-                      <a:pPr algn="ctr"/>
-                      <a:endParaRPr lang="pt-BR" sz="1800"/>
-                    </a:p>
-                  </a:txBody>
-                  <a:tcPr/>
-                </a:tc>
-                <a:tc>
-                  <a:txBody>
-                    <a:bodyPr/>
-                    <a:lstStyle/>
-                    <a:p>
-                      <a:pPr algn="ctr"/>
-                      <a:endParaRPr lang="pt-BR" sz="1800"/>
-                    </a:p>
-                  </a:txBody>
-                  <a:tcPr/>
-                </a:tc>
-                <a:tc>
-                  <a:txBody>
-                    <a:bodyPr/>
-                    <a:lstStyle/>
-                    <a:p>
-                      <a:pPr algn="ctr"/>
-                      <a:endParaRPr lang="pt-BR" sz="1800"/>
-                    </a:p>
-                  </a:txBody>
-                  <a:tcPr/>
-                </a:tc>
-                <a:tc>
-                  <a:txBody>
-                    <a:bodyPr/>
-                    <a:lstStyle/>
-                    <a:p>
-                      <a:pPr algn="ctr"/>
-                      <a:r>
-                        <a:rPr lang="pt-BR" sz="1800" dirty="0" smtClean="0">
-                          <a:latin typeface="OpenSymbol"/>
-                          <a:ea typeface="OpenSymbol"/>
-                        </a:rPr>
-                        <a:t>✓</a:t>
-                      </a:r>
-                      <a:endParaRPr lang="pt-BR" sz="1800" dirty="0"/>
-                    </a:p>
-                  </a:txBody>
-                  <a:tcPr/>
-                </a:tc>
-                <a:tc>
-                  <a:txBody>
-                    <a:bodyPr/>
-                    <a:lstStyle/>
-                    <a:p>
-                      <a:pPr algn="ctr"/>
-                      <a:endParaRPr lang="pt-BR" sz="1800" dirty="0"/>
-                    </a:p>
-                  </a:txBody>
-                  <a:tcPr/>
-                </a:tc>
-                <a:tc>
-                  <a:txBody>
-                    <a:bodyPr/>
-                    <a:lstStyle/>
-                    <a:p>
-                      <a:pPr algn="ctr"/>
-                      <a:endParaRPr lang="pt-BR" sz="1800" dirty="0"/>
+                      <a:endParaRPr lang="pt-BR" sz="1000" dirty="0"/>
                     </a:p>
                   </a:txBody>
                   <a:tcPr/>
                 </a:tc>
               </a:tr>
-              <a:tr h="370840">
-                <a:tc>
-                  <a:txBody>
-                    <a:bodyPr/>
-                    <a:lstStyle/>
-                    <a:p>
-                      <a:r>
-                        <a:rPr lang="en-US" sz="1400" dirty="0" smtClean="0"/>
-                        <a:t>Agua</a:t>
-                      </a:r>
-                      <a:endParaRPr lang="pt-BR" sz="1400" dirty="0"/>
-                    </a:p>
-                  </a:txBody>
-                  <a:tcPr/>
-                </a:tc>
-                <a:tc>
-                  <a:txBody>
-                    <a:bodyPr/>
-                    <a:lstStyle/>
-                    <a:p>
-                      <a:pPr algn="ctr"/>
-                      <a:endParaRPr lang="pt-BR" sz="1800"/>
-                    </a:p>
-                  </a:txBody>
-                  <a:tcPr/>
-                </a:tc>
-                <a:tc>
-                  <a:txBody>
-                    <a:bodyPr/>
-                    <a:lstStyle/>
-                    <a:p>
-                      <a:pPr algn="ctr"/>
-                      <a:endParaRPr lang="pt-BR" sz="1800"/>
-                    </a:p>
-                  </a:txBody>
-                  <a:tcPr/>
-                </a:tc>
-                <a:tc>
-                  <a:txBody>
-                    <a:bodyPr/>
-                    <a:lstStyle/>
-                    <a:p>
-                      <a:pPr algn="ctr"/>
-                      <a:endParaRPr lang="pt-BR" sz="1800"/>
-                    </a:p>
-                  </a:txBody>
-                  <a:tcPr/>
-                </a:tc>
-                <a:tc>
-                  <a:txBody>
-                    <a:bodyPr/>
-                    <a:lstStyle/>
-                    <a:p>
-                      <a:pPr algn="ctr"/>
-                      <a:endParaRPr lang="pt-BR" sz="1800"/>
-                    </a:p>
-                  </a:txBody>
-                  <a:tcPr/>
-                </a:tc>
-                <a:tc>
-                  <a:txBody>
-                    <a:bodyPr/>
-                    <a:lstStyle/>
-                    <a:p>
-                      <a:pPr algn="ctr"/>
-                      <a:endParaRPr lang="pt-BR" sz="1800" dirty="0"/>
-                    </a:p>
-                  </a:txBody>
-                  <a:tcPr/>
-                </a:tc>
-                <a:tc>
-                  <a:txBody>
-                    <a:bodyPr/>
-                    <a:lstStyle/>
-                    <a:p>
-                      <a:pPr marL="0" marR="0" indent="0" algn="ctr" defTabSz="914400" rtl="0" eaLnBrk="1" fontAlgn="auto" latinLnBrk="0" hangingPunct="1">
-                        <a:lnSpc>
-                          <a:spcPct val="100000"/>
-                        </a:lnSpc>
-                        <a:spcBef>
-                          <a:spcPts val="0"/>
-                        </a:spcBef>
-                        <a:spcAft>
-                          <a:spcPts val="0"/>
-                        </a:spcAft>
-                        <a:buClrTx/>
-                        <a:buSzTx/>
-                        <a:buFontTx/>
-                        <a:buNone/>
-                        <a:tabLst/>
-                        <a:defRPr/>
-                      </a:pPr>
-                      <a:r>
-                        <a:rPr lang="pt-BR" sz="1800" dirty="0" smtClean="0">
-                          <a:latin typeface="OpenSymbol"/>
-                          <a:ea typeface="OpenSymbol"/>
-                        </a:rPr>
-                        <a:t>✓</a:t>
-                      </a:r>
-                      <a:endParaRPr lang="pt-BR" sz="1800" dirty="0" smtClean="0"/>
-                    </a:p>
-                  </a:txBody>
-                  <a:tcPr/>
-                </a:tc>
-                <a:tc>
-                  <a:txBody>
-                    <a:bodyPr/>
-                    <a:lstStyle/>
-                    <a:p>
-                      <a:pPr algn="ctr"/>
-                      <a:endParaRPr lang="pt-BR" sz="1800" dirty="0"/>
+              <a:tr h="168019">
+                <a:tc>
+                  <a:txBody>
+                    <a:bodyPr/>
+                    <a:lstStyle/>
+                    <a:p>
+                      <a:pPr marL="0" algn="ctr"/>
+                      <a:endParaRPr lang="pt-BR" sz="1000" dirty="0"/>
+                    </a:p>
+                  </a:txBody>
+                  <a:tcPr/>
+                </a:tc>
+                <a:tc>
+                  <a:txBody>
+                    <a:bodyPr/>
+                    <a:lstStyle/>
+                    <a:p>
+                      <a:pPr marL="180000"/>
+                      <a:r>
+                        <a:rPr lang="en-US" sz="1000" dirty="0" err="1" smtClean="0"/>
+                        <a:t>Água</a:t>
+                      </a:r>
+                      <a:endParaRPr lang="pt-BR" sz="1000" dirty="0"/>
                     </a:p>
                   </a:txBody>
                   <a:tcPr/>
@@ -5106,6 +5025,1477 @@
           <a:p>
             <a:r>
               <a:rPr lang="en-US" dirty="0" err="1" smtClean="0"/>
+              <a:t>Tarefas</a:t>
+            </a:r>
+            <a:r>
+              <a:rPr lang="en-US" dirty="0" smtClean="0"/>
+              <a:t> - </a:t>
+            </a:r>
+            <a:r>
+              <a:rPr lang="en-US" dirty="0" err="1" smtClean="0"/>
+              <a:t>ItemPerBuddyActivity</a:t>
+            </a:r>
+            <a:endParaRPr lang="pt-BR" dirty="0"/>
+          </a:p>
+        </p:txBody>
+      </p:sp>
+      <p:sp>
+        <p:nvSpPr>
+          <p:cNvPr id="3" name="Espaço Reservado para Conteúdo 2"/>
+          <p:cNvSpPr>
+            <a:spLocks noGrp="1"/>
+          </p:cNvSpPr>
+          <p:nvPr>
+            <p:ph idx="1"/>
+          </p:nvPr>
+        </p:nvSpPr>
+        <p:spPr/>
+        <p:txBody>
+          <a:bodyPr/>
+          <a:lstStyle/>
+          <a:p>
+            <a:r>
+              <a:rPr lang="en-US" dirty="0" err="1" smtClean="0"/>
+              <a:t>Adicionar</a:t>
+            </a:r>
+            <a:r>
+              <a:rPr lang="en-US" dirty="0" smtClean="0"/>
+              <a:t> </a:t>
+            </a:r>
+            <a:r>
+              <a:rPr lang="en-US" dirty="0" err="1" smtClean="0"/>
+              <a:t>uma</a:t>
+            </a:r>
+            <a:r>
+              <a:rPr lang="en-US" dirty="0" smtClean="0"/>
+              <a:t> </a:t>
+            </a:r>
+            <a:r>
+              <a:rPr lang="en-US" dirty="0" err="1" smtClean="0"/>
+              <a:t>lista</a:t>
+            </a:r>
+            <a:r>
+              <a:rPr lang="en-US" dirty="0" smtClean="0"/>
+              <a:t> com </a:t>
+            </a:r>
+            <a:r>
+              <a:rPr lang="en-US" i="1" dirty="0" smtClean="0"/>
+              <a:t>checkbox</a:t>
+            </a:r>
+            <a:r>
+              <a:rPr lang="en-US" dirty="0" smtClean="0"/>
+              <a:t> </a:t>
+            </a:r>
+            <a:r>
+              <a:rPr lang="en-US" dirty="0" err="1" smtClean="0"/>
+              <a:t>em</a:t>
+            </a:r>
+            <a:r>
+              <a:rPr lang="en-US" dirty="0" smtClean="0"/>
+              <a:t> forma de matrix: item x </a:t>
+            </a:r>
+            <a:r>
+              <a:rPr lang="en-US" dirty="0" err="1" smtClean="0"/>
+              <a:t>camarada</a:t>
+            </a:r>
+            <a:endParaRPr lang="en-US" dirty="0" smtClean="0"/>
+          </a:p>
+          <a:p>
+            <a:pPr lvl="1"/>
+            <a:r>
+              <a:rPr lang="en-US" dirty="0" err="1" smtClean="0"/>
+              <a:t>Servirá</a:t>
+            </a:r>
+            <a:r>
+              <a:rPr lang="en-US" dirty="0" smtClean="0"/>
+              <a:t> </a:t>
+            </a:r>
+            <a:r>
+              <a:rPr lang="en-US" dirty="0" err="1" smtClean="0"/>
+              <a:t>para</a:t>
+            </a:r>
+            <a:r>
+              <a:rPr lang="en-US" smtClean="0"/>
+              <a:t> somente</a:t>
+            </a:r>
+            <a:r>
+              <a:rPr lang="en-US" dirty="0" smtClean="0"/>
+              <a:t> </a:t>
+            </a:r>
+            <a:r>
+              <a:rPr lang="en-US" dirty="0" err="1" smtClean="0"/>
+              <a:t>marcar</a:t>
+            </a:r>
+            <a:r>
+              <a:rPr lang="en-US" dirty="0" smtClean="0"/>
+              <a:t> </a:t>
+            </a:r>
+            <a:r>
+              <a:rPr lang="en-US" dirty="0" err="1" smtClean="0"/>
+              <a:t>qual</a:t>
+            </a:r>
+            <a:r>
+              <a:rPr lang="en-US" dirty="0" smtClean="0"/>
+              <a:t> item </a:t>
+            </a:r>
+            <a:r>
+              <a:rPr lang="en-US" dirty="0" err="1" smtClean="0"/>
+              <a:t>foi</a:t>
+            </a:r>
+            <a:r>
+              <a:rPr lang="en-US" dirty="0" smtClean="0"/>
+              <a:t> </a:t>
+            </a:r>
+            <a:r>
+              <a:rPr lang="en-US" dirty="0" err="1" smtClean="0"/>
+              <a:t>consumido</a:t>
+            </a:r>
+            <a:r>
+              <a:rPr lang="en-US" dirty="0" smtClean="0"/>
+              <a:t> </a:t>
+            </a:r>
+            <a:r>
+              <a:rPr lang="en-US" dirty="0" err="1" smtClean="0"/>
+              <a:t>pelos</a:t>
+            </a:r>
+            <a:r>
+              <a:rPr lang="en-US" dirty="0" smtClean="0"/>
+              <a:t> brothers</a:t>
+            </a:r>
+            <a:endParaRPr lang="pt-BR" dirty="0"/>
+          </a:p>
+        </p:txBody>
+      </p:sp>
+      <p:graphicFrame>
+        <p:nvGraphicFramePr>
+          <p:cNvPr id="4" name="Tabela 3"/>
+          <p:cNvGraphicFramePr>
+            <a:graphicFrameLocks noGrp="1"/>
+          </p:cNvGraphicFramePr>
+          <p:nvPr/>
+        </p:nvGraphicFramePr>
+        <p:xfrm>
+          <a:off x="395536" y="3803744"/>
+          <a:ext cx="8352928" cy="2595880"/>
+        </p:xfrm>
+        <a:graphic>
+          <a:graphicData uri="http://schemas.openxmlformats.org/drawingml/2006/table">
+            <a:tbl>
+              <a:tblPr firstRow="1" bandRow="1">
+                <a:tableStyleId>{5C22544A-7EE6-4342-B048-85BDC9FD1C3A}</a:tableStyleId>
+              </a:tblPr>
+              <a:tblGrid>
+                <a:gridCol w="1440160"/>
+                <a:gridCol w="792088"/>
+                <a:gridCol w="900100"/>
+                <a:gridCol w="1044116"/>
+                <a:gridCol w="1044116"/>
+                <a:gridCol w="1044116"/>
+                <a:gridCol w="1044116"/>
+                <a:gridCol w="1044116"/>
+              </a:tblGrid>
+              <a:tr h="370840">
+                <a:tc>
+                  <a:txBody>
+                    <a:bodyPr/>
+                    <a:lstStyle/>
+                    <a:p>
+                      <a:endParaRPr lang="pt-BR" sz="1400" dirty="0"/>
+                    </a:p>
+                  </a:txBody>
+                  <a:tcPr/>
+                </a:tc>
+                <a:tc>
+                  <a:txBody>
+                    <a:bodyPr/>
+                    <a:lstStyle/>
+                    <a:p>
+                      <a:pPr algn="ctr"/>
+                      <a:r>
+                        <a:rPr lang="en-US" sz="1400" dirty="0" err="1" smtClean="0"/>
+                        <a:t>Beto</a:t>
+                      </a:r>
+                      <a:endParaRPr lang="pt-BR" sz="1400" dirty="0"/>
+                    </a:p>
+                  </a:txBody>
+                  <a:tcPr/>
+                </a:tc>
+                <a:tc>
+                  <a:txBody>
+                    <a:bodyPr/>
+                    <a:lstStyle/>
+                    <a:p>
+                      <a:pPr algn="ctr"/>
+                      <a:r>
+                        <a:rPr lang="en-US" sz="1400" dirty="0" err="1" smtClean="0"/>
+                        <a:t>Rara</a:t>
+                      </a:r>
+                      <a:endParaRPr lang="pt-BR" sz="1400" dirty="0"/>
+                    </a:p>
+                  </a:txBody>
+                  <a:tcPr/>
+                </a:tc>
+                <a:tc>
+                  <a:txBody>
+                    <a:bodyPr/>
+                    <a:lstStyle/>
+                    <a:p>
+                      <a:pPr algn="ctr"/>
+                      <a:r>
+                        <a:rPr lang="en-US" sz="1400" dirty="0" err="1" smtClean="0"/>
+                        <a:t>Caca</a:t>
+                      </a:r>
+                      <a:endParaRPr lang="pt-BR" sz="1400" dirty="0"/>
+                    </a:p>
+                  </a:txBody>
+                  <a:tcPr/>
+                </a:tc>
+                <a:tc>
+                  <a:txBody>
+                    <a:bodyPr/>
+                    <a:lstStyle/>
+                    <a:p>
+                      <a:pPr algn="ctr"/>
+                      <a:r>
+                        <a:rPr lang="en-US" sz="1400" dirty="0" smtClean="0"/>
+                        <a:t>Martha</a:t>
+                      </a:r>
+                      <a:endParaRPr lang="pt-BR" sz="1400" dirty="0"/>
+                    </a:p>
+                  </a:txBody>
+                  <a:tcPr/>
+                </a:tc>
+                <a:tc>
+                  <a:txBody>
+                    <a:bodyPr/>
+                    <a:lstStyle/>
+                    <a:p>
+                      <a:pPr algn="ctr"/>
+                      <a:r>
+                        <a:rPr lang="en-US" sz="1400" dirty="0" err="1" smtClean="0"/>
+                        <a:t>Gleina</a:t>
+                      </a:r>
+                      <a:endParaRPr lang="pt-BR" sz="1400" dirty="0"/>
+                    </a:p>
+                  </a:txBody>
+                  <a:tcPr/>
+                </a:tc>
+                <a:tc>
+                  <a:txBody>
+                    <a:bodyPr/>
+                    <a:lstStyle/>
+                    <a:p>
+                      <a:pPr algn="ctr"/>
+                      <a:r>
+                        <a:rPr lang="en-US" sz="1400" dirty="0" err="1" smtClean="0"/>
+                        <a:t>Tati</a:t>
+                      </a:r>
+                      <a:endParaRPr lang="pt-BR" sz="1400" dirty="0"/>
+                    </a:p>
+                  </a:txBody>
+                  <a:tcPr/>
+                </a:tc>
+                <a:tc>
+                  <a:txBody>
+                    <a:bodyPr/>
+                    <a:lstStyle/>
+                    <a:p>
+                      <a:pPr algn="ctr"/>
+                      <a:r>
+                        <a:rPr lang="en-US" sz="1400" dirty="0" err="1" smtClean="0"/>
+                        <a:t>Tio</a:t>
+                      </a:r>
+                      <a:r>
+                        <a:rPr lang="en-US" sz="1400" dirty="0" smtClean="0"/>
+                        <a:t> </a:t>
+                      </a:r>
+                      <a:r>
+                        <a:rPr lang="en-US" sz="1400" dirty="0" err="1" smtClean="0"/>
+                        <a:t>Adilson</a:t>
+                      </a:r>
+                      <a:endParaRPr lang="pt-BR" sz="1400" dirty="0"/>
+                    </a:p>
+                  </a:txBody>
+                  <a:tcPr/>
+                </a:tc>
+              </a:tr>
+              <a:tr h="370840">
+                <a:tc>
+                  <a:txBody>
+                    <a:bodyPr/>
+                    <a:lstStyle/>
+                    <a:p>
+                      <a:r>
+                        <a:rPr lang="en-US" sz="1400" dirty="0" err="1" smtClean="0"/>
+                        <a:t>Cerveja</a:t>
+                      </a:r>
+                      <a:endParaRPr lang="pt-BR" sz="1400" dirty="0"/>
+                    </a:p>
+                  </a:txBody>
+                  <a:tcPr/>
+                </a:tc>
+                <a:tc>
+                  <a:txBody>
+                    <a:bodyPr/>
+                    <a:lstStyle/>
+                    <a:p>
+                      <a:pPr algn="ctr"/>
+                      <a:r>
+                        <a:rPr lang="pt-BR" sz="1800" dirty="0" smtClean="0">
+                          <a:latin typeface="OpenSymbol"/>
+                          <a:ea typeface="OpenSymbol"/>
+                        </a:rPr>
+                        <a:t>✓</a:t>
+                      </a:r>
+                      <a:endParaRPr lang="pt-BR" sz="1800" dirty="0"/>
+                    </a:p>
+                  </a:txBody>
+                  <a:tcPr/>
+                </a:tc>
+                <a:tc>
+                  <a:txBody>
+                    <a:bodyPr/>
+                    <a:lstStyle/>
+                    <a:p>
+                      <a:pPr algn="ctr"/>
+                      <a:r>
+                        <a:rPr lang="pt-BR" sz="1800" dirty="0" smtClean="0">
+                          <a:latin typeface="OpenSymbol"/>
+                          <a:ea typeface="OpenSymbol"/>
+                        </a:rPr>
+                        <a:t>✓</a:t>
+                      </a:r>
+                      <a:endParaRPr lang="pt-BR" sz="1800" dirty="0"/>
+                    </a:p>
+                  </a:txBody>
+                  <a:tcPr/>
+                </a:tc>
+                <a:tc>
+                  <a:txBody>
+                    <a:bodyPr/>
+                    <a:lstStyle/>
+                    <a:p>
+                      <a:pPr algn="ctr"/>
+                      <a:r>
+                        <a:rPr lang="pt-BR" sz="1800" dirty="0" smtClean="0">
+                          <a:latin typeface="OpenSymbol"/>
+                          <a:ea typeface="OpenSymbol"/>
+                        </a:rPr>
+                        <a:t>✓</a:t>
+                      </a:r>
+                      <a:endParaRPr lang="pt-BR" sz="1800" dirty="0"/>
+                    </a:p>
+                  </a:txBody>
+                  <a:tcPr/>
+                </a:tc>
+                <a:tc>
+                  <a:txBody>
+                    <a:bodyPr/>
+                    <a:lstStyle/>
+                    <a:p>
+                      <a:pPr algn="ctr"/>
+                      <a:endParaRPr lang="pt-BR" sz="1800"/>
+                    </a:p>
+                  </a:txBody>
+                  <a:tcPr/>
+                </a:tc>
+                <a:tc>
+                  <a:txBody>
+                    <a:bodyPr/>
+                    <a:lstStyle/>
+                    <a:p>
+                      <a:pPr algn="ctr"/>
+                      <a:endParaRPr lang="pt-BR" sz="1800"/>
+                    </a:p>
+                  </a:txBody>
+                  <a:tcPr/>
+                </a:tc>
+                <a:tc>
+                  <a:txBody>
+                    <a:bodyPr/>
+                    <a:lstStyle/>
+                    <a:p>
+                      <a:pPr algn="ctr"/>
+                      <a:endParaRPr lang="pt-BR" sz="1800"/>
+                    </a:p>
+                  </a:txBody>
+                  <a:tcPr/>
+                </a:tc>
+                <a:tc>
+                  <a:txBody>
+                    <a:bodyPr/>
+                    <a:lstStyle/>
+                    <a:p>
+                      <a:pPr algn="ctr"/>
+                      <a:r>
+                        <a:rPr lang="pt-BR" sz="1800" dirty="0" smtClean="0">
+                          <a:latin typeface="OpenSymbol"/>
+                          <a:ea typeface="OpenSymbol"/>
+                        </a:rPr>
+                        <a:t>✓</a:t>
+                      </a:r>
+                      <a:endParaRPr lang="pt-BR" sz="1800" dirty="0"/>
+                    </a:p>
+                  </a:txBody>
+                  <a:tcPr/>
+                </a:tc>
+              </a:tr>
+              <a:tr h="370840">
+                <a:tc>
+                  <a:txBody>
+                    <a:bodyPr/>
+                    <a:lstStyle/>
+                    <a:p>
+                      <a:r>
+                        <a:rPr lang="en-US" sz="1400" dirty="0" err="1" smtClean="0"/>
+                        <a:t>Tropeiro</a:t>
+                      </a:r>
+                      <a:r>
+                        <a:rPr lang="en-US" sz="1400" dirty="0" smtClean="0"/>
+                        <a:t> simples</a:t>
+                      </a:r>
+                      <a:endParaRPr lang="pt-BR" sz="1400" dirty="0"/>
+                    </a:p>
+                  </a:txBody>
+                  <a:tcPr/>
+                </a:tc>
+                <a:tc>
+                  <a:txBody>
+                    <a:bodyPr/>
+                    <a:lstStyle/>
+                    <a:p>
+                      <a:pPr marL="0" marR="0" indent="0" algn="ctr" defTabSz="914400" rtl="0" eaLnBrk="1" fontAlgn="auto" latinLnBrk="0" hangingPunct="1">
+                        <a:lnSpc>
+                          <a:spcPct val="100000"/>
+                        </a:lnSpc>
+                        <a:spcBef>
+                          <a:spcPts val="0"/>
+                        </a:spcBef>
+                        <a:spcAft>
+                          <a:spcPts val="0"/>
+                        </a:spcAft>
+                        <a:buClrTx/>
+                        <a:buSzTx/>
+                        <a:buFontTx/>
+                        <a:buNone/>
+                        <a:tabLst/>
+                        <a:defRPr/>
+                      </a:pPr>
+                      <a:r>
+                        <a:rPr lang="pt-BR" sz="1800" dirty="0" smtClean="0">
+                          <a:latin typeface="OpenSymbol"/>
+                          <a:ea typeface="OpenSymbol"/>
+                        </a:rPr>
+                        <a:t>✓</a:t>
+                      </a:r>
+                      <a:endParaRPr lang="pt-BR" sz="1800" dirty="0" smtClean="0"/>
+                    </a:p>
+                  </a:txBody>
+                  <a:tcPr/>
+                </a:tc>
+                <a:tc>
+                  <a:txBody>
+                    <a:bodyPr/>
+                    <a:lstStyle/>
+                    <a:p>
+                      <a:pPr marL="0" marR="0" indent="0" algn="ctr" defTabSz="914400" rtl="0" eaLnBrk="1" fontAlgn="auto" latinLnBrk="0" hangingPunct="1">
+                        <a:lnSpc>
+                          <a:spcPct val="100000"/>
+                        </a:lnSpc>
+                        <a:spcBef>
+                          <a:spcPts val="0"/>
+                        </a:spcBef>
+                        <a:spcAft>
+                          <a:spcPts val="0"/>
+                        </a:spcAft>
+                        <a:buClrTx/>
+                        <a:buSzTx/>
+                        <a:buFontTx/>
+                        <a:buNone/>
+                        <a:tabLst/>
+                        <a:defRPr/>
+                      </a:pPr>
+                      <a:r>
+                        <a:rPr lang="pt-BR" sz="1800" dirty="0" smtClean="0">
+                          <a:latin typeface="OpenSymbol"/>
+                          <a:ea typeface="OpenSymbol"/>
+                        </a:rPr>
+                        <a:t>✓</a:t>
+                      </a:r>
+                      <a:endParaRPr lang="pt-BR" sz="1800" dirty="0" smtClean="0"/>
+                    </a:p>
+                  </a:txBody>
+                  <a:tcPr/>
+                </a:tc>
+                <a:tc>
+                  <a:txBody>
+                    <a:bodyPr/>
+                    <a:lstStyle/>
+                    <a:p>
+                      <a:pPr algn="ctr"/>
+                      <a:endParaRPr lang="pt-BR" sz="1800" dirty="0"/>
+                    </a:p>
+                  </a:txBody>
+                  <a:tcPr/>
+                </a:tc>
+                <a:tc>
+                  <a:txBody>
+                    <a:bodyPr/>
+                    <a:lstStyle/>
+                    <a:p>
+                      <a:pPr marL="0" marR="0" indent="0" algn="ctr" defTabSz="914400" rtl="0" eaLnBrk="1" fontAlgn="auto" latinLnBrk="0" hangingPunct="1">
+                        <a:lnSpc>
+                          <a:spcPct val="100000"/>
+                        </a:lnSpc>
+                        <a:spcBef>
+                          <a:spcPts val="0"/>
+                        </a:spcBef>
+                        <a:spcAft>
+                          <a:spcPts val="0"/>
+                        </a:spcAft>
+                        <a:buClrTx/>
+                        <a:buSzTx/>
+                        <a:buFontTx/>
+                        <a:buNone/>
+                        <a:tabLst/>
+                        <a:defRPr/>
+                      </a:pPr>
+                      <a:r>
+                        <a:rPr lang="pt-BR" sz="1800" dirty="0" smtClean="0">
+                          <a:latin typeface="OpenSymbol"/>
+                          <a:ea typeface="OpenSymbol"/>
+                        </a:rPr>
+                        <a:t>✓</a:t>
+                      </a:r>
+                      <a:endParaRPr lang="pt-BR" sz="1800" dirty="0" smtClean="0"/>
+                    </a:p>
+                  </a:txBody>
+                  <a:tcPr/>
+                </a:tc>
+                <a:tc>
+                  <a:txBody>
+                    <a:bodyPr/>
+                    <a:lstStyle/>
+                    <a:p>
+                      <a:pPr algn="ctr"/>
+                      <a:endParaRPr lang="pt-BR" sz="1800"/>
+                    </a:p>
+                  </a:txBody>
+                  <a:tcPr/>
+                </a:tc>
+                <a:tc>
+                  <a:txBody>
+                    <a:bodyPr/>
+                    <a:lstStyle/>
+                    <a:p>
+                      <a:pPr marL="0" marR="0" indent="0" algn="ctr" defTabSz="914400" rtl="0" eaLnBrk="1" fontAlgn="auto" latinLnBrk="0" hangingPunct="1">
+                        <a:lnSpc>
+                          <a:spcPct val="100000"/>
+                        </a:lnSpc>
+                        <a:spcBef>
+                          <a:spcPts val="0"/>
+                        </a:spcBef>
+                        <a:spcAft>
+                          <a:spcPts val="0"/>
+                        </a:spcAft>
+                        <a:buClrTx/>
+                        <a:buSzTx/>
+                        <a:buFontTx/>
+                        <a:buNone/>
+                        <a:tabLst/>
+                        <a:defRPr/>
+                      </a:pPr>
+                      <a:r>
+                        <a:rPr lang="pt-BR" sz="1800" dirty="0" smtClean="0">
+                          <a:latin typeface="OpenSymbol"/>
+                          <a:ea typeface="OpenSymbol"/>
+                        </a:rPr>
+                        <a:t>✓</a:t>
+                      </a:r>
+                      <a:endParaRPr lang="pt-BR" sz="1800" dirty="0" smtClean="0"/>
+                    </a:p>
+                  </a:txBody>
+                  <a:tcPr/>
+                </a:tc>
+                <a:tc>
+                  <a:txBody>
+                    <a:bodyPr/>
+                    <a:lstStyle/>
+                    <a:p>
+                      <a:pPr algn="ctr"/>
+                      <a:endParaRPr lang="pt-BR" sz="1800"/>
+                    </a:p>
+                  </a:txBody>
+                  <a:tcPr/>
+                </a:tc>
+              </a:tr>
+              <a:tr h="370840">
+                <a:tc>
+                  <a:txBody>
+                    <a:bodyPr/>
+                    <a:lstStyle/>
+                    <a:p>
+                      <a:r>
+                        <a:rPr lang="en-US" sz="1400" dirty="0" err="1" smtClean="0"/>
+                        <a:t>Caipirinha</a:t>
+                      </a:r>
+                      <a:endParaRPr lang="pt-BR" sz="1400" dirty="0"/>
+                    </a:p>
+                  </a:txBody>
+                  <a:tcPr/>
+                </a:tc>
+                <a:tc>
+                  <a:txBody>
+                    <a:bodyPr/>
+                    <a:lstStyle/>
+                    <a:p>
+                      <a:pPr algn="ctr"/>
+                      <a:endParaRPr lang="pt-BR" sz="1800"/>
+                    </a:p>
+                  </a:txBody>
+                  <a:tcPr/>
+                </a:tc>
+                <a:tc>
+                  <a:txBody>
+                    <a:bodyPr/>
+                    <a:lstStyle/>
+                    <a:p>
+                      <a:pPr algn="ctr"/>
+                      <a:endParaRPr lang="pt-BR" sz="1800" dirty="0"/>
+                    </a:p>
+                  </a:txBody>
+                  <a:tcPr/>
+                </a:tc>
+                <a:tc>
+                  <a:txBody>
+                    <a:bodyPr/>
+                    <a:lstStyle/>
+                    <a:p>
+                      <a:pPr algn="ctr"/>
+                      <a:endParaRPr lang="pt-BR" sz="1800" dirty="0"/>
+                    </a:p>
+                  </a:txBody>
+                  <a:tcPr/>
+                </a:tc>
+                <a:tc>
+                  <a:txBody>
+                    <a:bodyPr/>
+                    <a:lstStyle/>
+                    <a:p>
+                      <a:pPr algn="ctr"/>
+                      <a:r>
+                        <a:rPr lang="pt-BR" sz="1800" dirty="0" smtClean="0">
+                          <a:latin typeface="OpenSymbol"/>
+                          <a:ea typeface="OpenSymbol"/>
+                        </a:rPr>
+                        <a:t>✓</a:t>
+                      </a:r>
+                      <a:endParaRPr lang="pt-BR" sz="1800" dirty="0"/>
+                    </a:p>
+                  </a:txBody>
+                  <a:tcPr/>
+                </a:tc>
+                <a:tc>
+                  <a:txBody>
+                    <a:bodyPr/>
+                    <a:lstStyle/>
+                    <a:p>
+                      <a:pPr algn="ctr"/>
+                      <a:endParaRPr lang="pt-BR" sz="1800" dirty="0"/>
+                    </a:p>
+                  </a:txBody>
+                  <a:tcPr/>
+                </a:tc>
+                <a:tc>
+                  <a:txBody>
+                    <a:bodyPr/>
+                    <a:lstStyle/>
+                    <a:p>
+                      <a:pPr algn="ctr"/>
+                      <a:endParaRPr lang="pt-BR" sz="1800"/>
+                    </a:p>
+                  </a:txBody>
+                  <a:tcPr/>
+                </a:tc>
+                <a:tc>
+                  <a:txBody>
+                    <a:bodyPr/>
+                    <a:lstStyle/>
+                    <a:p>
+                      <a:pPr algn="ctr"/>
+                      <a:endParaRPr lang="pt-BR" sz="1800"/>
+                    </a:p>
+                  </a:txBody>
+                  <a:tcPr/>
+                </a:tc>
+              </a:tr>
+              <a:tr h="370840">
+                <a:tc>
+                  <a:txBody>
+                    <a:bodyPr/>
+                    <a:lstStyle/>
+                    <a:p>
+                      <a:r>
+                        <a:rPr lang="en-US" sz="1400" dirty="0" err="1" smtClean="0"/>
+                        <a:t>Batatas</a:t>
+                      </a:r>
+                      <a:endParaRPr lang="pt-BR" sz="1400" dirty="0"/>
+                    </a:p>
+                  </a:txBody>
+                  <a:tcPr/>
+                </a:tc>
+                <a:tc>
+                  <a:txBody>
+                    <a:bodyPr/>
+                    <a:lstStyle/>
+                    <a:p>
+                      <a:pPr algn="ctr"/>
+                      <a:endParaRPr lang="pt-BR" sz="1800"/>
+                    </a:p>
+                  </a:txBody>
+                  <a:tcPr/>
+                </a:tc>
+                <a:tc>
+                  <a:txBody>
+                    <a:bodyPr/>
+                    <a:lstStyle/>
+                    <a:p>
+                      <a:pPr algn="ctr"/>
+                      <a:endParaRPr lang="pt-BR" sz="1800"/>
+                    </a:p>
+                  </a:txBody>
+                  <a:tcPr/>
+                </a:tc>
+                <a:tc>
+                  <a:txBody>
+                    <a:bodyPr/>
+                    <a:lstStyle/>
+                    <a:p>
+                      <a:pPr algn="ctr"/>
+                      <a:r>
+                        <a:rPr lang="pt-BR" sz="1800" dirty="0" smtClean="0">
+                          <a:latin typeface="OpenSymbol"/>
+                          <a:ea typeface="OpenSymbol"/>
+                        </a:rPr>
+                        <a:t>✓</a:t>
+                      </a:r>
+                      <a:endParaRPr lang="pt-BR" sz="1800" dirty="0"/>
+                    </a:p>
+                  </a:txBody>
+                  <a:tcPr/>
+                </a:tc>
+                <a:tc>
+                  <a:txBody>
+                    <a:bodyPr/>
+                    <a:lstStyle/>
+                    <a:p>
+                      <a:pPr algn="ctr"/>
+                      <a:endParaRPr lang="pt-BR" sz="1800" dirty="0"/>
+                    </a:p>
+                  </a:txBody>
+                  <a:tcPr/>
+                </a:tc>
+                <a:tc>
+                  <a:txBody>
+                    <a:bodyPr/>
+                    <a:lstStyle/>
+                    <a:p>
+                      <a:pPr algn="ctr"/>
+                      <a:r>
+                        <a:rPr lang="pt-BR" sz="1800" dirty="0" smtClean="0">
+                          <a:latin typeface="OpenSymbol"/>
+                          <a:ea typeface="OpenSymbol"/>
+                        </a:rPr>
+                        <a:t>✓</a:t>
+                      </a:r>
+                      <a:endParaRPr lang="pt-BR" sz="1800" dirty="0"/>
+                    </a:p>
+                  </a:txBody>
+                  <a:tcPr/>
+                </a:tc>
+                <a:tc>
+                  <a:txBody>
+                    <a:bodyPr/>
+                    <a:lstStyle/>
+                    <a:p>
+                      <a:pPr algn="ctr"/>
+                      <a:endParaRPr lang="pt-BR" sz="1800" dirty="0"/>
+                    </a:p>
+                  </a:txBody>
+                  <a:tcPr/>
+                </a:tc>
+                <a:tc>
+                  <a:txBody>
+                    <a:bodyPr/>
+                    <a:lstStyle/>
+                    <a:p>
+                      <a:pPr algn="ctr"/>
+                      <a:endParaRPr lang="pt-BR" sz="1800" dirty="0"/>
+                    </a:p>
+                  </a:txBody>
+                  <a:tcPr/>
+                </a:tc>
+              </a:tr>
+              <a:tr h="370840">
+                <a:tc>
+                  <a:txBody>
+                    <a:bodyPr/>
+                    <a:lstStyle/>
+                    <a:p>
+                      <a:r>
+                        <a:rPr lang="en-US" sz="1400" dirty="0" err="1" smtClean="0"/>
+                        <a:t>Chopp</a:t>
+                      </a:r>
+                      <a:endParaRPr lang="pt-BR" sz="1400" dirty="0"/>
+                    </a:p>
+                  </a:txBody>
+                  <a:tcPr/>
+                </a:tc>
+                <a:tc>
+                  <a:txBody>
+                    <a:bodyPr/>
+                    <a:lstStyle/>
+                    <a:p>
+                      <a:pPr algn="ctr"/>
+                      <a:endParaRPr lang="pt-BR" sz="1800"/>
+                    </a:p>
+                  </a:txBody>
+                  <a:tcPr/>
+                </a:tc>
+                <a:tc>
+                  <a:txBody>
+                    <a:bodyPr/>
+                    <a:lstStyle/>
+                    <a:p>
+                      <a:pPr algn="ctr"/>
+                      <a:endParaRPr lang="pt-BR" sz="1800"/>
+                    </a:p>
+                  </a:txBody>
+                  <a:tcPr/>
+                </a:tc>
+                <a:tc>
+                  <a:txBody>
+                    <a:bodyPr/>
+                    <a:lstStyle/>
+                    <a:p>
+                      <a:pPr algn="ctr"/>
+                      <a:endParaRPr lang="pt-BR" sz="1800"/>
+                    </a:p>
+                  </a:txBody>
+                  <a:tcPr/>
+                </a:tc>
+                <a:tc>
+                  <a:txBody>
+                    <a:bodyPr/>
+                    <a:lstStyle/>
+                    <a:p>
+                      <a:pPr algn="ctr"/>
+                      <a:endParaRPr lang="pt-BR" sz="1800"/>
+                    </a:p>
+                  </a:txBody>
+                  <a:tcPr/>
+                </a:tc>
+                <a:tc>
+                  <a:txBody>
+                    <a:bodyPr/>
+                    <a:lstStyle/>
+                    <a:p>
+                      <a:pPr algn="ctr"/>
+                      <a:r>
+                        <a:rPr lang="pt-BR" sz="1800" dirty="0" smtClean="0">
+                          <a:latin typeface="OpenSymbol"/>
+                          <a:ea typeface="OpenSymbol"/>
+                        </a:rPr>
+                        <a:t>✓</a:t>
+                      </a:r>
+                      <a:endParaRPr lang="pt-BR" sz="1800" dirty="0"/>
+                    </a:p>
+                  </a:txBody>
+                  <a:tcPr/>
+                </a:tc>
+                <a:tc>
+                  <a:txBody>
+                    <a:bodyPr/>
+                    <a:lstStyle/>
+                    <a:p>
+                      <a:pPr algn="ctr"/>
+                      <a:endParaRPr lang="pt-BR" sz="1800" dirty="0"/>
+                    </a:p>
+                  </a:txBody>
+                  <a:tcPr/>
+                </a:tc>
+                <a:tc>
+                  <a:txBody>
+                    <a:bodyPr/>
+                    <a:lstStyle/>
+                    <a:p>
+                      <a:pPr algn="ctr"/>
+                      <a:endParaRPr lang="pt-BR" sz="1800" dirty="0"/>
+                    </a:p>
+                  </a:txBody>
+                  <a:tcPr/>
+                </a:tc>
+              </a:tr>
+              <a:tr h="370840">
+                <a:tc>
+                  <a:txBody>
+                    <a:bodyPr/>
+                    <a:lstStyle/>
+                    <a:p>
+                      <a:r>
+                        <a:rPr lang="en-US" sz="1400" dirty="0" smtClean="0"/>
+                        <a:t>Agua</a:t>
+                      </a:r>
+                      <a:endParaRPr lang="pt-BR" sz="1400" dirty="0"/>
+                    </a:p>
+                  </a:txBody>
+                  <a:tcPr/>
+                </a:tc>
+                <a:tc>
+                  <a:txBody>
+                    <a:bodyPr/>
+                    <a:lstStyle/>
+                    <a:p>
+                      <a:pPr algn="ctr"/>
+                      <a:endParaRPr lang="pt-BR" sz="1800"/>
+                    </a:p>
+                  </a:txBody>
+                  <a:tcPr/>
+                </a:tc>
+                <a:tc>
+                  <a:txBody>
+                    <a:bodyPr/>
+                    <a:lstStyle/>
+                    <a:p>
+                      <a:pPr algn="ctr"/>
+                      <a:endParaRPr lang="pt-BR" sz="1800"/>
+                    </a:p>
+                  </a:txBody>
+                  <a:tcPr/>
+                </a:tc>
+                <a:tc>
+                  <a:txBody>
+                    <a:bodyPr/>
+                    <a:lstStyle/>
+                    <a:p>
+                      <a:pPr algn="ctr"/>
+                      <a:endParaRPr lang="pt-BR" sz="1800"/>
+                    </a:p>
+                  </a:txBody>
+                  <a:tcPr/>
+                </a:tc>
+                <a:tc>
+                  <a:txBody>
+                    <a:bodyPr/>
+                    <a:lstStyle/>
+                    <a:p>
+                      <a:pPr algn="ctr"/>
+                      <a:endParaRPr lang="pt-BR" sz="1800"/>
+                    </a:p>
+                  </a:txBody>
+                  <a:tcPr/>
+                </a:tc>
+                <a:tc>
+                  <a:txBody>
+                    <a:bodyPr/>
+                    <a:lstStyle/>
+                    <a:p>
+                      <a:pPr algn="ctr"/>
+                      <a:endParaRPr lang="pt-BR" sz="1800" dirty="0"/>
+                    </a:p>
+                  </a:txBody>
+                  <a:tcPr/>
+                </a:tc>
+                <a:tc>
+                  <a:txBody>
+                    <a:bodyPr/>
+                    <a:lstStyle/>
+                    <a:p>
+                      <a:pPr marL="0" marR="0" indent="0" algn="ctr" defTabSz="914400" rtl="0" eaLnBrk="1" fontAlgn="auto" latinLnBrk="0" hangingPunct="1">
+                        <a:lnSpc>
+                          <a:spcPct val="100000"/>
+                        </a:lnSpc>
+                        <a:spcBef>
+                          <a:spcPts val="0"/>
+                        </a:spcBef>
+                        <a:spcAft>
+                          <a:spcPts val="0"/>
+                        </a:spcAft>
+                        <a:buClrTx/>
+                        <a:buSzTx/>
+                        <a:buFontTx/>
+                        <a:buNone/>
+                        <a:tabLst/>
+                        <a:defRPr/>
+                      </a:pPr>
+                      <a:r>
+                        <a:rPr lang="pt-BR" sz="1800" dirty="0" smtClean="0">
+                          <a:latin typeface="OpenSymbol"/>
+                          <a:ea typeface="OpenSymbol"/>
+                        </a:rPr>
+                        <a:t>✓</a:t>
+                      </a:r>
+                      <a:endParaRPr lang="pt-BR" sz="1800" dirty="0" smtClean="0"/>
+                    </a:p>
+                  </a:txBody>
+                  <a:tcPr/>
+                </a:tc>
+                <a:tc>
+                  <a:txBody>
+                    <a:bodyPr/>
+                    <a:lstStyle/>
+                    <a:p>
+                      <a:pPr algn="ctr"/>
+                      <a:endParaRPr lang="pt-BR" sz="1800" dirty="0"/>
+                    </a:p>
+                  </a:txBody>
+                  <a:tcPr/>
+                </a:tc>
+              </a:tr>
+            </a:tbl>
+          </a:graphicData>
+        </a:graphic>
+      </p:graphicFrame>
+      <p:sp>
+        <p:nvSpPr>
+          <p:cNvPr id="5" name="Retângulo 4"/>
+          <p:cNvSpPr/>
+          <p:nvPr/>
+        </p:nvSpPr>
+        <p:spPr>
+          <a:xfrm rot="19693058">
+            <a:off x="839463" y="2414776"/>
+            <a:ext cx="7001790" cy="2585323"/>
+          </a:xfrm>
+          <a:prstGeom prst="rect">
+            <a:avLst/>
+          </a:prstGeom>
+          <a:noFill/>
+        </p:spPr>
+        <p:txBody>
+          <a:bodyPr wrap="none" lIns="91440" tIns="45720" rIns="91440" bIns="45720">
+            <a:spAutoFit/>
+            <a:scene3d>
+              <a:camera prst="orthographicFront"/>
+              <a:lightRig rig="soft" dir="tl">
+                <a:rot lat="0" lon="0" rev="0"/>
+              </a:lightRig>
+            </a:scene3d>
+            <a:sp3d contourW="25400" prstMaterial="matte">
+              <a:bevelT w="25400" h="55880" prst="artDeco"/>
+              <a:contourClr>
+                <a:schemeClr val="accent2">
+                  <a:tint val="20000"/>
+                </a:schemeClr>
+              </a:contourClr>
+            </a:sp3d>
+          </a:bodyPr>
+          <a:lstStyle/>
+          <a:p>
+            <a:pPr algn="ctr"/>
+            <a:r>
+              <a:rPr lang="pt-BR" sz="5400" b="1" cap="none" spc="50" dirty="0" smtClean="0">
+                <a:ln w="11430"/>
+                <a:gradFill>
+                  <a:gsLst>
+                    <a:gs pos="25000">
+                      <a:schemeClr val="accent2">
+                        <a:satMod val="155000"/>
+                      </a:schemeClr>
+                    </a:gs>
+                    <a:gs pos="100000">
+                      <a:schemeClr val="accent2">
+                        <a:shade val="45000"/>
+                        <a:satMod val="165000"/>
+                      </a:schemeClr>
+                    </a:gs>
+                  </a:gsLst>
+                  <a:lin ang="5400000"/>
+                </a:gradFill>
+                <a:effectLst>
+                  <a:outerShdw blurRad="76200" dist="50800" dir="5400000" algn="tl" rotWithShape="0">
+                    <a:srgbClr val="000000">
+                      <a:alpha val="65000"/>
+                    </a:srgbClr>
+                  </a:outerShdw>
+                </a:effectLst>
+              </a:rPr>
+              <a:t>Para </a:t>
+            </a:r>
+            <a:r>
+              <a:rPr lang="pt-BR" sz="5400" b="1" cap="none" spc="50" dirty="0" err="1" smtClean="0">
+                <a:ln w="11430"/>
+                <a:gradFill>
+                  <a:gsLst>
+                    <a:gs pos="25000">
+                      <a:schemeClr val="accent2">
+                        <a:satMod val="155000"/>
+                      </a:schemeClr>
+                    </a:gs>
+                    <a:gs pos="100000">
+                      <a:schemeClr val="accent2">
+                        <a:shade val="45000"/>
+                        <a:satMod val="165000"/>
+                      </a:schemeClr>
+                    </a:gs>
+                  </a:gsLst>
+                  <a:lin ang="5400000"/>
+                </a:gradFill>
+                <a:effectLst>
+                  <a:outerShdw blurRad="76200" dist="50800" dir="5400000" algn="tl" rotWithShape="0">
+                    <a:srgbClr val="000000">
+                      <a:alpha val="65000"/>
+                    </a:srgbClr>
+                  </a:outerShdw>
+                </a:effectLst>
+              </a:rPr>
+              <a:t>Tablet</a:t>
+            </a:r>
+            <a:r>
+              <a:rPr lang="pt-BR" sz="5400" b="1" cap="none" spc="50" dirty="0" smtClean="0">
+                <a:ln w="11430"/>
+                <a:gradFill>
+                  <a:gsLst>
+                    <a:gs pos="25000">
+                      <a:schemeClr val="accent2">
+                        <a:satMod val="155000"/>
+                      </a:schemeClr>
+                    </a:gs>
+                    <a:gs pos="100000">
+                      <a:schemeClr val="accent2">
+                        <a:shade val="45000"/>
+                        <a:satMod val="165000"/>
+                      </a:schemeClr>
+                    </a:gs>
+                  </a:gsLst>
+                  <a:lin ang="5400000"/>
+                </a:gradFill>
+                <a:effectLst>
+                  <a:outerShdw blurRad="76200" dist="50800" dir="5400000" algn="tl" rotWithShape="0">
+                    <a:srgbClr val="000000">
+                      <a:alpha val="65000"/>
+                    </a:srgbClr>
+                  </a:outerShdw>
+                </a:effectLst>
+              </a:rPr>
+              <a:t> poderia</a:t>
+            </a:r>
+          </a:p>
+          <a:p>
+            <a:pPr algn="ctr"/>
+            <a:r>
+              <a:rPr lang="pt-BR" sz="5400" b="1" cap="none" spc="50" dirty="0" smtClean="0">
+                <a:ln w="11430"/>
+                <a:gradFill>
+                  <a:gsLst>
+                    <a:gs pos="25000">
+                      <a:schemeClr val="accent2">
+                        <a:satMod val="155000"/>
+                      </a:schemeClr>
+                    </a:gs>
+                    <a:gs pos="100000">
+                      <a:schemeClr val="accent2">
+                        <a:shade val="45000"/>
+                        <a:satMod val="165000"/>
+                      </a:schemeClr>
+                    </a:gs>
+                  </a:gsLst>
+                  <a:lin ang="5400000"/>
+                </a:gradFill>
+                <a:effectLst>
+                  <a:outerShdw blurRad="76200" dist="50800" dir="5400000" algn="tl" rotWithShape="0">
+                    <a:srgbClr val="000000">
+                      <a:alpha val="65000"/>
+                    </a:srgbClr>
+                  </a:outerShdw>
+                </a:effectLst>
+              </a:rPr>
+              <a:t>ser esse aqui!</a:t>
+            </a:r>
+          </a:p>
+          <a:p>
+            <a:pPr algn="ctr"/>
+            <a:r>
+              <a:rPr lang="en-US" sz="5400" b="1" spc="50" dirty="0" err="1" smtClean="0">
+                <a:ln w="11430"/>
+                <a:gradFill>
+                  <a:gsLst>
+                    <a:gs pos="25000">
+                      <a:schemeClr val="accent2">
+                        <a:satMod val="155000"/>
+                      </a:schemeClr>
+                    </a:gs>
+                    <a:gs pos="100000">
+                      <a:schemeClr val="accent2">
+                        <a:shade val="45000"/>
+                        <a:satMod val="165000"/>
+                      </a:schemeClr>
+                    </a:gs>
+                  </a:gsLst>
+                  <a:lin ang="5400000"/>
+                </a:gradFill>
+                <a:effectLst>
+                  <a:outerShdw blurRad="76200" dist="50800" dir="5400000" algn="tl" rotWithShape="0">
+                    <a:srgbClr val="000000">
+                      <a:alpha val="65000"/>
+                    </a:srgbClr>
+                  </a:outerShdw>
+                </a:effectLst>
+              </a:rPr>
+              <a:t>Quem</a:t>
+            </a:r>
+            <a:r>
+              <a:rPr lang="en-US" sz="5400" b="1" spc="50" dirty="0" smtClean="0">
+                <a:ln w="11430"/>
+                <a:gradFill>
+                  <a:gsLst>
+                    <a:gs pos="25000">
+                      <a:schemeClr val="accent2">
+                        <a:satMod val="155000"/>
+                      </a:schemeClr>
+                    </a:gs>
+                    <a:gs pos="100000">
+                      <a:schemeClr val="accent2">
+                        <a:shade val="45000"/>
+                        <a:satMod val="165000"/>
+                      </a:schemeClr>
+                    </a:gs>
+                  </a:gsLst>
+                  <a:lin ang="5400000"/>
+                </a:gradFill>
+                <a:effectLst>
+                  <a:outerShdw blurRad="76200" dist="50800" dir="5400000" algn="tl" rotWithShape="0">
+                    <a:srgbClr val="000000">
+                      <a:alpha val="65000"/>
+                    </a:srgbClr>
+                  </a:outerShdw>
+                </a:effectLst>
+              </a:rPr>
+              <a:t> </a:t>
+            </a:r>
+            <a:r>
+              <a:rPr lang="en-US" sz="5400" b="1" spc="50" dirty="0" err="1" smtClean="0">
+                <a:ln w="11430"/>
+                <a:gradFill>
+                  <a:gsLst>
+                    <a:gs pos="25000">
+                      <a:schemeClr val="accent2">
+                        <a:satMod val="155000"/>
+                      </a:schemeClr>
+                    </a:gs>
+                    <a:gs pos="100000">
+                      <a:schemeClr val="accent2">
+                        <a:shade val="45000"/>
+                        <a:satMod val="165000"/>
+                      </a:schemeClr>
+                    </a:gs>
+                  </a:gsLst>
+                  <a:lin ang="5400000"/>
+                </a:gradFill>
+                <a:effectLst>
+                  <a:outerShdw blurRad="76200" dist="50800" dir="5400000" algn="tl" rotWithShape="0">
+                    <a:srgbClr val="000000">
+                      <a:alpha val="65000"/>
+                    </a:srgbClr>
+                  </a:outerShdw>
+                </a:effectLst>
+              </a:rPr>
+              <a:t>sabe</a:t>
+            </a:r>
+            <a:r>
+              <a:rPr lang="en-US" sz="5400" b="1" spc="50" dirty="0" smtClean="0">
+                <a:ln w="11430"/>
+                <a:gradFill>
+                  <a:gsLst>
+                    <a:gs pos="25000">
+                      <a:schemeClr val="accent2">
+                        <a:satMod val="155000"/>
+                      </a:schemeClr>
+                    </a:gs>
+                    <a:gs pos="100000">
+                      <a:schemeClr val="accent2">
+                        <a:shade val="45000"/>
+                        <a:satMod val="165000"/>
+                      </a:schemeClr>
+                    </a:gs>
+                  </a:gsLst>
+                  <a:lin ang="5400000"/>
+                </a:gradFill>
+                <a:effectLst>
+                  <a:outerShdw blurRad="76200" dist="50800" dir="5400000" algn="tl" rotWithShape="0">
+                    <a:srgbClr val="000000">
+                      <a:alpha val="65000"/>
+                    </a:srgbClr>
+                  </a:outerShdw>
+                </a:effectLst>
+              </a:rPr>
+              <a:t> no </a:t>
+            </a:r>
+            <a:r>
+              <a:rPr lang="en-US" sz="5400" b="1" spc="50" dirty="0" err="1" smtClean="0">
+                <a:ln w="11430"/>
+                <a:gradFill>
+                  <a:gsLst>
+                    <a:gs pos="25000">
+                      <a:schemeClr val="accent2">
+                        <a:satMod val="155000"/>
+                      </a:schemeClr>
+                    </a:gs>
+                    <a:gs pos="100000">
+                      <a:schemeClr val="accent2">
+                        <a:shade val="45000"/>
+                        <a:satMod val="165000"/>
+                      </a:schemeClr>
+                    </a:gs>
+                  </a:gsLst>
+                  <a:lin ang="5400000"/>
+                </a:gradFill>
+                <a:effectLst>
+                  <a:outerShdw blurRad="76200" dist="50800" dir="5400000" algn="tl" rotWithShape="0">
+                    <a:srgbClr val="000000">
+                      <a:alpha val="65000"/>
+                    </a:srgbClr>
+                  </a:outerShdw>
+                </a:effectLst>
+              </a:rPr>
+              <a:t>futuro</a:t>
+            </a:r>
+            <a:r>
+              <a:rPr lang="en-US" sz="5400" b="1" spc="50" dirty="0" smtClean="0">
+                <a:ln w="11430"/>
+                <a:gradFill>
+                  <a:gsLst>
+                    <a:gs pos="25000">
+                      <a:schemeClr val="accent2">
+                        <a:satMod val="155000"/>
+                      </a:schemeClr>
+                    </a:gs>
+                    <a:gs pos="100000">
+                      <a:schemeClr val="accent2">
+                        <a:shade val="45000"/>
+                        <a:satMod val="165000"/>
+                      </a:schemeClr>
+                    </a:gs>
+                  </a:gsLst>
+                  <a:lin ang="5400000"/>
+                </a:gradFill>
+                <a:effectLst>
+                  <a:outerShdw blurRad="76200" dist="50800" dir="5400000" algn="tl" rotWithShape="0">
+                    <a:srgbClr val="000000">
+                      <a:alpha val="65000"/>
+                    </a:srgbClr>
+                  </a:outerShdw>
+                </a:effectLst>
+              </a:rPr>
+              <a:t>..</a:t>
+            </a:r>
+            <a:r>
+              <a:rPr lang="pt-BR" sz="5400" b="1" spc="50" dirty="0" smtClean="0">
+                <a:ln w="11430"/>
+                <a:gradFill>
+                  <a:gsLst>
+                    <a:gs pos="25000">
+                      <a:schemeClr val="accent2">
+                        <a:satMod val="155000"/>
+                      </a:schemeClr>
+                    </a:gs>
+                    <a:gs pos="100000">
+                      <a:schemeClr val="accent2">
+                        <a:shade val="45000"/>
+                        <a:satMod val="165000"/>
+                      </a:schemeClr>
+                    </a:gs>
+                  </a:gsLst>
+                  <a:lin ang="5400000"/>
+                </a:gradFill>
+                <a:effectLst>
+                  <a:outerShdw blurRad="76200" dist="50800" dir="5400000" algn="tl" rotWithShape="0">
+                    <a:srgbClr val="000000">
+                      <a:alpha val="65000"/>
+                    </a:srgbClr>
+                  </a:outerShdw>
+                </a:effectLst>
+              </a:rPr>
+              <a:t>.</a:t>
+            </a:r>
+            <a:endParaRPr lang="pt-BR" sz="5400" b="1" cap="none" spc="50" dirty="0" smtClean="0">
+              <a:ln w="11430"/>
+              <a:gradFill>
+                <a:gsLst>
+                  <a:gs pos="25000">
+                    <a:schemeClr val="accent2">
+                      <a:satMod val="155000"/>
+                    </a:schemeClr>
+                  </a:gs>
+                  <a:gs pos="100000">
+                    <a:schemeClr val="accent2">
+                      <a:shade val="45000"/>
+                      <a:satMod val="165000"/>
+                    </a:schemeClr>
+                  </a:gs>
+                </a:gsLst>
+                <a:lin ang="5400000"/>
+              </a:gradFill>
+              <a:effectLst>
+                <a:outerShdw blurRad="76200" dist="50800" dir="5400000" algn="tl" rotWithShape="0">
+                  <a:srgbClr val="000000">
+                    <a:alpha val="65000"/>
+                  </a:srgbClr>
+                </a:outerShdw>
+              </a:effectLst>
+            </a:endParaRPr>
+          </a:p>
+        </p:txBody>
+      </p:sp>
+    </p:spTree>
+  </p:cSld>
+  <p:clrMapOvr>
+    <a:masterClrMapping/>
+  </p:clrMapOvr>
+  <p:timing>
+    <p:tnLst>
+      <p:par>
+        <p:cTn id="1" dur="indefinite" restart="never" nodeType="tmRoot"/>
+      </p:par>
+    </p:tnLst>
+  </p:timing>
+</p:sld>
+</file>
+
+<file path=ppt/slides/slide5.xml><?xml version="1.0" encoding="utf-8"?>
+<p:sld xmlns:a="http://schemas.openxmlformats.org/drawingml/2006/main" xmlns:r="http://schemas.openxmlformats.org/officeDocument/2006/relationships" xmlns:p="http://schemas.openxmlformats.org/presentationml/2006/main">
+  <p:cSld>
+    <p:spTree>
+      <p:nvGrpSpPr>
+        <p:cNvPr id="1" name=""/>
+        <p:cNvGrpSpPr/>
+        <p:nvPr/>
+      </p:nvGrpSpPr>
+      <p:grpSpPr>
+        <a:xfrm>
+          <a:off x="0" y="0"/>
+          <a:ext cx="0" cy="0"/>
+          <a:chOff x="0" y="0"/>
+          <a:chExt cx="0" cy="0"/>
+        </a:xfrm>
+      </p:grpSpPr>
+      <p:sp>
+        <p:nvSpPr>
+          <p:cNvPr id="2" name="Título 1"/>
+          <p:cNvSpPr>
+            <a:spLocks noGrp="1"/>
+          </p:cNvSpPr>
+          <p:nvPr>
+            <p:ph type="title"/>
+          </p:nvPr>
+        </p:nvSpPr>
+        <p:spPr/>
+        <p:txBody>
+          <a:bodyPr/>
+          <a:lstStyle/>
+          <a:p>
+            <a:r>
+              <a:rPr lang="en-US" dirty="0" err="1" smtClean="0"/>
               <a:t>Calculara</a:t>
             </a:r>
             <a:r>
@@ -5274,7 +6664,7 @@
 </p:sld>
 </file>
 
-<file path=ppt/slides/slide5.xml><?xml version="1.0" encoding="utf-8"?>
+<file path=ppt/slides/slide6.xml><?xml version="1.0" encoding="utf-8"?>
 <p:sld xmlns:a="http://schemas.openxmlformats.org/drawingml/2006/main" xmlns:r="http://schemas.openxmlformats.org/officeDocument/2006/relationships" xmlns:p="http://schemas.openxmlformats.org/presentationml/2006/main">
   <p:cSld>
     <p:spTree>

</xml_diff>

<commit_message>
status and designers proposal.
</commit_message>
<xml_diff>
--- a/ButecoCalc/Calculadora de Buteco.pptx
+++ b/ButecoCalc/Calculadora de Buteco.pptx
@@ -11,6 +11,9 @@
     <p:sldId id="259" r:id="rId5"/>
     <p:sldId id="257" r:id="rId6"/>
     <p:sldId id="260" r:id="rId7"/>
+    <p:sldId id="262" r:id="rId8"/>
+    <p:sldId id="263" r:id="rId9"/>
+    <p:sldId id="264" r:id="rId10"/>
   </p:sldIdLst>
   <p:sldSz cx="9144000" cy="6858000" type="screen4x3"/>
   <p:notesSz cx="6858000" cy="9144000"/>
@@ -294,7 +297,7 @@
             <a:fld id="{1A395A12-FCC0-4B92-B8E6-968BBAC1CEEF}" type="datetimeFigureOut">
               <a:rPr lang="pt-BR" smtClean="0"/>
               <a:pPr/>
-              <a:t>12/07/2013</a:t>
+              <a:t>25/07/2013</a:t>
             </a:fld>
             <a:endParaRPr lang="pt-BR"/>
           </a:p>
@@ -461,7 +464,7 @@
             <a:fld id="{1A395A12-FCC0-4B92-B8E6-968BBAC1CEEF}" type="datetimeFigureOut">
               <a:rPr lang="pt-BR" smtClean="0"/>
               <a:pPr/>
-              <a:t>12/07/2013</a:t>
+              <a:t>25/07/2013</a:t>
             </a:fld>
             <a:endParaRPr lang="pt-BR"/>
           </a:p>
@@ -638,7 +641,7 @@
             <a:fld id="{1A395A12-FCC0-4B92-B8E6-968BBAC1CEEF}" type="datetimeFigureOut">
               <a:rPr lang="pt-BR" smtClean="0"/>
               <a:pPr/>
-              <a:t>12/07/2013</a:t>
+              <a:t>25/07/2013</a:t>
             </a:fld>
             <a:endParaRPr lang="pt-BR"/>
           </a:p>
@@ -805,7 +808,7 @@
             <a:fld id="{1A395A12-FCC0-4B92-B8E6-968BBAC1CEEF}" type="datetimeFigureOut">
               <a:rPr lang="pt-BR" smtClean="0"/>
               <a:pPr/>
-              <a:t>12/07/2013</a:t>
+              <a:t>25/07/2013</a:t>
             </a:fld>
             <a:endParaRPr lang="pt-BR"/>
           </a:p>
@@ -1048,7 +1051,7 @@
             <a:fld id="{1A395A12-FCC0-4B92-B8E6-968BBAC1CEEF}" type="datetimeFigureOut">
               <a:rPr lang="pt-BR" smtClean="0"/>
               <a:pPr/>
-              <a:t>12/07/2013</a:t>
+              <a:t>25/07/2013</a:t>
             </a:fld>
             <a:endParaRPr lang="pt-BR"/>
           </a:p>
@@ -1333,7 +1336,7 @@
             <a:fld id="{1A395A12-FCC0-4B92-B8E6-968BBAC1CEEF}" type="datetimeFigureOut">
               <a:rPr lang="pt-BR" smtClean="0"/>
               <a:pPr/>
-              <a:t>12/07/2013</a:t>
+              <a:t>25/07/2013</a:t>
             </a:fld>
             <a:endParaRPr lang="pt-BR"/>
           </a:p>
@@ -1752,7 +1755,7 @@
             <a:fld id="{1A395A12-FCC0-4B92-B8E6-968BBAC1CEEF}" type="datetimeFigureOut">
               <a:rPr lang="pt-BR" smtClean="0"/>
               <a:pPr/>
-              <a:t>12/07/2013</a:t>
+              <a:t>25/07/2013</a:t>
             </a:fld>
             <a:endParaRPr lang="pt-BR"/>
           </a:p>
@@ -1867,7 +1870,7 @@
             <a:fld id="{1A395A12-FCC0-4B92-B8E6-968BBAC1CEEF}" type="datetimeFigureOut">
               <a:rPr lang="pt-BR" smtClean="0"/>
               <a:pPr/>
-              <a:t>12/07/2013</a:t>
+              <a:t>25/07/2013</a:t>
             </a:fld>
             <a:endParaRPr lang="pt-BR"/>
           </a:p>
@@ -1959,7 +1962,7 @@
             <a:fld id="{1A395A12-FCC0-4B92-B8E6-968BBAC1CEEF}" type="datetimeFigureOut">
               <a:rPr lang="pt-BR" smtClean="0"/>
               <a:pPr/>
-              <a:t>12/07/2013</a:t>
+              <a:t>25/07/2013</a:t>
             </a:fld>
             <a:endParaRPr lang="pt-BR"/>
           </a:p>
@@ -2233,7 +2236,7 @@
             <a:fld id="{1A395A12-FCC0-4B92-B8E6-968BBAC1CEEF}" type="datetimeFigureOut">
               <a:rPr lang="pt-BR" smtClean="0"/>
               <a:pPr/>
-              <a:t>12/07/2013</a:t>
+              <a:t>25/07/2013</a:t>
             </a:fld>
             <a:endParaRPr lang="pt-BR"/>
           </a:p>
@@ -2483,7 +2486,7 @@
             <a:fld id="{1A395A12-FCC0-4B92-B8E6-968BBAC1CEEF}" type="datetimeFigureOut">
               <a:rPr lang="pt-BR" smtClean="0"/>
               <a:pPr/>
-              <a:t>12/07/2013</a:t>
+              <a:t>25/07/2013</a:t>
             </a:fld>
             <a:endParaRPr lang="pt-BR"/>
           </a:p>
@@ -2693,7 +2696,7 @@
             <a:fld id="{1A395A12-FCC0-4B92-B8E6-968BBAC1CEEF}" type="datetimeFigureOut">
               <a:rPr lang="pt-BR" smtClean="0"/>
               <a:pPr/>
-              <a:t>12/07/2013</a:t>
+              <a:t>25/07/2013</a:t>
             </a:fld>
             <a:endParaRPr lang="pt-BR"/>
           </a:p>
@@ -4976,6 +4979,304 @@
           </a:graphicData>
         </a:graphic>
       </p:graphicFrame>
+      <p:sp>
+        <p:nvSpPr>
+          <p:cNvPr id="10" name="Retângulo 9"/>
+          <p:cNvSpPr/>
+          <p:nvPr/>
+        </p:nvSpPr>
+        <p:spPr>
+          <a:xfrm rot="19693058">
+            <a:off x="2342056" y="3245772"/>
+            <a:ext cx="3996608" cy="923330"/>
+          </a:xfrm>
+          <a:prstGeom prst="rect">
+            <a:avLst/>
+          </a:prstGeom>
+          <a:noFill/>
+        </p:spPr>
+        <p:txBody>
+          <a:bodyPr wrap="none" lIns="91440" tIns="45720" rIns="91440" bIns="45720">
+            <a:spAutoFit/>
+            <a:scene3d>
+              <a:camera prst="orthographicFront"/>
+              <a:lightRig rig="soft" dir="tl">
+                <a:rot lat="0" lon="0" rev="0"/>
+              </a:lightRig>
+            </a:scene3d>
+            <a:sp3d contourW="25400" prstMaterial="matte">
+              <a:bevelT w="25400" h="55880" prst="artDeco"/>
+              <a:contourClr>
+                <a:schemeClr val="accent2">
+                  <a:tint val="20000"/>
+                </a:schemeClr>
+              </a:contourClr>
+            </a:sp3d>
+          </a:bodyPr>
+          <a:lstStyle/>
+          <a:p>
+            <a:pPr algn="ctr"/>
+            <a:r>
+              <a:rPr lang="en-US" sz="5400" b="1" cap="none" spc="50" dirty="0" err="1" smtClean="0">
+                <a:ln w="11430"/>
+                <a:gradFill>
+                  <a:gsLst>
+                    <a:gs pos="25000">
+                      <a:schemeClr val="accent2">
+                        <a:satMod val="155000"/>
+                      </a:schemeClr>
+                    </a:gs>
+                    <a:gs pos="100000">
+                      <a:schemeClr val="accent2">
+                        <a:shade val="45000"/>
+                        <a:satMod val="165000"/>
+                      </a:schemeClr>
+                    </a:gs>
+                  </a:gsLst>
+                  <a:lin ang="5400000"/>
+                </a:gradFill>
+                <a:effectLst>
+                  <a:outerShdw blurRad="76200" dist="50800" dir="5400000" algn="tl" rotWithShape="0">
+                    <a:srgbClr val="000000">
+                      <a:alpha val="65000"/>
+                    </a:srgbClr>
+                  </a:outerShdw>
+                </a:effectLst>
+              </a:rPr>
+              <a:t>Já</a:t>
+            </a:r>
+            <a:r>
+              <a:rPr lang="en-US" sz="5400" b="1" cap="none" spc="50" dirty="0" smtClean="0">
+                <a:ln w="11430"/>
+                <a:gradFill>
+                  <a:gsLst>
+                    <a:gs pos="25000">
+                      <a:schemeClr val="accent2">
+                        <a:satMod val="155000"/>
+                      </a:schemeClr>
+                    </a:gs>
+                    <a:gs pos="100000">
+                      <a:schemeClr val="accent2">
+                        <a:shade val="45000"/>
+                        <a:satMod val="165000"/>
+                      </a:schemeClr>
+                    </a:gs>
+                  </a:gsLst>
+                  <a:lin ang="5400000"/>
+                </a:gradFill>
+                <a:effectLst>
+                  <a:outerShdw blurRad="76200" dist="50800" dir="5400000" algn="tl" rotWithShape="0">
+                    <a:srgbClr val="000000">
+                      <a:alpha val="65000"/>
+                    </a:srgbClr>
+                  </a:outerShdw>
+                </a:effectLst>
+              </a:rPr>
+              <a:t> </a:t>
+            </a:r>
+            <a:r>
+              <a:rPr lang="en-US" sz="5400" b="1" cap="none" spc="50" dirty="0" err="1" smtClean="0">
+                <a:ln w="11430"/>
+                <a:gradFill>
+                  <a:gsLst>
+                    <a:gs pos="25000">
+                      <a:schemeClr val="accent2">
+                        <a:satMod val="155000"/>
+                      </a:schemeClr>
+                    </a:gs>
+                    <a:gs pos="100000">
+                      <a:schemeClr val="accent2">
+                        <a:shade val="45000"/>
+                        <a:satMod val="165000"/>
+                      </a:schemeClr>
+                    </a:gs>
+                  </a:gsLst>
+                  <a:lin ang="5400000"/>
+                </a:gradFill>
+                <a:effectLst>
+                  <a:outerShdw blurRad="76200" dist="50800" dir="5400000" algn="tl" rotWithShape="0">
+                    <a:srgbClr val="000000">
+                      <a:alpha val="65000"/>
+                    </a:srgbClr>
+                  </a:outerShdw>
+                </a:effectLst>
+              </a:rPr>
+              <a:t>tá</a:t>
+            </a:r>
+            <a:r>
+              <a:rPr lang="en-US" sz="5400" b="1" cap="none" spc="50" dirty="0" smtClean="0">
+                <a:ln w="11430"/>
+                <a:gradFill>
+                  <a:gsLst>
+                    <a:gs pos="25000">
+                      <a:schemeClr val="accent2">
+                        <a:satMod val="155000"/>
+                      </a:schemeClr>
+                    </a:gs>
+                    <a:gs pos="100000">
+                      <a:schemeClr val="accent2">
+                        <a:shade val="45000"/>
+                        <a:satMod val="165000"/>
+                      </a:schemeClr>
+                    </a:gs>
+                  </a:gsLst>
+                  <a:lin ang="5400000"/>
+                </a:gradFill>
+                <a:effectLst>
+                  <a:outerShdw blurRad="76200" dist="50800" dir="5400000" algn="tl" rotWithShape="0">
+                    <a:srgbClr val="000000">
+                      <a:alpha val="65000"/>
+                    </a:srgbClr>
+                  </a:outerShdw>
+                </a:effectLst>
+              </a:rPr>
+              <a:t> </a:t>
+            </a:r>
+            <a:r>
+              <a:rPr lang="en-US" sz="5400" b="1" cap="none" spc="50" dirty="0" err="1" smtClean="0">
+                <a:ln w="11430"/>
+                <a:gradFill>
+                  <a:gsLst>
+                    <a:gs pos="25000">
+                      <a:schemeClr val="accent2">
+                        <a:satMod val="155000"/>
+                      </a:schemeClr>
+                    </a:gs>
+                    <a:gs pos="100000">
+                      <a:schemeClr val="accent2">
+                        <a:shade val="45000"/>
+                        <a:satMod val="165000"/>
+                      </a:schemeClr>
+                    </a:gs>
+                  </a:gsLst>
+                  <a:lin ang="5400000"/>
+                </a:gradFill>
+                <a:effectLst>
+                  <a:outerShdw blurRad="76200" dist="50800" dir="5400000" algn="tl" rotWithShape="0">
+                    <a:srgbClr val="000000">
+                      <a:alpha val="65000"/>
+                    </a:srgbClr>
+                  </a:outerShdw>
+                </a:effectLst>
+              </a:rPr>
+              <a:t>feito</a:t>
+            </a:r>
+            <a:r>
+              <a:rPr lang="en-US" sz="5400" b="1" spc="50" dirty="0" err="1" smtClean="0">
+                <a:ln w="11430"/>
+                <a:gradFill>
+                  <a:gsLst>
+                    <a:gs pos="25000">
+                      <a:schemeClr val="accent2">
+                        <a:satMod val="155000"/>
+                      </a:schemeClr>
+                    </a:gs>
+                    <a:gs pos="100000">
+                      <a:schemeClr val="accent2">
+                        <a:shade val="45000"/>
+                        <a:satMod val="165000"/>
+                      </a:schemeClr>
+                    </a:gs>
+                  </a:gsLst>
+                  <a:lin ang="5400000"/>
+                </a:gradFill>
+                <a:effectLst>
+                  <a:outerShdw blurRad="76200" dist="50800" dir="5400000" algn="tl" rotWithShape="0">
+                    <a:srgbClr val="000000">
+                      <a:alpha val="65000"/>
+                    </a:srgbClr>
+                  </a:outerShdw>
+                </a:effectLst>
+              </a:rPr>
+              <a:t>o</a:t>
+            </a:r>
+            <a:r>
+              <a:rPr lang="en-US" sz="5400" b="1" spc="50" dirty="0" smtClean="0">
+                <a:ln w="11430"/>
+                <a:gradFill>
+                  <a:gsLst>
+                    <a:gs pos="25000">
+                      <a:schemeClr val="accent2">
+                        <a:satMod val="155000"/>
+                      </a:schemeClr>
+                    </a:gs>
+                    <a:gs pos="100000">
+                      <a:schemeClr val="accent2">
+                        <a:shade val="45000"/>
+                        <a:satMod val="165000"/>
+                      </a:schemeClr>
+                    </a:gs>
+                  </a:gsLst>
+                  <a:lin ang="5400000"/>
+                </a:gradFill>
+                <a:effectLst>
+                  <a:outerShdw blurRad="76200" dist="50800" dir="5400000" algn="tl" rotWithShape="0">
+                    <a:srgbClr val="000000">
+                      <a:alpha val="65000"/>
+                    </a:srgbClr>
+                  </a:outerShdw>
+                </a:effectLst>
+              </a:rPr>
+              <a:t>..</a:t>
+            </a:r>
+            <a:r>
+              <a:rPr lang="pt-BR" sz="5400" b="1" spc="50" dirty="0" smtClean="0">
+                <a:ln w="11430"/>
+                <a:gradFill>
+                  <a:gsLst>
+                    <a:gs pos="25000">
+                      <a:schemeClr val="accent2">
+                        <a:satMod val="155000"/>
+                      </a:schemeClr>
+                    </a:gs>
+                    <a:gs pos="100000">
+                      <a:schemeClr val="accent2">
+                        <a:shade val="45000"/>
+                        <a:satMod val="165000"/>
+                      </a:schemeClr>
+                    </a:gs>
+                  </a:gsLst>
+                  <a:lin ang="5400000"/>
+                </a:gradFill>
+                <a:effectLst>
+                  <a:outerShdw blurRad="76200" dist="50800" dir="5400000" algn="tl" rotWithShape="0">
+                    <a:srgbClr val="000000">
+                      <a:alpha val="65000"/>
+                    </a:srgbClr>
+                  </a:outerShdw>
+                </a:effectLst>
+              </a:rPr>
+              <a:t>.</a:t>
+            </a:r>
+            <a:endParaRPr lang="pt-BR" sz="5400" b="1" cap="none" spc="50" dirty="0" smtClean="0">
+              <a:ln w="11430"/>
+              <a:gradFill>
+                <a:gsLst>
+                  <a:gs pos="25000">
+                    <a:schemeClr val="accent2">
+                      <a:satMod val="155000"/>
+                    </a:schemeClr>
+                  </a:gs>
+                  <a:gs pos="100000">
+                    <a:schemeClr val="accent2">
+                      <a:shade val="45000"/>
+                      <a:satMod val="165000"/>
+                    </a:schemeClr>
+                  </a:gs>
+                </a:gsLst>
+                <a:lin ang="5400000"/>
+              </a:gradFill>
+              <a:effectLst>
+                <a:outerShdw blurRad="76200" dist="50800" dir="5400000" algn="tl" rotWithShape="0">
+                  <a:srgbClr val="000000">
+                    <a:alpha val="65000"/>
+                  </a:srgbClr>
+                </a:outerShdw>
+              </a:effectLst>
+            </a:endParaRPr>
+          </a:p>
+        </p:txBody>
+      </p:sp>
     </p:spTree>
   </p:cSld>
   <p:clrMapOvr>
@@ -6861,6 +7162,435 @@
           </a:p>
         </p:txBody>
       </p:sp>
+    </p:spTree>
+  </p:cSld>
+  <p:clrMapOvr>
+    <a:masterClrMapping/>
+  </p:clrMapOvr>
+  <p:timing>
+    <p:tnLst>
+      <p:par>
+        <p:cTn id="1" dur="indefinite" restart="never" nodeType="tmRoot"/>
+      </p:par>
+    </p:tnLst>
+  </p:timing>
+</p:sld>
+</file>
+
+<file path=ppt/slides/slide7.xml><?xml version="1.0" encoding="utf-8"?>
+<p:sld xmlns:a="http://schemas.openxmlformats.org/drawingml/2006/main" xmlns:r="http://schemas.openxmlformats.org/officeDocument/2006/relationships" xmlns:p="http://schemas.openxmlformats.org/presentationml/2006/main">
+  <p:cSld>
+    <p:spTree>
+      <p:nvGrpSpPr>
+        <p:cNvPr id="1" name=""/>
+        <p:cNvGrpSpPr/>
+        <p:nvPr/>
+      </p:nvGrpSpPr>
+      <p:grpSpPr>
+        <a:xfrm>
+          <a:off x="0" y="0"/>
+          <a:ext cx="0" cy="0"/>
+          <a:chOff x="0" y="0"/>
+          <a:chExt cx="0" cy="0"/>
+        </a:xfrm>
+      </p:grpSpPr>
+      <p:sp>
+        <p:nvSpPr>
+          <p:cNvPr id="2" name="Título 1"/>
+          <p:cNvSpPr>
+            <a:spLocks noGrp="1"/>
+          </p:cNvSpPr>
+          <p:nvPr>
+            <p:ph type="title"/>
+          </p:nvPr>
+        </p:nvSpPr>
+        <p:spPr/>
+        <p:txBody>
+          <a:bodyPr/>
+          <a:lstStyle/>
+          <a:p>
+            <a:r>
+              <a:rPr lang="en-US" dirty="0" err="1" smtClean="0"/>
+              <a:t>Calculara</a:t>
+            </a:r>
+            <a:r>
+              <a:rPr lang="en-US" dirty="0" smtClean="0"/>
+              <a:t> de </a:t>
+            </a:r>
+            <a:r>
+              <a:rPr lang="en-US" dirty="0" err="1" smtClean="0"/>
+              <a:t>Buteco</a:t>
+            </a:r>
+            <a:endParaRPr lang="pt-BR" dirty="0"/>
+          </a:p>
+        </p:txBody>
+      </p:sp>
+      <p:grpSp>
+        <p:nvGrpSpPr>
+          <p:cNvPr id="10" name="Grupo 9"/>
+          <p:cNvGrpSpPr/>
+          <p:nvPr/>
+        </p:nvGrpSpPr>
+        <p:grpSpPr>
+          <a:xfrm>
+            <a:off x="3347864" y="2132856"/>
+            <a:ext cx="2592288" cy="3188677"/>
+            <a:chOff x="467544" y="1268760"/>
+            <a:chExt cx="2592288" cy="3188677"/>
+          </a:xfrm>
+        </p:grpSpPr>
+        <p:grpSp>
+          <p:nvGrpSpPr>
+            <p:cNvPr id="8" name="Grupo 7"/>
+            <p:cNvGrpSpPr/>
+            <p:nvPr/>
+          </p:nvGrpSpPr>
+          <p:grpSpPr>
+            <a:xfrm>
+              <a:off x="467544" y="1268760"/>
+              <a:ext cx="2592288" cy="2592288"/>
+              <a:chOff x="3779912" y="1412776"/>
+              <a:chExt cx="2592288" cy="2592288"/>
+            </a:xfrm>
+          </p:grpSpPr>
+          <p:sp>
+            <p:nvSpPr>
+              <p:cNvPr id="7" name="Retângulo de cantos arredondados 6"/>
+              <p:cNvSpPr/>
+              <p:nvPr/>
+            </p:nvSpPr>
+            <p:spPr>
+              <a:xfrm>
+                <a:off x="3779912" y="1412776"/>
+                <a:ext cx="2592288" cy="2592288"/>
+              </a:xfrm>
+              <a:prstGeom prst="roundRect">
+                <a:avLst/>
+              </a:prstGeom>
+            </p:spPr>
+            <p:style>
+              <a:lnRef idx="1">
+                <a:schemeClr val="accent1"/>
+              </a:lnRef>
+              <a:fillRef idx="3">
+                <a:schemeClr val="accent1"/>
+              </a:fillRef>
+              <a:effectRef idx="2">
+                <a:schemeClr val="accent1"/>
+              </a:effectRef>
+              <a:fontRef idx="minor">
+                <a:schemeClr val="lt1"/>
+              </a:fontRef>
+            </p:style>
+            <p:txBody>
+              <a:bodyPr rtlCol="0" anchor="ctr"/>
+              <a:lstStyle/>
+              <a:p>
+                <a:pPr algn="ctr"/>
+                <a:endParaRPr lang="pt-BR"/>
+              </a:p>
+            </p:txBody>
+          </p:sp>
+          <p:pic>
+            <p:nvPicPr>
+              <p:cNvPr id="6" name="Imagem 5" descr="NHC_icon-white_512px.png"/>
+              <p:cNvPicPr>
+                <a:picLocks noChangeAspect="1"/>
+              </p:cNvPicPr>
+              <p:nvPr/>
+            </p:nvPicPr>
+            <p:blipFill>
+              <a:blip r:embed="rId2" cstate="print"/>
+              <a:stretch>
+                <a:fillRect/>
+              </a:stretch>
+            </p:blipFill>
+            <p:spPr>
+              <a:xfrm>
+                <a:off x="3851920" y="1484784"/>
+                <a:ext cx="2438400" cy="2438400"/>
+              </a:xfrm>
+              <a:prstGeom prst="rect">
+                <a:avLst/>
+              </a:prstGeom>
+              <a:ln>
+                <a:noFill/>
+              </a:ln>
+              <a:effectLst>
+                <a:outerShdw blurRad="190500" algn="tl" rotWithShape="0">
+                  <a:srgbClr val="000000">
+                    <a:alpha val="70000"/>
+                  </a:srgbClr>
+                </a:outerShdw>
+              </a:effectLst>
+            </p:spPr>
+          </p:pic>
+        </p:grpSp>
+        <p:sp>
+          <p:nvSpPr>
+            <p:cNvPr id="9" name="CaixaDeTexto 8"/>
+            <p:cNvSpPr txBox="1"/>
+            <p:nvPr/>
+          </p:nvSpPr>
+          <p:spPr>
+            <a:xfrm>
+              <a:off x="467544" y="3995772"/>
+              <a:ext cx="2592288" cy="461665"/>
+            </a:xfrm>
+            <a:prstGeom prst="rect">
+              <a:avLst/>
+            </a:prstGeom>
+            <a:noFill/>
+          </p:spPr>
+          <p:txBody>
+            <a:bodyPr wrap="square" rtlCol="0">
+              <a:spAutoFit/>
+            </a:bodyPr>
+            <a:lstStyle/>
+            <a:p>
+              <a:pPr algn="ctr"/>
+              <a:r>
+                <a:rPr lang="en-US" sz="2400" b="1" i="1" dirty="0" err="1" smtClean="0"/>
+                <a:t>Ícone</a:t>
+              </a:r>
+              <a:r>
+                <a:rPr lang="en-US" sz="2400" b="1" i="1" dirty="0" smtClean="0"/>
+                <a:t> </a:t>
+              </a:r>
+              <a:r>
+                <a:rPr lang="en-US" sz="2400" b="1" i="1" dirty="0" err="1" smtClean="0"/>
+                <a:t>da</a:t>
+              </a:r>
+              <a:r>
+                <a:rPr lang="en-US" sz="2400" b="1" i="1" dirty="0" smtClean="0"/>
+                <a:t> App</a:t>
+              </a:r>
+            </a:p>
+          </p:txBody>
+        </p:sp>
+      </p:grpSp>
+    </p:spTree>
+  </p:cSld>
+  <p:clrMapOvr>
+    <a:masterClrMapping/>
+  </p:clrMapOvr>
+  <p:timing>
+    <p:tnLst>
+      <p:par>
+        <p:cTn id="1" dur="indefinite" restart="never" nodeType="tmRoot"/>
+      </p:par>
+    </p:tnLst>
+  </p:timing>
+</p:sld>
+</file>
+
+<file path=ppt/slides/slide8.xml><?xml version="1.0" encoding="utf-8"?>
+<p:sld xmlns:a="http://schemas.openxmlformats.org/drawingml/2006/main" xmlns:r="http://schemas.openxmlformats.org/officeDocument/2006/relationships" xmlns:p="http://schemas.openxmlformats.org/presentationml/2006/main">
+  <p:cSld>
+    <p:spTree>
+      <p:nvGrpSpPr>
+        <p:cNvPr id="1" name=""/>
+        <p:cNvGrpSpPr/>
+        <p:nvPr/>
+      </p:nvGrpSpPr>
+      <p:grpSpPr>
+        <a:xfrm>
+          <a:off x="0" y="0"/>
+          <a:ext cx="0" cy="0"/>
+          <a:chOff x="0" y="0"/>
+          <a:chExt cx="0" cy="0"/>
+        </a:xfrm>
+      </p:grpSpPr>
+      <p:sp>
+        <p:nvSpPr>
+          <p:cNvPr id="2" name="Título 1"/>
+          <p:cNvSpPr>
+            <a:spLocks noGrp="1"/>
+          </p:cNvSpPr>
+          <p:nvPr>
+            <p:ph type="title"/>
+          </p:nvPr>
+        </p:nvSpPr>
+        <p:spPr/>
+        <p:txBody>
+          <a:bodyPr/>
+          <a:lstStyle/>
+          <a:p>
+            <a:r>
+              <a:rPr lang="en-US" dirty="0" err="1" smtClean="0"/>
+              <a:t>Calculara</a:t>
+            </a:r>
+            <a:r>
+              <a:rPr lang="en-US" dirty="0" smtClean="0"/>
+              <a:t> de </a:t>
+            </a:r>
+            <a:r>
+              <a:rPr lang="en-US" dirty="0" err="1" smtClean="0"/>
+              <a:t>Buteco</a:t>
+            </a:r>
+            <a:endParaRPr lang="pt-BR" dirty="0"/>
+          </a:p>
+        </p:txBody>
+      </p:sp>
+      <p:pic>
+        <p:nvPicPr>
+          <p:cNvPr id="8" name="Imagem 7" descr="buteco_splash.jpg"/>
+          <p:cNvPicPr>
+            <a:picLocks noChangeAspect="1"/>
+          </p:cNvPicPr>
+          <p:nvPr/>
+        </p:nvPicPr>
+        <p:blipFill>
+          <a:blip r:embed="rId2" cstate="print"/>
+          <a:stretch>
+            <a:fillRect/>
+          </a:stretch>
+        </p:blipFill>
+        <p:spPr>
+          <a:xfrm>
+            <a:off x="360040" y="1143608"/>
+            <a:ext cx="3419872" cy="5813784"/>
+          </a:xfrm>
+          <a:prstGeom prst="rect">
+            <a:avLst/>
+          </a:prstGeom>
+        </p:spPr>
+      </p:pic>
+      <p:pic>
+        <p:nvPicPr>
+          <p:cNvPr id="10" name="Imagem 9" descr="buteco_splash_guidelines.jpg"/>
+          <p:cNvPicPr>
+            <a:picLocks noChangeAspect="1"/>
+          </p:cNvPicPr>
+          <p:nvPr/>
+        </p:nvPicPr>
+        <p:blipFill>
+          <a:blip r:embed="rId3" cstate="print"/>
+          <a:stretch>
+            <a:fillRect/>
+          </a:stretch>
+        </p:blipFill>
+        <p:spPr>
+          <a:xfrm>
+            <a:off x="5040432" y="1143392"/>
+            <a:ext cx="3420000" cy="5814000"/>
+          </a:xfrm>
+          <a:prstGeom prst="rect">
+            <a:avLst/>
+          </a:prstGeom>
+        </p:spPr>
+      </p:pic>
+    </p:spTree>
+  </p:cSld>
+  <p:clrMapOvr>
+    <a:masterClrMapping/>
+  </p:clrMapOvr>
+  <p:timing>
+    <p:tnLst>
+      <p:par>
+        <p:cTn id="1" dur="indefinite" restart="never" nodeType="tmRoot"/>
+      </p:par>
+    </p:tnLst>
+  </p:timing>
+</p:sld>
+</file>
+
+<file path=ppt/slides/slide9.xml><?xml version="1.0" encoding="utf-8"?>
+<p:sld xmlns:a="http://schemas.openxmlformats.org/drawingml/2006/main" xmlns:r="http://schemas.openxmlformats.org/officeDocument/2006/relationships" xmlns:p="http://schemas.openxmlformats.org/presentationml/2006/main">
+  <p:cSld>
+    <p:spTree>
+      <p:nvGrpSpPr>
+        <p:cNvPr id="1" name=""/>
+        <p:cNvGrpSpPr/>
+        <p:nvPr/>
+      </p:nvGrpSpPr>
+      <p:grpSpPr>
+        <a:xfrm>
+          <a:off x="0" y="0"/>
+          <a:ext cx="0" cy="0"/>
+          <a:chOff x="0" y="0"/>
+          <a:chExt cx="0" cy="0"/>
+        </a:xfrm>
+      </p:grpSpPr>
+      <p:sp>
+        <p:nvSpPr>
+          <p:cNvPr id="2" name="Título 1"/>
+          <p:cNvSpPr>
+            <a:spLocks noGrp="1"/>
+          </p:cNvSpPr>
+          <p:nvPr>
+            <p:ph type="title"/>
+          </p:nvPr>
+        </p:nvSpPr>
+        <p:spPr/>
+        <p:txBody>
+          <a:bodyPr/>
+          <a:lstStyle/>
+          <a:p>
+            <a:r>
+              <a:rPr lang="en-US" dirty="0" err="1" smtClean="0"/>
+              <a:t>Calculara</a:t>
+            </a:r>
+            <a:r>
+              <a:rPr lang="en-US" dirty="0" smtClean="0"/>
+              <a:t> de </a:t>
+            </a:r>
+            <a:r>
+              <a:rPr lang="en-US" dirty="0" err="1" smtClean="0"/>
+              <a:t>Buteco</a:t>
+            </a:r>
+            <a:endParaRPr lang="pt-BR" dirty="0"/>
+          </a:p>
+        </p:txBody>
+      </p:sp>
+      <p:pic>
+        <p:nvPicPr>
+          <p:cNvPr id="5" name="Imagem 4" descr="buteco_about.jpg"/>
+          <p:cNvPicPr>
+            <a:picLocks noChangeAspect="1"/>
+          </p:cNvPicPr>
+          <p:nvPr/>
+        </p:nvPicPr>
+        <p:blipFill>
+          <a:blip r:embed="rId2" cstate="print"/>
+          <a:stretch>
+            <a:fillRect/>
+          </a:stretch>
+        </p:blipFill>
+        <p:spPr>
+          <a:xfrm>
+            <a:off x="359912" y="1143392"/>
+            <a:ext cx="3420000" cy="5814000"/>
+          </a:xfrm>
+          <a:prstGeom prst="rect">
+            <a:avLst/>
+          </a:prstGeom>
+        </p:spPr>
+      </p:pic>
+      <p:pic>
+        <p:nvPicPr>
+          <p:cNvPr id="6" name="Imagem 5" descr="buteco_about_guidelines.jpg"/>
+          <p:cNvPicPr>
+            <a:picLocks noChangeAspect="1"/>
+          </p:cNvPicPr>
+          <p:nvPr/>
+        </p:nvPicPr>
+        <p:blipFill>
+          <a:blip r:embed="rId3" cstate="print"/>
+          <a:stretch>
+            <a:fillRect/>
+          </a:stretch>
+        </p:blipFill>
+        <p:spPr>
+          <a:xfrm>
+            <a:off x="5040432" y="1143392"/>
+            <a:ext cx="3420000" cy="5814000"/>
+          </a:xfrm>
+          <a:prstGeom prst="rect">
+            <a:avLst/>
+          </a:prstGeom>
+        </p:spPr>
+      </p:pic>
     </p:spTree>
   </p:cSld>
   <p:clrMapOvr>

</xml_diff>

<commit_message>
Current Version - 1.0
</commit_message>
<xml_diff>
--- a/ButecoCalc/Calculadora de Buteco.pptx
+++ b/ButecoCalc/Calculadora de Buteco.pptx
@@ -14,6 +14,12 @@
     <p:sldId id="262" r:id="rId8"/>
     <p:sldId id="263" r:id="rId9"/>
     <p:sldId id="264" r:id="rId10"/>
+    <p:sldId id="270" r:id="rId11"/>
+    <p:sldId id="265" r:id="rId12"/>
+    <p:sldId id="266" r:id="rId13"/>
+    <p:sldId id="267" r:id="rId14"/>
+    <p:sldId id="268" r:id="rId15"/>
+    <p:sldId id="269" r:id="rId16"/>
   </p:sldIdLst>
   <p:sldSz cx="9144000" cy="6858000" type="screen4x3"/>
   <p:notesSz cx="6858000" cy="9144000"/>
@@ -297,7 +303,7 @@
             <a:fld id="{1A395A12-FCC0-4B92-B8E6-968BBAC1CEEF}" type="datetimeFigureOut">
               <a:rPr lang="pt-BR" smtClean="0"/>
               <a:pPr/>
-              <a:t>25/07/2013</a:t>
+              <a:t>28/07/2013</a:t>
             </a:fld>
             <a:endParaRPr lang="pt-BR"/>
           </a:p>
@@ -464,7 +470,7 @@
             <a:fld id="{1A395A12-FCC0-4B92-B8E6-968BBAC1CEEF}" type="datetimeFigureOut">
               <a:rPr lang="pt-BR" smtClean="0"/>
               <a:pPr/>
-              <a:t>25/07/2013</a:t>
+              <a:t>28/07/2013</a:t>
             </a:fld>
             <a:endParaRPr lang="pt-BR"/>
           </a:p>
@@ -641,7 +647,7 @@
             <a:fld id="{1A395A12-FCC0-4B92-B8E6-968BBAC1CEEF}" type="datetimeFigureOut">
               <a:rPr lang="pt-BR" smtClean="0"/>
               <a:pPr/>
-              <a:t>25/07/2013</a:t>
+              <a:t>28/07/2013</a:t>
             </a:fld>
             <a:endParaRPr lang="pt-BR"/>
           </a:p>
@@ -808,7 +814,7 @@
             <a:fld id="{1A395A12-FCC0-4B92-B8E6-968BBAC1CEEF}" type="datetimeFigureOut">
               <a:rPr lang="pt-BR" smtClean="0"/>
               <a:pPr/>
-              <a:t>25/07/2013</a:t>
+              <a:t>28/07/2013</a:t>
             </a:fld>
             <a:endParaRPr lang="pt-BR"/>
           </a:p>
@@ -1051,7 +1057,7 @@
             <a:fld id="{1A395A12-FCC0-4B92-B8E6-968BBAC1CEEF}" type="datetimeFigureOut">
               <a:rPr lang="pt-BR" smtClean="0"/>
               <a:pPr/>
-              <a:t>25/07/2013</a:t>
+              <a:t>28/07/2013</a:t>
             </a:fld>
             <a:endParaRPr lang="pt-BR"/>
           </a:p>
@@ -1336,7 +1342,7 @@
             <a:fld id="{1A395A12-FCC0-4B92-B8E6-968BBAC1CEEF}" type="datetimeFigureOut">
               <a:rPr lang="pt-BR" smtClean="0"/>
               <a:pPr/>
-              <a:t>25/07/2013</a:t>
+              <a:t>28/07/2013</a:t>
             </a:fld>
             <a:endParaRPr lang="pt-BR"/>
           </a:p>
@@ -1755,7 +1761,7 @@
             <a:fld id="{1A395A12-FCC0-4B92-B8E6-968BBAC1CEEF}" type="datetimeFigureOut">
               <a:rPr lang="pt-BR" smtClean="0"/>
               <a:pPr/>
-              <a:t>25/07/2013</a:t>
+              <a:t>28/07/2013</a:t>
             </a:fld>
             <a:endParaRPr lang="pt-BR"/>
           </a:p>
@@ -1870,7 +1876,7 @@
             <a:fld id="{1A395A12-FCC0-4B92-B8E6-968BBAC1CEEF}" type="datetimeFigureOut">
               <a:rPr lang="pt-BR" smtClean="0"/>
               <a:pPr/>
-              <a:t>25/07/2013</a:t>
+              <a:t>28/07/2013</a:t>
             </a:fld>
             <a:endParaRPr lang="pt-BR"/>
           </a:p>
@@ -1962,7 +1968,7 @@
             <a:fld id="{1A395A12-FCC0-4B92-B8E6-968BBAC1CEEF}" type="datetimeFigureOut">
               <a:rPr lang="pt-BR" smtClean="0"/>
               <a:pPr/>
-              <a:t>25/07/2013</a:t>
+              <a:t>28/07/2013</a:t>
             </a:fld>
             <a:endParaRPr lang="pt-BR"/>
           </a:p>
@@ -2236,7 +2242,7 @@
             <a:fld id="{1A395A12-FCC0-4B92-B8E6-968BBAC1CEEF}" type="datetimeFigureOut">
               <a:rPr lang="pt-BR" smtClean="0"/>
               <a:pPr/>
-              <a:t>25/07/2013</a:t>
+              <a:t>28/07/2013</a:t>
             </a:fld>
             <a:endParaRPr lang="pt-BR"/>
           </a:p>
@@ -2486,7 +2492,7 @@
             <a:fld id="{1A395A12-FCC0-4B92-B8E6-968BBAC1CEEF}" type="datetimeFigureOut">
               <a:rPr lang="pt-BR" smtClean="0"/>
               <a:pPr/>
-              <a:t>25/07/2013</a:t>
+              <a:t>28/07/2013</a:t>
             </a:fld>
             <a:endParaRPr lang="pt-BR"/>
           </a:p>
@@ -2696,7 +2702,7 @@
             <a:fld id="{1A395A12-FCC0-4B92-B8E6-968BBAC1CEEF}" type="datetimeFigureOut">
               <a:rPr lang="pt-BR" smtClean="0"/>
               <a:pPr/>
-              <a:t>25/07/2013</a:t>
+              <a:t>28/07/2013</a:t>
             </a:fld>
             <a:endParaRPr lang="pt-BR"/>
           </a:p>
@@ -3079,22 +3085,92 @@
         </p:nvSpPr>
         <p:spPr/>
         <p:txBody>
-          <a:bodyPr/>
+          <a:bodyPr>
+            <a:normAutofit/>
+          </a:bodyPr>
           <a:lstStyle/>
           <a:p>
             <a:r>
-              <a:rPr lang="en-US" dirty="0" err="1" smtClean="0"/>
-              <a:t>Calculadora</a:t>
-            </a:r>
-            <a:r>
-              <a:rPr lang="en-US" dirty="0" smtClean="0"/>
-              <a:t> de </a:t>
-            </a:r>
-            <a:r>
-              <a:rPr lang="en-US" dirty="0" err="1" smtClean="0"/>
-              <a:t>Buteco</a:t>
-            </a:r>
-            <a:endParaRPr lang="pt-BR" dirty="0"/>
+              <a:rPr lang="en-US" sz="4800" b="1" dirty="0" smtClean="0">
+                <a:effectLst>
+                  <a:outerShdw blurRad="38100" dist="38100" dir="2700000" algn="tl">
+                    <a:srgbClr val="000000">
+                      <a:alpha val="43137"/>
+                    </a:srgbClr>
+                  </a:outerShdw>
+                </a:effectLst>
+              </a:rPr>
+              <a:t>NHC - Na </a:t>
+            </a:r>
+            <a:r>
+              <a:rPr lang="en-US" sz="4800" b="1" dirty="0" err="1" smtClean="0">
+                <a:effectLst>
+                  <a:outerShdw blurRad="38100" dist="38100" dir="2700000" algn="tl">
+                    <a:srgbClr val="000000">
+                      <a:alpha val="43137"/>
+                    </a:srgbClr>
+                  </a:outerShdw>
+                </a:effectLst>
+              </a:rPr>
+              <a:t>Hora</a:t>
+            </a:r>
+            <a:r>
+              <a:rPr lang="en-US" sz="4800" b="1" dirty="0" smtClean="0">
+                <a:effectLst>
+                  <a:outerShdw blurRad="38100" dist="38100" dir="2700000" algn="tl">
+                    <a:srgbClr val="000000">
+                      <a:alpha val="43137"/>
+                    </a:srgbClr>
+                  </a:outerShdw>
+                </a:effectLst>
+              </a:rPr>
+              <a:t> </a:t>
+            </a:r>
+            <a:r>
+              <a:rPr lang="en-US" sz="4800" b="1" dirty="0" err="1" smtClean="0">
+                <a:effectLst>
+                  <a:outerShdw blurRad="38100" dist="38100" dir="2700000" algn="tl">
+                    <a:srgbClr val="000000">
+                      <a:alpha val="43137"/>
+                    </a:srgbClr>
+                  </a:outerShdw>
+                </a:effectLst>
+              </a:rPr>
+              <a:t>da</a:t>
+            </a:r>
+            <a:r>
+              <a:rPr lang="en-US" sz="4800" b="1" dirty="0" smtClean="0">
+                <a:effectLst>
+                  <a:outerShdw blurRad="38100" dist="38100" dir="2700000" algn="tl">
+                    <a:srgbClr val="000000">
+                      <a:alpha val="43137"/>
+                    </a:srgbClr>
+                  </a:outerShdw>
+                </a:effectLst>
+              </a:rPr>
+              <a:t> </a:t>
+            </a:r>
+            <a:r>
+              <a:rPr lang="en-US" sz="4800" b="1" dirty="0" err="1" smtClean="0">
+                <a:effectLst>
+                  <a:outerShdw blurRad="38100" dist="38100" dir="2700000" algn="tl">
+                    <a:srgbClr val="000000">
+                      <a:alpha val="43137"/>
+                    </a:srgbClr>
+                  </a:outerShdw>
+                </a:effectLst>
+              </a:rPr>
+              <a:t>Conta</a:t>
+            </a:r>
+            <a:endParaRPr lang="pt-BR" sz="4800" b="1" dirty="0">
+              <a:effectLst>
+                <a:outerShdw blurRad="38100" dist="38100" dir="2700000" algn="tl">
+                  <a:srgbClr val="000000">
+                    <a:alpha val="43137"/>
+                  </a:srgbClr>
+                </a:outerShdw>
+              </a:effectLst>
+            </a:endParaRPr>
           </a:p>
         </p:txBody>
       </p:sp>
@@ -3108,15 +3184,2212 @@
             <p:ph type="subTitle" idx="1"/>
           </p:nvPr>
         </p:nvSpPr>
-        <p:spPr/>
+        <p:spPr>
+          <a:xfrm>
+            <a:off x="755576" y="3886200"/>
+            <a:ext cx="7488832" cy="1752600"/>
+          </a:xfrm>
+        </p:spPr>
         <p:txBody>
           <a:bodyPr/>
           <a:lstStyle/>
           <a:p>
-            <a:endParaRPr lang="pt-BR"/>
-          </a:p>
-        </p:txBody>
-      </p:sp>
+            <a:r>
+              <a:rPr lang="en-US" dirty="0" smtClean="0"/>
+              <a:t>(</a:t>
+            </a:r>
+            <a:r>
+              <a:rPr lang="en-US" dirty="0" err="1" smtClean="0"/>
+              <a:t>originalmente</a:t>
+            </a:r>
+            <a:r>
+              <a:rPr lang="en-US" dirty="0" smtClean="0"/>
+              <a:t>: </a:t>
+            </a:r>
+            <a:r>
+              <a:rPr lang="en-US" dirty="0" err="1" smtClean="0"/>
+              <a:t>Calculadora</a:t>
+            </a:r>
+            <a:r>
+              <a:rPr lang="en-US" dirty="0" smtClean="0"/>
+              <a:t> de </a:t>
+            </a:r>
+            <a:r>
+              <a:rPr lang="en-US" dirty="0" err="1" smtClean="0"/>
+              <a:t>Buteco</a:t>
+            </a:r>
+            <a:r>
+              <a:rPr lang="en-US" dirty="0" smtClean="0"/>
+              <a:t>)</a:t>
+            </a:r>
+            <a:endParaRPr lang="pt-BR" dirty="0"/>
+          </a:p>
+        </p:txBody>
+      </p:sp>
+    </p:spTree>
+  </p:cSld>
+  <p:clrMapOvr>
+    <a:masterClrMapping/>
+  </p:clrMapOvr>
+  <p:timing>
+    <p:tnLst>
+      <p:par>
+        <p:cTn id="1" dur="indefinite" restart="never" nodeType="tmRoot"/>
+      </p:par>
+    </p:tnLst>
+  </p:timing>
+</p:sld>
+</file>
+
+<file path=ppt/slides/slide10.xml><?xml version="1.0" encoding="utf-8"?>
+<p:sld xmlns:a="http://schemas.openxmlformats.org/drawingml/2006/main" xmlns:r="http://schemas.openxmlformats.org/officeDocument/2006/relationships" xmlns:p="http://schemas.openxmlformats.org/presentationml/2006/main">
+  <p:cSld>
+    <p:spTree>
+      <p:nvGrpSpPr>
+        <p:cNvPr id="1" name=""/>
+        <p:cNvGrpSpPr/>
+        <p:nvPr/>
+      </p:nvGrpSpPr>
+      <p:grpSpPr>
+        <a:xfrm>
+          <a:off x="0" y="0"/>
+          <a:ext cx="0" cy="0"/>
+          <a:chOff x="0" y="0"/>
+          <a:chExt cx="0" cy="0"/>
+        </a:xfrm>
+      </p:grpSpPr>
+      <p:cxnSp>
+        <p:nvCxnSpPr>
+          <p:cNvPr id="18" name="Conector de seta reta 17"/>
+          <p:cNvCxnSpPr>
+            <a:endCxn id="13" idx="1"/>
+          </p:cNvCxnSpPr>
+          <p:nvPr/>
+        </p:nvCxnSpPr>
+        <p:spPr>
+          <a:xfrm flipV="1">
+            <a:off x="2771800" y="3032956"/>
+            <a:ext cx="561996" cy="324036"/>
+          </a:xfrm>
+          <a:prstGeom prst="straightConnector1">
+            <a:avLst/>
+          </a:prstGeom>
+          <a:ln>
+            <a:solidFill>
+              <a:srgbClr val="FF0000"/>
+            </a:solidFill>
+            <a:tailEnd type="arrow"/>
+          </a:ln>
+        </p:spPr>
+        <p:style>
+          <a:lnRef idx="1">
+            <a:schemeClr val="accent1"/>
+          </a:lnRef>
+          <a:fillRef idx="0">
+            <a:schemeClr val="accent1"/>
+          </a:fillRef>
+          <a:effectRef idx="0">
+            <a:schemeClr val="accent1"/>
+          </a:effectRef>
+          <a:fontRef idx="minor">
+            <a:schemeClr val="tx1"/>
+          </a:fontRef>
+        </p:style>
+      </p:cxnSp>
+      <p:cxnSp>
+        <p:nvCxnSpPr>
+          <p:cNvPr id="19" name="Conector de seta reta 18"/>
+          <p:cNvCxnSpPr>
+            <a:endCxn id="14" idx="1"/>
+          </p:cNvCxnSpPr>
+          <p:nvPr/>
+        </p:nvCxnSpPr>
+        <p:spPr>
+          <a:xfrm>
+            <a:off x="2771800" y="3861048"/>
+            <a:ext cx="576064" cy="36004"/>
+          </a:xfrm>
+          <a:prstGeom prst="straightConnector1">
+            <a:avLst/>
+          </a:prstGeom>
+          <a:ln>
+            <a:solidFill>
+              <a:srgbClr val="FF0000"/>
+            </a:solidFill>
+            <a:tailEnd type="arrow"/>
+          </a:ln>
+        </p:spPr>
+        <p:style>
+          <a:lnRef idx="1">
+            <a:schemeClr val="accent1"/>
+          </a:lnRef>
+          <a:fillRef idx="0">
+            <a:schemeClr val="accent1"/>
+          </a:fillRef>
+          <a:effectRef idx="0">
+            <a:schemeClr val="accent1"/>
+          </a:effectRef>
+          <a:fontRef idx="minor">
+            <a:schemeClr val="tx1"/>
+          </a:fontRef>
+        </p:style>
+      </p:cxnSp>
+      <p:cxnSp>
+        <p:nvCxnSpPr>
+          <p:cNvPr id="21" name="Conector de seta reta 20"/>
+          <p:cNvCxnSpPr>
+            <a:endCxn id="15" idx="1"/>
+          </p:cNvCxnSpPr>
+          <p:nvPr/>
+        </p:nvCxnSpPr>
+        <p:spPr>
+          <a:xfrm>
+            <a:off x="2843808" y="4437112"/>
+            <a:ext cx="504056" cy="324036"/>
+          </a:xfrm>
+          <a:prstGeom prst="straightConnector1">
+            <a:avLst/>
+          </a:prstGeom>
+          <a:ln>
+            <a:solidFill>
+              <a:srgbClr val="FF0000"/>
+            </a:solidFill>
+            <a:tailEnd type="arrow"/>
+          </a:ln>
+        </p:spPr>
+        <p:style>
+          <a:lnRef idx="1">
+            <a:schemeClr val="accent1"/>
+          </a:lnRef>
+          <a:fillRef idx="0">
+            <a:schemeClr val="accent1"/>
+          </a:fillRef>
+          <a:effectRef idx="0">
+            <a:schemeClr val="accent1"/>
+          </a:effectRef>
+          <a:fontRef idx="minor">
+            <a:schemeClr val="tx1"/>
+          </a:fontRef>
+        </p:style>
+      </p:cxnSp>
+      <p:cxnSp>
+        <p:nvCxnSpPr>
+          <p:cNvPr id="23" name="Conector de seta reta 22"/>
+          <p:cNvCxnSpPr>
+            <a:endCxn id="16" idx="1"/>
+          </p:cNvCxnSpPr>
+          <p:nvPr/>
+        </p:nvCxnSpPr>
+        <p:spPr>
+          <a:xfrm>
+            <a:off x="2843808" y="4869160"/>
+            <a:ext cx="504056" cy="684076"/>
+          </a:xfrm>
+          <a:prstGeom prst="straightConnector1">
+            <a:avLst/>
+          </a:prstGeom>
+          <a:ln>
+            <a:solidFill>
+              <a:srgbClr val="FF0000"/>
+            </a:solidFill>
+            <a:tailEnd type="arrow"/>
+          </a:ln>
+        </p:spPr>
+        <p:style>
+          <a:lnRef idx="1">
+            <a:schemeClr val="accent1"/>
+          </a:lnRef>
+          <a:fillRef idx="0">
+            <a:schemeClr val="accent1"/>
+          </a:fillRef>
+          <a:effectRef idx="0">
+            <a:schemeClr val="accent1"/>
+          </a:effectRef>
+          <a:fontRef idx="minor">
+            <a:schemeClr val="tx1"/>
+          </a:fontRef>
+        </p:style>
+      </p:cxnSp>
+      <p:sp>
+        <p:nvSpPr>
+          <p:cNvPr id="2" name="Título 1"/>
+          <p:cNvSpPr>
+            <a:spLocks noGrp="1"/>
+          </p:cNvSpPr>
+          <p:nvPr>
+            <p:ph type="title"/>
+          </p:nvPr>
+        </p:nvSpPr>
+        <p:spPr>
+          <a:xfrm>
+            <a:off x="457200" y="116632"/>
+            <a:ext cx="8229600" cy="1143000"/>
+          </a:xfrm>
+        </p:spPr>
+        <p:txBody>
+          <a:bodyPr>
+            <a:normAutofit fontScale="90000"/>
+          </a:bodyPr>
+          <a:lstStyle/>
+          <a:p>
+            <a:r>
+              <a:rPr lang="en-US" dirty="0" err="1" smtClean="0"/>
+              <a:t>Calculara</a:t>
+            </a:r>
+            <a:r>
+              <a:rPr lang="en-US" dirty="0" smtClean="0"/>
+              <a:t> de </a:t>
+            </a:r>
+            <a:r>
+              <a:rPr lang="en-US" dirty="0" err="1" smtClean="0"/>
+              <a:t>Buteco</a:t>
+            </a:r>
+            <a:r>
+              <a:rPr lang="en-US" dirty="0" smtClean="0"/>
+              <a:t> – MENU INICIAL</a:t>
+            </a:r>
+            <a:endParaRPr lang="pt-BR" dirty="0"/>
+          </a:p>
+        </p:txBody>
+      </p:sp>
+      <p:pic>
+        <p:nvPicPr>
+          <p:cNvPr id="7" name="Imagem 6" descr="tela1.png"/>
+          <p:cNvPicPr>
+            <a:picLocks noChangeAspect="1"/>
+          </p:cNvPicPr>
+          <p:nvPr/>
+        </p:nvPicPr>
+        <p:blipFill>
+          <a:blip r:embed="rId2" cstate="print"/>
+          <a:stretch>
+            <a:fillRect/>
+          </a:stretch>
+        </p:blipFill>
+        <p:spPr>
+          <a:xfrm>
+            <a:off x="72052" y="1916832"/>
+            <a:ext cx="2921496" cy="4869160"/>
+          </a:xfrm>
+          <a:prstGeom prst="rect">
+            <a:avLst/>
+          </a:prstGeom>
+          <a:ln>
+            <a:noFill/>
+          </a:ln>
+          <a:effectLst>
+            <a:outerShdw blurRad="292100" dist="139700" dir="2700000" algn="tl" rotWithShape="0">
+              <a:srgbClr val="333333">
+                <a:alpha val="65000"/>
+              </a:srgbClr>
+            </a:outerShdw>
+          </a:effectLst>
+        </p:spPr>
+      </p:pic>
+      <p:sp>
+        <p:nvSpPr>
+          <p:cNvPr id="10" name="Retângulo de cantos arredondados 9"/>
+          <p:cNvSpPr/>
+          <p:nvPr/>
+        </p:nvSpPr>
+        <p:spPr>
+          <a:xfrm>
+            <a:off x="971600" y="1296896"/>
+            <a:ext cx="1152128" cy="576064"/>
+          </a:xfrm>
+          <a:prstGeom prst="roundRect">
+            <a:avLst/>
+          </a:prstGeom>
+        </p:spPr>
+        <p:style>
+          <a:lnRef idx="2">
+            <a:schemeClr val="accent1">
+              <a:shade val="50000"/>
+            </a:schemeClr>
+          </a:lnRef>
+          <a:fillRef idx="1">
+            <a:schemeClr val="accent1"/>
+          </a:fillRef>
+          <a:effectRef idx="0">
+            <a:schemeClr val="accent1"/>
+          </a:effectRef>
+          <a:fontRef idx="minor">
+            <a:schemeClr val="lt1"/>
+          </a:fontRef>
+        </p:style>
+        <p:txBody>
+          <a:bodyPr rtlCol="0" anchor="ctr"/>
+          <a:lstStyle/>
+          <a:p>
+            <a:pPr algn="ctr"/>
+            <a:r>
+              <a:rPr lang="en-US" sz="3600" dirty="0" smtClean="0"/>
+              <a:t>1</a:t>
+            </a:r>
+            <a:endParaRPr lang="pt-BR" sz="3600" dirty="0"/>
+          </a:p>
+        </p:txBody>
+      </p:sp>
+      <p:sp>
+        <p:nvSpPr>
+          <p:cNvPr id="13" name="Retângulo de cantos arredondados 12"/>
+          <p:cNvSpPr/>
+          <p:nvPr/>
+        </p:nvSpPr>
+        <p:spPr>
+          <a:xfrm>
+            <a:off x="3333796" y="2708920"/>
+            <a:ext cx="5544616" cy="648072"/>
+          </a:xfrm>
+          <a:prstGeom prst="roundRect">
+            <a:avLst/>
+          </a:prstGeom>
+        </p:spPr>
+        <p:style>
+          <a:lnRef idx="1">
+            <a:schemeClr val="accent2"/>
+          </a:lnRef>
+          <a:fillRef idx="2">
+            <a:schemeClr val="accent2"/>
+          </a:fillRef>
+          <a:effectRef idx="1">
+            <a:schemeClr val="accent2"/>
+          </a:effectRef>
+          <a:fontRef idx="minor">
+            <a:schemeClr val="dk1"/>
+          </a:fontRef>
+        </p:style>
+        <p:txBody>
+          <a:bodyPr rtlCol="0" anchor="ctr"/>
+          <a:lstStyle/>
+          <a:p>
+            <a:r>
+              <a:rPr lang="en-US" dirty="0" smtClean="0"/>
+              <a:t>SCREEN 1 – </a:t>
+            </a:r>
+            <a:r>
+              <a:rPr lang="en-US" dirty="0" err="1" smtClean="0"/>
+              <a:t>Adicionar</a:t>
+            </a:r>
+            <a:r>
+              <a:rPr lang="en-US" dirty="0" smtClean="0"/>
+              <a:t> </a:t>
+            </a:r>
+            <a:r>
+              <a:rPr lang="en-US" dirty="0" err="1" smtClean="0"/>
+              <a:t>pessoas</a:t>
+            </a:r>
+            <a:r>
+              <a:rPr lang="en-US" dirty="0" smtClean="0"/>
+              <a:t> </a:t>
+            </a:r>
+            <a:r>
+              <a:rPr lang="en-US" dirty="0" err="1" smtClean="0"/>
+              <a:t>que</a:t>
+            </a:r>
+            <a:r>
+              <a:rPr lang="en-US" dirty="0" smtClean="0"/>
+              <a:t> </a:t>
+            </a:r>
+            <a:r>
+              <a:rPr lang="en-US" dirty="0" err="1" smtClean="0"/>
+              <a:t>estão</a:t>
+            </a:r>
+            <a:r>
+              <a:rPr lang="en-US" dirty="0" smtClean="0"/>
+              <a:t> </a:t>
+            </a:r>
+            <a:r>
+              <a:rPr lang="en-US" dirty="0" err="1" smtClean="0"/>
+              <a:t>consumindo</a:t>
+            </a:r>
+            <a:endParaRPr lang="pt-BR" dirty="0"/>
+          </a:p>
+        </p:txBody>
+      </p:sp>
+      <p:sp>
+        <p:nvSpPr>
+          <p:cNvPr id="14" name="Retângulo de cantos arredondados 13"/>
+          <p:cNvSpPr/>
+          <p:nvPr/>
+        </p:nvSpPr>
+        <p:spPr>
+          <a:xfrm>
+            <a:off x="3347864" y="3573016"/>
+            <a:ext cx="5544616" cy="648072"/>
+          </a:xfrm>
+          <a:prstGeom prst="roundRect">
+            <a:avLst/>
+          </a:prstGeom>
+        </p:spPr>
+        <p:style>
+          <a:lnRef idx="1">
+            <a:schemeClr val="accent2"/>
+          </a:lnRef>
+          <a:fillRef idx="2">
+            <a:schemeClr val="accent2"/>
+          </a:fillRef>
+          <a:effectRef idx="1">
+            <a:schemeClr val="accent2"/>
+          </a:effectRef>
+          <a:fontRef idx="minor">
+            <a:schemeClr val="dk1"/>
+          </a:fontRef>
+        </p:style>
+        <p:txBody>
+          <a:bodyPr rtlCol="0" anchor="ctr"/>
+          <a:lstStyle/>
+          <a:p>
+            <a:r>
+              <a:rPr lang="en-US" dirty="0" smtClean="0"/>
+              <a:t>SCREEN 2 – </a:t>
+            </a:r>
+            <a:r>
+              <a:rPr lang="en-US" dirty="0" err="1" smtClean="0"/>
+              <a:t>Adicionar</a:t>
+            </a:r>
+            <a:r>
+              <a:rPr lang="en-US" dirty="0" smtClean="0"/>
+              <a:t> items </a:t>
+            </a:r>
+            <a:r>
+              <a:rPr lang="en-US" dirty="0" err="1" smtClean="0"/>
+              <a:t>que</a:t>
+            </a:r>
+            <a:r>
+              <a:rPr lang="en-US" dirty="0" smtClean="0"/>
+              <a:t> </a:t>
+            </a:r>
+            <a:r>
+              <a:rPr lang="en-US" dirty="0" err="1" smtClean="0"/>
+              <a:t>foram</a:t>
+            </a:r>
+            <a:r>
+              <a:rPr lang="en-US" dirty="0" smtClean="0"/>
+              <a:t> </a:t>
+            </a:r>
+            <a:r>
+              <a:rPr lang="en-US" dirty="0" err="1" smtClean="0"/>
+              <a:t>consumidos</a:t>
+            </a:r>
+            <a:endParaRPr lang="pt-BR" dirty="0"/>
+          </a:p>
+        </p:txBody>
+      </p:sp>
+      <p:sp>
+        <p:nvSpPr>
+          <p:cNvPr id="15" name="Retângulo de cantos arredondados 14"/>
+          <p:cNvSpPr/>
+          <p:nvPr/>
+        </p:nvSpPr>
+        <p:spPr>
+          <a:xfrm>
+            <a:off x="3347864" y="4437112"/>
+            <a:ext cx="5545232" cy="648072"/>
+          </a:xfrm>
+          <a:prstGeom prst="roundRect">
+            <a:avLst/>
+          </a:prstGeom>
+        </p:spPr>
+        <p:style>
+          <a:lnRef idx="1">
+            <a:schemeClr val="accent2"/>
+          </a:lnRef>
+          <a:fillRef idx="2">
+            <a:schemeClr val="accent2"/>
+          </a:fillRef>
+          <a:effectRef idx="1">
+            <a:schemeClr val="accent2"/>
+          </a:effectRef>
+          <a:fontRef idx="minor">
+            <a:schemeClr val="dk1"/>
+          </a:fontRef>
+        </p:style>
+        <p:txBody>
+          <a:bodyPr rtlCol="0" anchor="ctr"/>
+          <a:lstStyle/>
+          <a:p>
+            <a:r>
+              <a:rPr lang="en-US" dirty="0" smtClean="0"/>
+              <a:t>SCREEN 3 – </a:t>
+            </a:r>
+            <a:r>
+              <a:rPr lang="en-US" dirty="0" err="1" smtClean="0"/>
+              <a:t>Assinalar</a:t>
+            </a:r>
+            <a:r>
+              <a:rPr lang="en-US" dirty="0" smtClean="0"/>
+              <a:t> </a:t>
+            </a:r>
+            <a:r>
+              <a:rPr lang="en-US" dirty="0" err="1" smtClean="0"/>
+              <a:t>pessoas</a:t>
+            </a:r>
+            <a:r>
+              <a:rPr lang="en-US" dirty="0" smtClean="0"/>
+              <a:t> e </a:t>
+            </a:r>
+            <a:r>
+              <a:rPr lang="en-US" dirty="0" err="1" smtClean="0"/>
+              <a:t>itens</a:t>
+            </a:r>
+            <a:r>
+              <a:rPr lang="en-US" dirty="0" smtClean="0"/>
+              <a:t> </a:t>
+            </a:r>
+            <a:r>
+              <a:rPr lang="en-US" dirty="0" err="1" smtClean="0"/>
+              <a:t>consumidos</a:t>
+            </a:r>
+            <a:r>
+              <a:rPr lang="en-US" dirty="0" smtClean="0"/>
+              <a:t> </a:t>
+            </a:r>
+            <a:r>
+              <a:rPr lang="en-US" dirty="0" err="1" smtClean="0"/>
+              <a:t>por</a:t>
+            </a:r>
+            <a:r>
+              <a:rPr lang="en-US" dirty="0" smtClean="0"/>
+              <a:t> </a:t>
+            </a:r>
+            <a:r>
+              <a:rPr lang="en-US" dirty="0" err="1" smtClean="0"/>
+              <a:t>cada</a:t>
+            </a:r>
+            <a:r>
+              <a:rPr lang="en-US" dirty="0" smtClean="0"/>
+              <a:t> </a:t>
+            </a:r>
+            <a:r>
+              <a:rPr lang="en-US" dirty="0" err="1" smtClean="0"/>
+              <a:t>uma</a:t>
+            </a:r>
+            <a:r>
+              <a:rPr lang="en-US" dirty="0" smtClean="0"/>
+              <a:t> </a:t>
+            </a:r>
+            <a:r>
+              <a:rPr lang="en-US" dirty="0" err="1" smtClean="0"/>
+              <a:t>delas</a:t>
+            </a:r>
+            <a:endParaRPr lang="pt-BR" dirty="0"/>
+          </a:p>
+        </p:txBody>
+      </p:sp>
+      <p:sp>
+        <p:nvSpPr>
+          <p:cNvPr id="16" name="Retângulo de cantos arredondados 15"/>
+          <p:cNvSpPr/>
+          <p:nvPr/>
+        </p:nvSpPr>
+        <p:spPr>
+          <a:xfrm>
+            <a:off x="3347864" y="5229200"/>
+            <a:ext cx="5544616" cy="648072"/>
+          </a:xfrm>
+          <a:prstGeom prst="roundRect">
+            <a:avLst/>
+          </a:prstGeom>
+        </p:spPr>
+        <p:style>
+          <a:lnRef idx="1">
+            <a:schemeClr val="accent2"/>
+          </a:lnRef>
+          <a:fillRef idx="2">
+            <a:schemeClr val="accent2"/>
+          </a:fillRef>
+          <a:effectRef idx="1">
+            <a:schemeClr val="accent2"/>
+          </a:effectRef>
+          <a:fontRef idx="minor">
+            <a:schemeClr val="dk1"/>
+          </a:fontRef>
+        </p:style>
+        <p:txBody>
+          <a:bodyPr rtlCol="0" anchor="ctr"/>
+          <a:lstStyle/>
+          <a:p>
+            <a:r>
+              <a:rPr lang="en-US" dirty="0" smtClean="0"/>
+              <a:t>SCREEN 4 – </a:t>
+            </a:r>
+            <a:r>
+              <a:rPr lang="en-US" dirty="0" err="1" smtClean="0"/>
+              <a:t>Fazer</a:t>
+            </a:r>
+            <a:r>
+              <a:rPr lang="en-US" dirty="0" smtClean="0"/>
+              <a:t> o </a:t>
+            </a:r>
+            <a:r>
+              <a:rPr lang="en-US" dirty="0" err="1" smtClean="0"/>
+              <a:t>cálculo</a:t>
+            </a:r>
+            <a:r>
+              <a:rPr lang="en-US" dirty="0" smtClean="0"/>
+              <a:t> e </a:t>
+            </a:r>
+            <a:r>
+              <a:rPr lang="en-US" dirty="0" err="1" smtClean="0"/>
+              <a:t>exibir</a:t>
+            </a:r>
+            <a:r>
+              <a:rPr lang="en-US" dirty="0" smtClean="0"/>
+              <a:t> o </a:t>
+            </a:r>
+            <a:r>
+              <a:rPr lang="en-US" dirty="0" err="1" smtClean="0"/>
+              <a:t>resultado</a:t>
+            </a:r>
+            <a:r>
+              <a:rPr lang="en-US" dirty="0" smtClean="0"/>
+              <a:t> </a:t>
+            </a:r>
+            <a:r>
+              <a:rPr lang="en-US" dirty="0" err="1" smtClean="0"/>
+              <a:t>por</a:t>
+            </a:r>
+            <a:r>
+              <a:rPr lang="en-US" dirty="0" smtClean="0"/>
+              <a:t> </a:t>
+            </a:r>
+            <a:r>
+              <a:rPr lang="en-US" dirty="0" err="1" smtClean="0"/>
+              <a:t>pessoa</a:t>
+            </a:r>
+            <a:r>
+              <a:rPr lang="en-US" dirty="0" smtClean="0"/>
+              <a:t>.</a:t>
+            </a:r>
+            <a:endParaRPr lang="pt-BR" dirty="0"/>
+          </a:p>
+        </p:txBody>
+      </p:sp>
+    </p:spTree>
+  </p:cSld>
+  <p:clrMapOvr>
+    <a:masterClrMapping/>
+  </p:clrMapOvr>
+  <p:timing>
+    <p:tnLst>
+      <p:par>
+        <p:cTn id="1" dur="indefinite" restart="never" nodeType="tmRoot"/>
+      </p:par>
+    </p:tnLst>
+  </p:timing>
+</p:sld>
+</file>
+
+<file path=ppt/slides/slide11.xml><?xml version="1.0" encoding="utf-8"?>
+<p:sld xmlns:a="http://schemas.openxmlformats.org/drawingml/2006/main" xmlns:r="http://schemas.openxmlformats.org/officeDocument/2006/relationships" xmlns:p="http://schemas.openxmlformats.org/presentationml/2006/main">
+  <p:cSld>
+    <p:spTree>
+      <p:nvGrpSpPr>
+        <p:cNvPr id="1" name=""/>
+        <p:cNvGrpSpPr/>
+        <p:nvPr/>
+      </p:nvGrpSpPr>
+      <p:grpSpPr>
+        <a:xfrm>
+          <a:off x="0" y="0"/>
+          <a:ext cx="0" cy="0"/>
+          <a:chOff x="0" y="0"/>
+          <a:chExt cx="0" cy="0"/>
+        </a:xfrm>
+      </p:grpSpPr>
+      <p:sp>
+        <p:nvSpPr>
+          <p:cNvPr id="2" name="Título 1"/>
+          <p:cNvSpPr>
+            <a:spLocks noGrp="1"/>
+          </p:cNvSpPr>
+          <p:nvPr>
+            <p:ph type="title"/>
+          </p:nvPr>
+        </p:nvSpPr>
+        <p:spPr>
+          <a:xfrm>
+            <a:off x="457200" y="116632"/>
+            <a:ext cx="8229600" cy="1143000"/>
+          </a:xfrm>
+        </p:spPr>
+        <p:txBody>
+          <a:bodyPr>
+            <a:normAutofit fontScale="90000"/>
+          </a:bodyPr>
+          <a:lstStyle/>
+          <a:p>
+            <a:r>
+              <a:rPr lang="en-US" dirty="0" err="1" smtClean="0"/>
+              <a:t>Calculara</a:t>
+            </a:r>
+            <a:r>
+              <a:rPr lang="en-US" dirty="0" smtClean="0"/>
+              <a:t> de </a:t>
+            </a:r>
+            <a:r>
+              <a:rPr lang="en-US" dirty="0" err="1" smtClean="0"/>
+              <a:t>Buteco</a:t>
+            </a:r>
+            <a:r>
+              <a:rPr lang="en-US" dirty="0" smtClean="0"/>
+              <a:t> – SCREEN 1</a:t>
+            </a:r>
+            <a:br>
+              <a:rPr lang="en-US" dirty="0" smtClean="0"/>
+            </a:br>
+            <a:r>
+              <a:rPr lang="en-US" dirty="0" err="1" smtClean="0"/>
+              <a:t>Adicionar</a:t>
+            </a:r>
+            <a:r>
+              <a:rPr lang="en-US" dirty="0" smtClean="0"/>
+              <a:t> Pessoa</a:t>
+            </a:r>
+            <a:endParaRPr lang="pt-BR" dirty="0"/>
+          </a:p>
+        </p:txBody>
+      </p:sp>
+      <p:pic>
+        <p:nvPicPr>
+          <p:cNvPr id="7" name="Imagem 6" descr="tela1.png"/>
+          <p:cNvPicPr>
+            <a:picLocks noChangeAspect="1"/>
+          </p:cNvPicPr>
+          <p:nvPr/>
+        </p:nvPicPr>
+        <p:blipFill>
+          <a:blip r:embed="rId2" cstate="print"/>
+          <a:stretch>
+            <a:fillRect/>
+          </a:stretch>
+        </p:blipFill>
+        <p:spPr>
+          <a:xfrm>
+            <a:off x="72052" y="1916832"/>
+            <a:ext cx="2921496" cy="4869160"/>
+          </a:xfrm>
+          <a:prstGeom prst="rect">
+            <a:avLst/>
+          </a:prstGeom>
+          <a:ln>
+            <a:noFill/>
+          </a:ln>
+          <a:effectLst>
+            <a:outerShdw blurRad="292100" dist="139700" dir="2700000" algn="tl" rotWithShape="0">
+              <a:srgbClr val="333333">
+                <a:alpha val="65000"/>
+              </a:srgbClr>
+            </a:outerShdw>
+          </a:effectLst>
+        </p:spPr>
+      </p:pic>
+      <p:pic>
+        <p:nvPicPr>
+          <p:cNvPr id="8" name="Imagem 7" descr="tela20.png"/>
+          <p:cNvPicPr>
+            <a:picLocks noChangeAspect="1"/>
+          </p:cNvPicPr>
+          <p:nvPr/>
+        </p:nvPicPr>
+        <p:blipFill>
+          <a:blip r:embed="rId3" cstate="print"/>
+          <a:stretch>
+            <a:fillRect/>
+          </a:stretch>
+        </p:blipFill>
+        <p:spPr>
+          <a:xfrm>
+            <a:off x="3089680" y="1916832"/>
+            <a:ext cx="2922480" cy="4870800"/>
+          </a:xfrm>
+          <a:prstGeom prst="rect">
+            <a:avLst/>
+          </a:prstGeom>
+          <a:ln>
+            <a:noFill/>
+          </a:ln>
+          <a:effectLst>
+            <a:outerShdw blurRad="292100" dist="139700" dir="2700000" algn="tl" rotWithShape="0">
+              <a:srgbClr val="333333">
+                <a:alpha val="65000"/>
+              </a:srgbClr>
+            </a:outerShdw>
+          </a:effectLst>
+        </p:spPr>
+      </p:pic>
+      <p:pic>
+        <p:nvPicPr>
+          <p:cNvPr id="9" name="Imagem 8" descr="tela21.png"/>
+          <p:cNvPicPr>
+            <a:picLocks noChangeAspect="1"/>
+          </p:cNvPicPr>
+          <p:nvPr/>
+        </p:nvPicPr>
+        <p:blipFill>
+          <a:blip r:embed="rId4" cstate="print"/>
+          <a:stretch>
+            <a:fillRect/>
+          </a:stretch>
+        </p:blipFill>
+        <p:spPr>
+          <a:xfrm>
+            <a:off x="6114016" y="1916832"/>
+            <a:ext cx="2922480" cy="4870800"/>
+          </a:xfrm>
+          <a:prstGeom prst="rect">
+            <a:avLst/>
+          </a:prstGeom>
+          <a:ln>
+            <a:noFill/>
+          </a:ln>
+          <a:effectLst>
+            <a:outerShdw blurRad="292100" dist="139700" dir="2700000" algn="tl" rotWithShape="0">
+              <a:srgbClr val="333333">
+                <a:alpha val="65000"/>
+              </a:srgbClr>
+            </a:outerShdw>
+          </a:effectLst>
+        </p:spPr>
+      </p:pic>
+      <p:sp>
+        <p:nvSpPr>
+          <p:cNvPr id="10" name="Retângulo de cantos arredondados 9"/>
+          <p:cNvSpPr/>
+          <p:nvPr/>
+        </p:nvSpPr>
+        <p:spPr>
+          <a:xfrm>
+            <a:off x="971600" y="1296896"/>
+            <a:ext cx="1152128" cy="576064"/>
+          </a:xfrm>
+          <a:prstGeom prst="roundRect">
+            <a:avLst/>
+          </a:prstGeom>
+        </p:spPr>
+        <p:style>
+          <a:lnRef idx="2">
+            <a:schemeClr val="accent1">
+              <a:shade val="50000"/>
+            </a:schemeClr>
+          </a:lnRef>
+          <a:fillRef idx="1">
+            <a:schemeClr val="accent1"/>
+          </a:fillRef>
+          <a:effectRef idx="0">
+            <a:schemeClr val="accent1"/>
+          </a:effectRef>
+          <a:fontRef idx="minor">
+            <a:schemeClr val="lt1"/>
+          </a:fontRef>
+        </p:style>
+        <p:txBody>
+          <a:bodyPr rtlCol="0" anchor="ctr"/>
+          <a:lstStyle/>
+          <a:p>
+            <a:pPr algn="ctr"/>
+            <a:r>
+              <a:rPr lang="en-US" sz="3600" dirty="0" smtClean="0"/>
+              <a:t>1</a:t>
+            </a:r>
+            <a:endParaRPr lang="pt-BR" sz="3600" dirty="0"/>
+          </a:p>
+        </p:txBody>
+      </p:sp>
+      <p:sp>
+        <p:nvSpPr>
+          <p:cNvPr id="11" name="Retângulo de cantos arredondados 10"/>
+          <p:cNvSpPr/>
+          <p:nvPr/>
+        </p:nvSpPr>
+        <p:spPr>
+          <a:xfrm>
+            <a:off x="3851920" y="1296896"/>
+            <a:ext cx="1152128" cy="576064"/>
+          </a:xfrm>
+          <a:prstGeom prst="roundRect">
+            <a:avLst/>
+          </a:prstGeom>
+        </p:spPr>
+        <p:style>
+          <a:lnRef idx="2">
+            <a:schemeClr val="accent1">
+              <a:shade val="50000"/>
+            </a:schemeClr>
+          </a:lnRef>
+          <a:fillRef idx="1">
+            <a:schemeClr val="accent1"/>
+          </a:fillRef>
+          <a:effectRef idx="0">
+            <a:schemeClr val="accent1"/>
+          </a:effectRef>
+          <a:fontRef idx="minor">
+            <a:schemeClr val="lt1"/>
+          </a:fontRef>
+        </p:style>
+        <p:txBody>
+          <a:bodyPr rtlCol="0" anchor="ctr"/>
+          <a:lstStyle/>
+          <a:p>
+            <a:pPr algn="ctr"/>
+            <a:r>
+              <a:rPr lang="en-US" sz="3600" dirty="0" smtClean="0"/>
+              <a:t>2</a:t>
+            </a:r>
+            <a:endParaRPr lang="pt-BR" sz="3600" dirty="0"/>
+          </a:p>
+        </p:txBody>
+      </p:sp>
+      <p:sp>
+        <p:nvSpPr>
+          <p:cNvPr id="12" name="Retângulo de cantos arredondados 11"/>
+          <p:cNvSpPr/>
+          <p:nvPr/>
+        </p:nvSpPr>
+        <p:spPr>
+          <a:xfrm>
+            <a:off x="7092280" y="1282828"/>
+            <a:ext cx="1152128" cy="576064"/>
+          </a:xfrm>
+          <a:prstGeom prst="roundRect">
+            <a:avLst/>
+          </a:prstGeom>
+        </p:spPr>
+        <p:style>
+          <a:lnRef idx="2">
+            <a:schemeClr val="accent1">
+              <a:shade val="50000"/>
+            </a:schemeClr>
+          </a:lnRef>
+          <a:fillRef idx="1">
+            <a:schemeClr val="accent1"/>
+          </a:fillRef>
+          <a:effectRef idx="0">
+            <a:schemeClr val="accent1"/>
+          </a:effectRef>
+          <a:fontRef idx="minor">
+            <a:schemeClr val="lt1"/>
+          </a:fontRef>
+        </p:style>
+        <p:txBody>
+          <a:bodyPr rtlCol="0" anchor="ctr"/>
+          <a:lstStyle/>
+          <a:p>
+            <a:pPr algn="ctr"/>
+            <a:r>
+              <a:rPr lang="en-US" sz="3600" dirty="0" smtClean="0"/>
+              <a:t>3</a:t>
+            </a:r>
+            <a:endParaRPr lang="pt-BR" sz="3600" dirty="0"/>
+          </a:p>
+        </p:txBody>
+      </p:sp>
+    </p:spTree>
+  </p:cSld>
+  <p:clrMapOvr>
+    <a:masterClrMapping/>
+  </p:clrMapOvr>
+  <p:timing>
+    <p:tnLst>
+      <p:par>
+        <p:cTn id="1" dur="indefinite" restart="never" nodeType="tmRoot"/>
+      </p:par>
+    </p:tnLst>
+  </p:timing>
+</p:sld>
+</file>
+
+<file path=ppt/slides/slide12.xml><?xml version="1.0" encoding="utf-8"?>
+<p:sld xmlns:a="http://schemas.openxmlformats.org/drawingml/2006/main" xmlns:r="http://schemas.openxmlformats.org/officeDocument/2006/relationships" xmlns:p="http://schemas.openxmlformats.org/presentationml/2006/main">
+  <p:cSld>
+    <p:spTree>
+      <p:nvGrpSpPr>
+        <p:cNvPr id="1" name=""/>
+        <p:cNvGrpSpPr/>
+        <p:nvPr/>
+      </p:nvGrpSpPr>
+      <p:grpSpPr>
+        <a:xfrm>
+          <a:off x="0" y="0"/>
+          <a:ext cx="0" cy="0"/>
+          <a:chOff x="0" y="0"/>
+          <a:chExt cx="0" cy="0"/>
+        </a:xfrm>
+      </p:grpSpPr>
+      <p:sp>
+        <p:nvSpPr>
+          <p:cNvPr id="2" name="Título 1"/>
+          <p:cNvSpPr>
+            <a:spLocks noGrp="1"/>
+          </p:cNvSpPr>
+          <p:nvPr>
+            <p:ph type="title"/>
+          </p:nvPr>
+        </p:nvSpPr>
+        <p:spPr>
+          <a:xfrm>
+            <a:off x="457200" y="116632"/>
+            <a:ext cx="8229600" cy="1143000"/>
+          </a:xfrm>
+        </p:spPr>
+        <p:txBody>
+          <a:bodyPr>
+            <a:normAutofit/>
+          </a:bodyPr>
+          <a:lstStyle/>
+          <a:p>
+            <a:r>
+              <a:rPr lang="en-US" dirty="0" err="1" smtClean="0"/>
+              <a:t>Calculara</a:t>
+            </a:r>
+            <a:r>
+              <a:rPr lang="en-US" dirty="0" smtClean="0"/>
+              <a:t> de </a:t>
+            </a:r>
+            <a:r>
+              <a:rPr lang="en-US" dirty="0" err="1" smtClean="0"/>
+              <a:t>Buteco</a:t>
+            </a:r>
+            <a:r>
+              <a:rPr lang="en-US" dirty="0" smtClean="0"/>
+              <a:t> – SCREEN 2</a:t>
+            </a:r>
+            <a:endParaRPr lang="pt-BR" dirty="0"/>
+          </a:p>
+        </p:txBody>
+      </p:sp>
+      <p:pic>
+        <p:nvPicPr>
+          <p:cNvPr id="7" name="Imagem 6" descr="tela1.png"/>
+          <p:cNvPicPr>
+            <a:picLocks noChangeAspect="1"/>
+          </p:cNvPicPr>
+          <p:nvPr/>
+        </p:nvPicPr>
+        <p:blipFill>
+          <a:blip r:embed="rId2" cstate="print"/>
+          <a:stretch>
+            <a:fillRect/>
+          </a:stretch>
+        </p:blipFill>
+        <p:spPr>
+          <a:xfrm>
+            <a:off x="72052" y="1916832"/>
+            <a:ext cx="2921496" cy="4869160"/>
+          </a:xfrm>
+          <a:prstGeom prst="rect">
+            <a:avLst/>
+          </a:prstGeom>
+          <a:ln>
+            <a:noFill/>
+          </a:ln>
+          <a:effectLst>
+            <a:outerShdw blurRad="292100" dist="139700" dir="2700000" algn="tl" rotWithShape="0">
+              <a:srgbClr val="333333">
+                <a:alpha val="65000"/>
+              </a:srgbClr>
+            </a:outerShdw>
+          </a:effectLst>
+        </p:spPr>
+      </p:pic>
+      <p:sp>
+        <p:nvSpPr>
+          <p:cNvPr id="10" name="Retângulo de cantos arredondados 9"/>
+          <p:cNvSpPr/>
+          <p:nvPr/>
+        </p:nvSpPr>
+        <p:spPr>
+          <a:xfrm>
+            <a:off x="971600" y="1296896"/>
+            <a:ext cx="1152128" cy="576064"/>
+          </a:xfrm>
+          <a:prstGeom prst="roundRect">
+            <a:avLst/>
+          </a:prstGeom>
+        </p:spPr>
+        <p:style>
+          <a:lnRef idx="2">
+            <a:schemeClr val="accent1">
+              <a:shade val="50000"/>
+            </a:schemeClr>
+          </a:lnRef>
+          <a:fillRef idx="1">
+            <a:schemeClr val="accent1"/>
+          </a:fillRef>
+          <a:effectRef idx="0">
+            <a:schemeClr val="accent1"/>
+          </a:effectRef>
+          <a:fontRef idx="minor">
+            <a:schemeClr val="lt1"/>
+          </a:fontRef>
+        </p:style>
+        <p:txBody>
+          <a:bodyPr rtlCol="0" anchor="ctr"/>
+          <a:lstStyle/>
+          <a:p>
+            <a:pPr algn="ctr"/>
+            <a:r>
+              <a:rPr lang="en-US" sz="3600" dirty="0" smtClean="0"/>
+              <a:t>1</a:t>
+            </a:r>
+            <a:endParaRPr lang="pt-BR" sz="3600" dirty="0"/>
+          </a:p>
+        </p:txBody>
+      </p:sp>
+      <p:sp>
+        <p:nvSpPr>
+          <p:cNvPr id="11" name="Retângulo de cantos arredondados 10"/>
+          <p:cNvSpPr/>
+          <p:nvPr/>
+        </p:nvSpPr>
+        <p:spPr>
+          <a:xfrm>
+            <a:off x="3851920" y="1296896"/>
+            <a:ext cx="1152128" cy="576064"/>
+          </a:xfrm>
+          <a:prstGeom prst="roundRect">
+            <a:avLst/>
+          </a:prstGeom>
+        </p:spPr>
+        <p:style>
+          <a:lnRef idx="2">
+            <a:schemeClr val="accent1">
+              <a:shade val="50000"/>
+            </a:schemeClr>
+          </a:lnRef>
+          <a:fillRef idx="1">
+            <a:schemeClr val="accent1"/>
+          </a:fillRef>
+          <a:effectRef idx="0">
+            <a:schemeClr val="accent1"/>
+          </a:effectRef>
+          <a:fontRef idx="minor">
+            <a:schemeClr val="lt1"/>
+          </a:fontRef>
+        </p:style>
+        <p:txBody>
+          <a:bodyPr rtlCol="0" anchor="ctr"/>
+          <a:lstStyle/>
+          <a:p>
+            <a:pPr algn="ctr"/>
+            <a:r>
+              <a:rPr lang="en-US" sz="3600" dirty="0" smtClean="0"/>
+              <a:t>2</a:t>
+            </a:r>
+            <a:endParaRPr lang="pt-BR" sz="3600" dirty="0"/>
+          </a:p>
+        </p:txBody>
+      </p:sp>
+      <p:sp>
+        <p:nvSpPr>
+          <p:cNvPr id="12" name="Retângulo de cantos arredondados 11"/>
+          <p:cNvSpPr/>
+          <p:nvPr/>
+        </p:nvSpPr>
+        <p:spPr>
+          <a:xfrm>
+            <a:off x="7092280" y="1282828"/>
+            <a:ext cx="1152128" cy="576064"/>
+          </a:xfrm>
+          <a:prstGeom prst="roundRect">
+            <a:avLst/>
+          </a:prstGeom>
+        </p:spPr>
+        <p:style>
+          <a:lnRef idx="2">
+            <a:schemeClr val="accent1">
+              <a:shade val="50000"/>
+            </a:schemeClr>
+          </a:lnRef>
+          <a:fillRef idx="1">
+            <a:schemeClr val="accent1"/>
+          </a:fillRef>
+          <a:effectRef idx="0">
+            <a:schemeClr val="accent1"/>
+          </a:effectRef>
+          <a:fontRef idx="minor">
+            <a:schemeClr val="lt1"/>
+          </a:fontRef>
+        </p:style>
+        <p:txBody>
+          <a:bodyPr rtlCol="0" anchor="ctr"/>
+          <a:lstStyle/>
+          <a:p>
+            <a:pPr algn="ctr"/>
+            <a:r>
+              <a:rPr lang="en-US" sz="3600" dirty="0" smtClean="0"/>
+              <a:t>3</a:t>
+            </a:r>
+            <a:endParaRPr lang="pt-BR" sz="3600" dirty="0"/>
+          </a:p>
+        </p:txBody>
+      </p:sp>
+      <p:pic>
+        <p:nvPicPr>
+          <p:cNvPr id="13" name="Imagem 12" descr="tela30.png"/>
+          <p:cNvPicPr>
+            <a:picLocks noChangeAspect="1"/>
+          </p:cNvPicPr>
+          <p:nvPr/>
+        </p:nvPicPr>
+        <p:blipFill>
+          <a:blip r:embed="rId3" cstate="print"/>
+          <a:stretch>
+            <a:fillRect/>
+          </a:stretch>
+        </p:blipFill>
+        <p:spPr>
+          <a:xfrm>
+            <a:off x="3131840" y="1914440"/>
+            <a:ext cx="2922480" cy="4870800"/>
+          </a:xfrm>
+          <a:prstGeom prst="rect">
+            <a:avLst/>
+          </a:prstGeom>
+          <a:ln>
+            <a:noFill/>
+          </a:ln>
+          <a:effectLst>
+            <a:outerShdw blurRad="292100" dist="139700" dir="2700000" algn="tl" rotWithShape="0">
+              <a:srgbClr val="333333">
+                <a:alpha val="65000"/>
+              </a:srgbClr>
+            </a:outerShdw>
+          </a:effectLst>
+        </p:spPr>
+      </p:pic>
+      <p:pic>
+        <p:nvPicPr>
+          <p:cNvPr id="14" name="Imagem 13" descr="tela31.png"/>
+          <p:cNvPicPr>
+            <a:picLocks noChangeAspect="1"/>
+          </p:cNvPicPr>
+          <p:nvPr/>
+        </p:nvPicPr>
+        <p:blipFill>
+          <a:blip r:embed="rId4" cstate="print"/>
+          <a:stretch>
+            <a:fillRect/>
+          </a:stretch>
+        </p:blipFill>
+        <p:spPr>
+          <a:xfrm>
+            <a:off x="6171956" y="1912772"/>
+            <a:ext cx="2922480" cy="4870800"/>
+          </a:xfrm>
+          <a:prstGeom prst="rect">
+            <a:avLst/>
+          </a:prstGeom>
+          <a:ln>
+            <a:noFill/>
+          </a:ln>
+          <a:effectLst>
+            <a:outerShdw blurRad="292100" dist="139700" dir="2700000" algn="tl" rotWithShape="0">
+              <a:srgbClr val="333333">
+                <a:alpha val="65000"/>
+              </a:srgbClr>
+            </a:outerShdw>
+          </a:effectLst>
+        </p:spPr>
+      </p:pic>
+    </p:spTree>
+  </p:cSld>
+  <p:clrMapOvr>
+    <a:masterClrMapping/>
+  </p:clrMapOvr>
+  <p:timing>
+    <p:tnLst>
+      <p:par>
+        <p:cTn id="1" dur="indefinite" restart="never" nodeType="tmRoot"/>
+      </p:par>
+    </p:tnLst>
+  </p:timing>
+</p:sld>
+</file>
+
+<file path=ppt/slides/slide13.xml><?xml version="1.0" encoding="utf-8"?>
+<p:sld xmlns:a="http://schemas.openxmlformats.org/drawingml/2006/main" xmlns:r="http://schemas.openxmlformats.org/officeDocument/2006/relationships" xmlns:p="http://schemas.openxmlformats.org/presentationml/2006/main">
+  <p:cSld>
+    <p:spTree>
+      <p:nvGrpSpPr>
+        <p:cNvPr id="1" name=""/>
+        <p:cNvGrpSpPr/>
+        <p:nvPr/>
+      </p:nvGrpSpPr>
+      <p:grpSpPr>
+        <a:xfrm>
+          <a:off x="0" y="0"/>
+          <a:ext cx="0" cy="0"/>
+          <a:chOff x="0" y="0"/>
+          <a:chExt cx="0" cy="0"/>
+        </a:xfrm>
+      </p:grpSpPr>
+      <p:pic>
+        <p:nvPicPr>
+          <p:cNvPr id="7" name="Imagem 6" descr="tela1.png"/>
+          <p:cNvPicPr>
+            <a:picLocks noChangeAspect="1"/>
+          </p:cNvPicPr>
+          <p:nvPr/>
+        </p:nvPicPr>
+        <p:blipFill>
+          <a:blip r:embed="rId2" cstate="print"/>
+          <a:stretch>
+            <a:fillRect/>
+          </a:stretch>
+        </p:blipFill>
+        <p:spPr>
+          <a:xfrm>
+            <a:off x="786408" y="1916832"/>
+            <a:ext cx="2921496" cy="4869160"/>
+          </a:xfrm>
+          <a:prstGeom prst="rect">
+            <a:avLst/>
+          </a:prstGeom>
+          <a:ln>
+            <a:noFill/>
+          </a:ln>
+          <a:effectLst>
+            <a:outerShdw blurRad="292100" dist="139700" dir="2700000" algn="tl" rotWithShape="0">
+              <a:srgbClr val="333333">
+                <a:alpha val="65000"/>
+              </a:srgbClr>
+            </a:outerShdw>
+          </a:effectLst>
+        </p:spPr>
+      </p:pic>
+      <p:sp>
+        <p:nvSpPr>
+          <p:cNvPr id="10" name="Retângulo de cantos arredondados 9"/>
+          <p:cNvSpPr/>
+          <p:nvPr/>
+        </p:nvSpPr>
+        <p:spPr>
+          <a:xfrm>
+            <a:off x="1691680" y="1296896"/>
+            <a:ext cx="1152128" cy="576064"/>
+          </a:xfrm>
+          <a:prstGeom prst="roundRect">
+            <a:avLst/>
+          </a:prstGeom>
+        </p:spPr>
+        <p:style>
+          <a:lnRef idx="2">
+            <a:schemeClr val="accent1">
+              <a:shade val="50000"/>
+            </a:schemeClr>
+          </a:lnRef>
+          <a:fillRef idx="1">
+            <a:schemeClr val="accent1"/>
+          </a:fillRef>
+          <a:effectRef idx="0">
+            <a:schemeClr val="accent1"/>
+          </a:effectRef>
+          <a:fontRef idx="minor">
+            <a:schemeClr val="lt1"/>
+          </a:fontRef>
+        </p:style>
+        <p:txBody>
+          <a:bodyPr rtlCol="0" anchor="ctr"/>
+          <a:lstStyle/>
+          <a:p>
+            <a:pPr algn="ctr"/>
+            <a:r>
+              <a:rPr lang="en-US" sz="3600" dirty="0" smtClean="0"/>
+              <a:t>1</a:t>
+            </a:r>
+            <a:endParaRPr lang="pt-BR" sz="3600" dirty="0"/>
+          </a:p>
+        </p:txBody>
+      </p:sp>
+      <p:sp>
+        <p:nvSpPr>
+          <p:cNvPr id="11" name="Retângulo de cantos arredondados 10"/>
+          <p:cNvSpPr/>
+          <p:nvPr/>
+        </p:nvSpPr>
+        <p:spPr>
+          <a:xfrm>
+            <a:off x="5796136" y="1296896"/>
+            <a:ext cx="1152128" cy="576064"/>
+          </a:xfrm>
+          <a:prstGeom prst="roundRect">
+            <a:avLst/>
+          </a:prstGeom>
+        </p:spPr>
+        <p:style>
+          <a:lnRef idx="2">
+            <a:schemeClr val="accent1">
+              <a:shade val="50000"/>
+            </a:schemeClr>
+          </a:lnRef>
+          <a:fillRef idx="1">
+            <a:schemeClr val="accent1"/>
+          </a:fillRef>
+          <a:effectRef idx="0">
+            <a:schemeClr val="accent1"/>
+          </a:effectRef>
+          <a:fontRef idx="minor">
+            <a:schemeClr val="lt1"/>
+          </a:fontRef>
+        </p:style>
+        <p:txBody>
+          <a:bodyPr rtlCol="0" anchor="ctr"/>
+          <a:lstStyle/>
+          <a:p>
+            <a:pPr algn="ctr"/>
+            <a:r>
+              <a:rPr lang="en-US" sz="3600" dirty="0" smtClean="0"/>
+              <a:t>2</a:t>
+            </a:r>
+            <a:endParaRPr lang="pt-BR" sz="3600" dirty="0"/>
+          </a:p>
+        </p:txBody>
+      </p:sp>
+      <p:pic>
+        <p:nvPicPr>
+          <p:cNvPr id="9" name="Imagem 8" descr="tela40.png"/>
+          <p:cNvPicPr>
+            <a:picLocks noChangeAspect="1"/>
+          </p:cNvPicPr>
+          <p:nvPr/>
+        </p:nvPicPr>
+        <p:blipFill>
+          <a:blip r:embed="rId3" cstate="print"/>
+          <a:stretch>
+            <a:fillRect/>
+          </a:stretch>
+        </p:blipFill>
+        <p:spPr>
+          <a:xfrm>
+            <a:off x="4860032" y="1916832"/>
+            <a:ext cx="2922480" cy="4870800"/>
+          </a:xfrm>
+          <a:prstGeom prst="rect">
+            <a:avLst/>
+          </a:prstGeom>
+          <a:ln>
+            <a:noFill/>
+          </a:ln>
+          <a:effectLst>
+            <a:outerShdw blurRad="292100" dist="139700" dir="2700000" algn="tl" rotWithShape="0">
+              <a:srgbClr val="333333">
+                <a:alpha val="65000"/>
+              </a:srgbClr>
+            </a:outerShdw>
+          </a:effectLst>
+        </p:spPr>
+      </p:pic>
+      <p:sp>
+        <p:nvSpPr>
+          <p:cNvPr id="18" name="Título 1"/>
+          <p:cNvSpPr txBox="1">
+            <a:spLocks/>
+          </p:cNvSpPr>
+          <p:nvPr/>
+        </p:nvSpPr>
+        <p:spPr>
+          <a:xfrm>
+            <a:off x="457200" y="116632"/>
+            <a:ext cx="8229600" cy="1143000"/>
+          </a:xfrm>
+          <a:prstGeom prst="rect">
+            <a:avLst/>
+          </a:prstGeom>
+        </p:spPr>
+        <p:txBody>
+          <a:bodyPr vert="horz" lIns="91440" tIns="45720" rIns="91440" bIns="45720" rtlCol="0" anchor="ctr">
+            <a:noAutofit/>
+          </a:bodyPr>
+          <a:lstStyle/>
+          <a:p>
+            <a:pPr marL="0" marR="0" lvl="0" indent="0" algn="ctr" defTabSz="914400" rtl="0" eaLnBrk="1" fontAlgn="auto" latinLnBrk="0" hangingPunct="1">
+              <a:lnSpc>
+                <a:spcPct val="100000"/>
+              </a:lnSpc>
+              <a:spcBef>
+                <a:spcPct val="0"/>
+              </a:spcBef>
+              <a:spcAft>
+                <a:spcPts val="0"/>
+              </a:spcAft>
+              <a:buClrTx/>
+              <a:buSzTx/>
+              <a:buFontTx/>
+              <a:buNone/>
+              <a:tabLst/>
+              <a:defRPr/>
+            </a:pPr>
+            <a:r>
+              <a:rPr kumimoji="0" lang="en-US" sz="4000" b="0" i="0" u="none" strike="noStrike" kern="1200" cap="none" spc="0" normalizeH="0" baseline="0" noProof="0" dirty="0" err="1" smtClean="0">
+                <a:ln>
+                  <a:noFill/>
+                </a:ln>
+                <a:solidFill>
+                  <a:schemeClr val="tx1"/>
+                </a:solidFill>
+                <a:effectLst/>
+                <a:uLnTx/>
+                <a:uFillTx/>
+                <a:latin typeface="+mj-lt"/>
+                <a:ea typeface="+mj-ea"/>
+                <a:cs typeface="+mj-cs"/>
+              </a:rPr>
+              <a:t>Calculara</a:t>
+            </a:r>
+            <a:r>
+              <a:rPr kumimoji="0" lang="en-US" sz="4000" b="0" i="0" u="none" strike="noStrike" kern="1200" cap="none" spc="0" normalizeH="0" baseline="0" noProof="0" dirty="0" smtClean="0">
+                <a:ln>
+                  <a:noFill/>
+                </a:ln>
+                <a:solidFill>
+                  <a:schemeClr val="tx1"/>
+                </a:solidFill>
+                <a:effectLst/>
+                <a:uLnTx/>
+                <a:uFillTx/>
+                <a:latin typeface="+mj-lt"/>
+                <a:ea typeface="+mj-ea"/>
+                <a:cs typeface="+mj-cs"/>
+              </a:rPr>
+              <a:t> de </a:t>
+            </a:r>
+            <a:r>
+              <a:rPr kumimoji="0" lang="en-US" sz="4000" b="0" i="0" u="none" strike="noStrike" kern="1200" cap="none" spc="0" normalizeH="0" baseline="0" noProof="0" dirty="0" err="1" smtClean="0">
+                <a:ln>
+                  <a:noFill/>
+                </a:ln>
+                <a:solidFill>
+                  <a:schemeClr val="tx1"/>
+                </a:solidFill>
+                <a:effectLst/>
+                <a:uLnTx/>
+                <a:uFillTx/>
+                <a:latin typeface="+mj-lt"/>
+                <a:ea typeface="+mj-ea"/>
+                <a:cs typeface="+mj-cs"/>
+              </a:rPr>
+              <a:t>Buteco</a:t>
+            </a:r>
+            <a:r>
+              <a:rPr kumimoji="0" lang="en-US" sz="4000" b="0" i="0" u="none" strike="noStrike" kern="1200" cap="none" spc="0" normalizeH="0" baseline="0" noProof="0" dirty="0" smtClean="0">
+                <a:ln>
+                  <a:noFill/>
+                </a:ln>
+                <a:solidFill>
+                  <a:schemeClr val="tx1"/>
+                </a:solidFill>
+                <a:effectLst/>
+                <a:uLnTx/>
+                <a:uFillTx/>
+                <a:latin typeface="+mj-lt"/>
+                <a:ea typeface="+mj-ea"/>
+                <a:cs typeface="+mj-cs"/>
+              </a:rPr>
+              <a:t> – SCREEN 3</a:t>
+            </a:r>
+          </a:p>
+        </p:txBody>
+      </p:sp>
+    </p:spTree>
+  </p:cSld>
+  <p:clrMapOvr>
+    <a:masterClrMapping/>
+  </p:clrMapOvr>
+  <p:timing>
+    <p:tnLst>
+      <p:par>
+        <p:cTn id="1" dur="indefinite" restart="never" nodeType="tmRoot"/>
+      </p:par>
+    </p:tnLst>
+  </p:timing>
+</p:sld>
+</file>
+
+<file path=ppt/slides/slide14.xml><?xml version="1.0" encoding="utf-8"?>
+<p:sld xmlns:a="http://schemas.openxmlformats.org/drawingml/2006/main" xmlns:r="http://schemas.openxmlformats.org/officeDocument/2006/relationships" xmlns:p="http://schemas.openxmlformats.org/presentationml/2006/main">
+  <p:cSld>
+    <p:spTree>
+      <p:nvGrpSpPr>
+        <p:cNvPr id="1" name=""/>
+        <p:cNvGrpSpPr/>
+        <p:nvPr/>
+      </p:nvGrpSpPr>
+      <p:grpSpPr>
+        <a:xfrm>
+          <a:off x="0" y="0"/>
+          <a:ext cx="0" cy="0"/>
+          <a:chOff x="0" y="0"/>
+          <a:chExt cx="0" cy="0"/>
+        </a:xfrm>
+      </p:grpSpPr>
+      <p:sp>
+        <p:nvSpPr>
+          <p:cNvPr id="10" name="Retângulo de cantos arredondados 9"/>
+          <p:cNvSpPr/>
+          <p:nvPr/>
+        </p:nvSpPr>
+        <p:spPr>
+          <a:xfrm>
+            <a:off x="1691680" y="1296896"/>
+            <a:ext cx="1152128" cy="576064"/>
+          </a:xfrm>
+          <a:prstGeom prst="roundRect">
+            <a:avLst/>
+          </a:prstGeom>
+        </p:spPr>
+        <p:style>
+          <a:lnRef idx="2">
+            <a:schemeClr val="accent1">
+              <a:shade val="50000"/>
+            </a:schemeClr>
+          </a:lnRef>
+          <a:fillRef idx="1">
+            <a:schemeClr val="accent1"/>
+          </a:fillRef>
+          <a:effectRef idx="0">
+            <a:schemeClr val="accent1"/>
+          </a:effectRef>
+          <a:fontRef idx="minor">
+            <a:schemeClr val="lt1"/>
+          </a:fontRef>
+        </p:style>
+        <p:txBody>
+          <a:bodyPr rtlCol="0" anchor="ctr"/>
+          <a:lstStyle/>
+          <a:p>
+            <a:pPr algn="ctr"/>
+            <a:r>
+              <a:rPr lang="en-US" sz="3600" dirty="0" smtClean="0"/>
+              <a:t>3</a:t>
+            </a:r>
+            <a:endParaRPr lang="pt-BR" sz="3600" dirty="0"/>
+          </a:p>
+        </p:txBody>
+      </p:sp>
+      <p:sp>
+        <p:nvSpPr>
+          <p:cNvPr id="11" name="Retângulo de cantos arredondados 10"/>
+          <p:cNvSpPr/>
+          <p:nvPr/>
+        </p:nvSpPr>
+        <p:spPr>
+          <a:xfrm>
+            <a:off x="5796136" y="1296896"/>
+            <a:ext cx="1152128" cy="576064"/>
+          </a:xfrm>
+          <a:prstGeom prst="roundRect">
+            <a:avLst/>
+          </a:prstGeom>
+        </p:spPr>
+        <p:style>
+          <a:lnRef idx="2">
+            <a:schemeClr val="accent1">
+              <a:shade val="50000"/>
+            </a:schemeClr>
+          </a:lnRef>
+          <a:fillRef idx="1">
+            <a:schemeClr val="accent1"/>
+          </a:fillRef>
+          <a:effectRef idx="0">
+            <a:schemeClr val="accent1"/>
+          </a:effectRef>
+          <a:fontRef idx="minor">
+            <a:schemeClr val="lt1"/>
+          </a:fontRef>
+        </p:style>
+        <p:txBody>
+          <a:bodyPr rtlCol="0" anchor="ctr"/>
+          <a:lstStyle/>
+          <a:p>
+            <a:pPr algn="ctr"/>
+            <a:r>
+              <a:rPr lang="en-US" sz="3600" dirty="0" smtClean="0"/>
+              <a:t>4</a:t>
+            </a:r>
+            <a:endParaRPr lang="pt-BR" sz="3600" dirty="0"/>
+          </a:p>
+        </p:txBody>
+      </p:sp>
+      <p:pic>
+        <p:nvPicPr>
+          <p:cNvPr id="15" name="Imagem 14" descr="tela41.png"/>
+          <p:cNvPicPr>
+            <a:picLocks noChangeAspect="1"/>
+          </p:cNvPicPr>
+          <p:nvPr/>
+        </p:nvPicPr>
+        <p:blipFill>
+          <a:blip r:embed="rId2" cstate="print"/>
+          <a:stretch>
+            <a:fillRect/>
+          </a:stretch>
+        </p:blipFill>
+        <p:spPr>
+          <a:xfrm>
+            <a:off x="785424" y="1928062"/>
+            <a:ext cx="2922480" cy="4870800"/>
+          </a:xfrm>
+          <a:prstGeom prst="rect">
+            <a:avLst/>
+          </a:prstGeom>
+          <a:ln>
+            <a:noFill/>
+          </a:ln>
+          <a:effectLst>
+            <a:outerShdw blurRad="292100" dist="139700" dir="2700000" algn="tl" rotWithShape="0">
+              <a:srgbClr val="333333">
+                <a:alpha val="65000"/>
+              </a:srgbClr>
+            </a:outerShdw>
+          </a:effectLst>
+        </p:spPr>
+      </p:pic>
+      <p:pic>
+        <p:nvPicPr>
+          <p:cNvPr id="16" name="Imagem 15" descr="tela42.png"/>
+          <p:cNvPicPr>
+            <a:picLocks noChangeAspect="1"/>
+          </p:cNvPicPr>
+          <p:nvPr/>
+        </p:nvPicPr>
+        <p:blipFill>
+          <a:blip r:embed="rId3" cstate="print"/>
+          <a:stretch>
+            <a:fillRect/>
+          </a:stretch>
+        </p:blipFill>
+        <p:spPr>
+          <a:xfrm>
+            <a:off x="4860032" y="1928508"/>
+            <a:ext cx="2922480" cy="4870800"/>
+          </a:xfrm>
+          <a:prstGeom prst="rect">
+            <a:avLst/>
+          </a:prstGeom>
+          <a:ln>
+            <a:noFill/>
+          </a:ln>
+          <a:effectLst>
+            <a:outerShdw blurRad="292100" dist="139700" dir="2700000" algn="tl" rotWithShape="0">
+              <a:srgbClr val="333333">
+                <a:alpha val="65000"/>
+              </a:srgbClr>
+            </a:outerShdw>
+          </a:effectLst>
+        </p:spPr>
+      </p:pic>
+      <p:sp>
+        <p:nvSpPr>
+          <p:cNvPr id="14" name="Título 1"/>
+          <p:cNvSpPr txBox="1">
+            <a:spLocks/>
+          </p:cNvSpPr>
+          <p:nvPr/>
+        </p:nvSpPr>
+        <p:spPr>
+          <a:xfrm>
+            <a:off x="457200" y="116632"/>
+            <a:ext cx="8229600" cy="1143000"/>
+          </a:xfrm>
+          <a:prstGeom prst="rect">
+            <a:avLst/>
+          </a:prstGeom>
+        </p:spPr>
+        <p:txBody>
+          <a:bodyPr vert="horz" lIns="91440" tIns="45720" rIns="91440" bIns="45720" rtlCol="0" anchor="ctr">
+            <a:noAutofit/>
+          </a:bodyPr>
+          <a:lstStyle/>
+          <a:p>
+            <a:pPr marL="0" marR="0" lvl="0" indent="0" algn="ctr" defTabSz="914400" rtl="0" eaLnBrk="1" fontAlgn="auto" latinLnBrk="0" hangingPunct="1">
+              <a:lnSpc>
+                <a:spcPct val="100000"/>
+              </a:lnSpc>
+              <a:spcBef>
+                <a:spcPct val="0"/>
+              </a:spcBef>
+              <a:spcAft>
+                <a:spcPts val="0"/>
+              </a:spcAft>
+              <a:buClrTx/>
+              <a:buSzTx/>
+              <a:buFontTx/>
+              <a:buNone/>
+              <a:tabLst/>
+              <a:defRPr/>
+            </a:pPr>
+            <a:r>
+              <a:rPr kumimoji="0" lang="en-US" sz="4000" b="0" i="0" u="none" strike="noStrike" kern="1200" cap="none" spc="0" normalizeH="0" baseline="0" noProof="0" dirty="0" err="1" smtClean="0">
+                <a:ln>
+                  <a:noFill/>
+                </a:ln>
+                <a:solidFill>
+                  <a:schemeClr val="tx1"/>
+                </a:solidFill>
+                <a:effectLst/>
+                <a:uLnTx/>
+                <a:uFillTx/>
+                <a:latin typeface="+mj-lt"/>
+                <a:ea typeface="+mj-ea"/>
+                <a:cs typeface="+mj-cs"/>
+              </a:rPr>
+              <a:t>Calculara</a:t>
+            </a:r>
+            <a:r>
+              <a:rPr kumimoji="0" lang="en-US" sz="4000" b="0" i="0" u="none" strike="noStrike" kern="1200" cap="none" spc="0" normalizeH="0" baseline="0" noProof="0" dirty="0" smtClean="0">
+                <a:ln>
+                  <a:noFill/>
+                </a:ln>
+                <a:solidFill>
+                  <a:schemeClr val="tx1"/>
+                </a:solidFill>
+                <a:effectLst/>
+                <a:uLnTx/>
+                <a:uFillTx/>
+                <a:latin typeface="+mj-lt"/>
+                <a:ea typeface="+mj-ea"/>
+                <a:cs typeface="+mj-cs"/>
+              </a:rPr>
+              <a:t> de </a:t>
+            </a:r>
+            <a:r>
+              <a:rPr kumimoji="0" lang="en-US" sz="4000" b="0" i="0" u="none" strike="noStrike" kern="1200" cap="none" spc="0" normalizeH="0" baseline="0" noProof="0" dirty="0" err="1" smtClean="0">
+                <a:ln>
+                  <a:noFill/>
+                </a:ln>
+                <a:solidFill>
+                  <a:schemeClr val="tx1"/>
+                </a:solidFill>
+                <a:effectLst/>
+                <a:uLnTx/>
+                <a:uFillTx/>
+                <a:latin typeface="+mj-lt"/>
+                <a:ea typeface="+mj-ea"/>
+                <a:cs typeface="+mj-cs"/>
+              </a:rPr>
+              <a:t>Buteco</a:t>
+            </a:r>
+            <a:r>
+              <a:rPr kumimoji="0" lang="en-US" sz="4000" b="0" i="0" u="none" strike="noStrike" kern="1200" cap="none" spc="0" normalizeH="0" baseline="0" noProof="0" dirty="0" smtClean="0">
+                <a:ln>
+                  <a:noFill/>
+                </a:ln>
+                <a:solidFill>
+                  <a:schemeClr val="tx1"/>
+                </a:solidFill>
+                <a:effectLst/>
+                <a:uLnTx/>
+                <a:uFillTx/>
+                <a:latin typeface="+mj-lt"/>
+                <a:ea typeface="+mj-ea"/>
+                <a:cs typeface="+mj-cs"/>
+              </a:rPr>
+              <a:t> – SCREEN 3</a:t>
+            </a:r>
+          </a:p>
+        </p:txBody>
+      </p:sp>
+    </p:spTree>
+  </p:cSld>
+  <p:clrMapOvr>
+    <a:masterClrMapping/>
+  </p:clrMapOvr>
+  <p:timing>
+    <p:tnLst>
+      <p:par>
+        <p:cTn id="1" dur="indefinite" restart="never" nodeType="tmRoot"/>
+      </p:par>
+    </p:tnLst>
+  </p:timing>
+</p:sld>
+</file>
+
+<file path=ppt/slides/slide15.xml><?xml version="1.0" encoding="utf-8"?>
+<p:sld xmlns:a="http://schemas.openxmlformats.org/drawingml/2006/main" xmlns:r="http://schemas.openxmlformats.org/officeDocument/2006/relationships" xmlns:p="http://schemas.openxmlformats.org/presentationml/2006/main">
+  <p:cSld>
+    <p:spTree>
+      <p:nvGrpSpPr>
+        <p:cNvPr id="1" name=""/>
+        <p:cNvGrpSpPr/>
+        <p:nvPr/>
+      </p:nvGrpSpPr>
+      <p:grpSpPr>
+        <a:xfrm>
+          <a:off x="0" y="0"/>
+          <a:ext cx="0" cy="0"/>
+          <a:chOff x="0" y="0"/>
+          <a:chExt cx="0" cy="0"/>
+        </a:xfrm>
+      </p:grpSpPr>
+      <p:pic>
+        <p:nvPicPr>
+          <p:cNvPr id="7" name="Imagem 6" descr="tela1.png"/>
+          <p:cNvPicPr>
+            <a:picLocks noChangeAspect="1"/>
+          </p:cNvPicPr>
+          <p:nvPr/>
+        </p:nvPicPr>
+        <p:blipFill>
+          <a:blip r:embed="rId2" cstate="print"/>
+          <a:stretch>
+            <a:fillRect/>
+          </a:stretch>
+        </p:blipFill>
+        <p:spPr>
+          <a:xfrm>
+            <a:off x="786408" y="1916832"/>
+            <a:ext cx="2921496" cy="4869160"/>
+          </a:xfrm>
+          <a:prstGeom prst="rect">
+            <a:avLst/>
+          </a:prstGeom>
+          <a:ln>
+            <a:noFill/>
+          </a:ln>
+          <a:effectLst>
+            <a:outerShdw blurRad="292100" dist="139700" dir="2700000" algn="tl" rotWithShape="0">
+              <a:srgbClr val="333333">
+                <a:alpha val="65000"/>
+              </a:srgbClr>
+            </a:outerShdw>
+          </a:effectLst>
+        </p:spPr>
+      </p:pic>
+      <p:sp>
+        <p:nvSpPr>
+          <p:cNvPr id="10" name="Retângulo de cantos arredondados 9"/>
+          <p:cNvSpPr/>
+          <p:nvPr/>
+        </p:nvSpPr>
+        <p:spPr>
+          <a:xfrm>
+            <a:off x="1691680" y="1296896"/>
+            <a:ext cx="1152128" cy="576064"/>
+          </a:xfrm>
+          <a:prstGeom prst="roundRect">
+            <a:avLst/>
+          </a:prstGeom>
+        </p:spPr>
+        <p:style>
+          <a:lnRef idx="2">
+            <a:schemeClr val="accent1">
+              <a:shade val="50000"/>
+            </a:schemeClr>
+          </a:lnRef>
+          <a:fillRef idx="1">
+            <a:schemeClr val="accent1"/>
+          </a:fillRef>
+          <a:effectRef idx="0">
+            <a:schemeClr val="accent1"/>
+          </a:effectRef>
+          <a:fontRef idx="minor">
+            <a:schemeClr val="lt1"/>
+          </a:fontRef>
+        </p:style>
+        <p:txBody>
+          <a:bodyPr rtlCol="0" anchor="ctr"/>
+          <a:lstStyle/>
+          <a:p>
+            <a:pPr algn="ctr"/>
+            <a:r>
+              <a:rPr lang="en-US" sz="3600" dirty="0" smtClean="0"/>
+              <a:t>1</a:t>
+            </a:r>
+            <a:endParaRPr lang="pt-BR" sz="3600" dirty="0"/>
+          </a:p>
+        </p:txBody>
+      </p:sp>
+      <p:sp>
+        <p:nvSpPr>
+          <p:cNvPr id="11" name="Retângulo de cantos arredondados 10"/>
+          <p:cNvSpPr/>
+          <p:nvPr/>
+        </p:nvSpPr>
+        <p:spPr>
+          <a:xfrm>
+            <a:off x="5796136" y="1296896"/>
+            <a:ext cx="1152128" cy="576064"/>
+          </a:xfrm>
+          <a:prstGeom prst="roundRect">
+            <a:avLst/>
+          </a:prstGeom>
+        </p:spPr>
+        <p:style>
+          <a:lnRef idx="2">
+            <a:schemeClr val="accent1">
+              <a:shade val="50000"/>
+            </a:schemeClr>
+          </a:lnRef>
+          <a:fillRef idx="1">
+            <a:schemeClr val="accent1"/>
+          </a:fillRef>
+          <a:effectRef idx="0">
+            <a:schemeClr val="accent1"/>
+          </a:effectRef>
+          <a:fontRef idx="minor">
+            <a:schemeClr val="lt1"/>
+          </a:fontRef>
+        </p:style>
+        <p:txBody>
+          <a:bodyPr rtlCol="0" anchor="ctr"/>
+          <a:lstStyle/>
+          <a:p>
+            <a:pPr algn="ctr"/>
+            <a:r>
+              <a:rPr lang="en-US" sz="3600" dirty="0" smtClean="0"/>
+              <a:t>2</a:t>
+            </a:r>
+            <a:endParaRPr lang="pt-BR" sz="3600" dirty="0"/>
+          </a:p>
+        </p:txBody>
+      </p:sp>
+      <p:sp>
+        <p:nvSpPr>
+          <p:cNvPr id="18" name="Título 1"/>
+          <p:cNvSpPr txBox="1">
+            <a:spLocks/>
+          </p:cNvSpPr>
+          <p:nvPr/>
+        </p:nvSpPr>
+        <p:spPr>
+          <a:xfrm>
+            <a:off x="457200" y="116632"/>
+            <a:ext cx="8229600" cy="1143000"/>
+          </a:xfrm>
+          <a:prstGeom prst="rect">
+            <a:avLst/>
+          </a:prstGeom>
+        </p:spPr>
+        <p:txBody>
+          <a:bodyPr vert="horz" lIns="91440" tIns="45720" rIns="91440" bIns="45720" rtlCol="0" anchor="ctr">
+            <a:noAutofit/>
+          </a:bodyPr>
+          <a:lstStyle/>
+          <a:p>
+            <a:pPr marL="0" marR="0" lvl="0" indent="0" algn="ctr" defTabSz="914400" rtl="0" eaLnBrk="1" fontAlgn="auto" latinLnBrk="0" hangingPunct="1">
+              <a:lnSpc>
+                <a:spcPct val="100000"/>
+              </a:lnSpc>
+              <a:spcBef>
+                <a:spcPct val="0"/>
+              </a:spcBef>
+              <a:spcAft>
+                <a:spcPts val="0"/>
+              </a:spcAft>
+              <a:buClrTx/>
+              <a:buSzTx/>
+              <a:buFontTx/>
+              <a:buNone/>
+              <a:tabLst/>
+              <a:defRPr/>
+            </a:pPr>
+            <a:r>
+              <a:rPr kumimoji="0" lang="en-US" sz="4000" b="0" i="0" u="none" strike="noStrike" kern="1200" cap="none" spc="0" normalizeH="0" baseline="0" noProof="0" dirty="0" err="1" smtClean="0">
+                <a:ln>
+                  <a:noFill/>
+                </a:ln>
+                <a:solidFill>
+                  <a:schemeClr val="tx1"/>
+                </a:solidFill>
+                <a:effectLst/>
+                <a:uLnTx/>
+                <a:uFillTx/>
+                <a:latin typeface="+mj-lt"/>
+                <a:ea typeface="+mj-ea"/>
+                <a:cs typeface="+mj-cs"/>
+              </a:rPr>
+              <a:t>Calculara</a:t>
+            </a:r>
+            <a:r>
+              <a:rPr kumimoji="0" lang="en-US" sz="4000" b="0" i="0" u="none" strike="noStrike" kern="1200" cap="none" spc="0" normalizeH="0" baseline="0" noProof="0" dirty="0" smtClean="0">
+                <a:ln>
+                  <a:noFill/>
+                </a:ln>
+                <a:solidFill>
+                  <a:schemeClr val="tx1"/>
+                </a:solidFill>
+                <a:effectLst/>
+                <a:uLnTx/>
+                <a:uFillTx/>
+                <a:latin typeface="+mj-lt"/>
+                <a:ea typeface="+mj-ea"/>
+                <a:cs typeface="+mj-cs"/>
+              </a:rPr>
+              <a:t> de </a:t>
+            </a:r>
+            <a:r>
+              <a:rPr kumimoji="0" lang="en-US" sz="4000" b="0" i="0" u="none" strike="noStrike" kern="1200" cap="none" spc="0" normalizeH="0" baseline="0" noProof="0" dirty="0" err="1" smtClean="0">
+                <a:ln>
+                  <a:noFill/>
+                </a:ln>
+                <a:solidFill>
+                  <a:schemeClr val="tx1"/>
+                </a:solidFill>
+                <a:effectLst/>
+                <a:uLnTx/>
+                <a:uFillTx/>
+                <a:latin typeface="+mj-lt"/>
+                <a:ea typeface="+mj-ea"/>
+                <a:cs typeface="+mj-cs"/>
+              </a:rPr>
+              <a:t>Buteco</a:t>
+            </a:r>
+            <a:r>
+              <a:rPr kumimoji="0" lang="en-US" sz="4000" b="0" i="0" u="none" strike="noStrike" kern="1200" cap="none" spc="0" normalizeH="0" baseline="0" noProof="0" dirty="0" smtClean="0">
+                <a:ln>
+                  <a:noFill/>
+                </a:ln>
+                <a:solidFill>
+                  <a:schemeClr val="tx1"/>
+                </a:solidFill>
+                <a:effectLst/>
+                <a:uLnTx/>
+                <a:uFillTx/>
+                <a:latin typeface="+mj-lt"/>
+                <a:ea typeface="+mj-ea"/>
+                <a:cs typeface="+mj-cs"/>
+              </a:rPr>
+              <a:t> – SCREEN 4</a:t>
+            </a:r>
+          </a:p>
+        </p:txBody>
+      </p:sp>
+      <p:pic>
+        <p:nvPicPr>
+          <p:cNvPr id="8" name="Imagem 7" descr="tela50.png"/>
+          <p:cNvPicPr>
+            <a:picLocks noChangeAspect="1"/>
+          </p:cNvPicPr>
+          <p:nvPr/>
+        </p:nvPicPr>
+        <p:blipFill>
+          <a:blip r:embed="rId3" cstate="print"/>
+          <a:stretch>
+            <a:fillRect/>
+          </a:stretch>
+        </p:blipFill>
+        <p:spPr>
+          <a:xfrm>
+            <a:off x="4932040" y="1916860"/>
+            <a:ext cx="2922480" cy="4870800"/>
+          </a:xfrm>
+          <a:prstGeom prst="rect">
+            <a:avLst/>
+          </a:prstGeom>
+          <a:ln>
+            <a:noFill/>
+          </a:ln>
+          <a:effectLst>
+            <a:outerShdw blurRad="292100" dist="139700" dir="2700000" algn="tl" rotWithShape="0">
+              <a:srgbClr val="333333">
+                <a:alpha val="65000"/>
+              </a:srgbClr>
+            </a:outerShdw>
+          </a:effectLst>
+        </p:spPr>
+      </p:pic>
     </p:spTree>
   </p:cSld>
   <p:clrMapOvr>
@@ -7157,6 +9430,37 @@
             <a:r>
               <a:rPr lang="en-US" dirty="0" smtClean="0"/>
               <a:t>)</a:t>
+            </a:r>
+          </a:p>
+          <a:p>
+            <a:pPr lvl="1"/>
+            <a:r>
+              <a:rPr lang="en-US" dirty="0" smtClean="0"/>
+              <a:t>Na </a:t>
+            </a:r>
+            <a:r>
+              <a:rPr lang="en-US" dirty="0" err="1" smtClean="0"/>
+              <a:t>Hora</a:t>
+            </a:r>
+            <a:r>
+              <a:rPr lang="en-US" dirty="0" smtClean="0"/>
+              <a:t> </a:t>
+            </a:r>
+            <a:r>
+              <a:rPr lang="en-US" dirty="0" err="1" smtClean="0"/>
+              <a:t>da</a:t>
+            </a:r>
+            <a:r>
+              <a:rPr lang="en-US" dirty="0" smtClean="0"/>
+              <a:t> </a:t>
+            </a:r>
+            <a:r>
+              <a:rPr lang="en-US" dirty="0" err="1" smtClean="0"/>
+              <a:t>Conta</a:t>
+            </a:r>
+            <a:r>
+              <a:rPr lang="en-US" dirty="0" smtClean="0"/>
+              <a:t> - NHC</a:t>
             </a:r>
             <a:endParaRPr lang="pt-BR" dirty="0"/>
           </a:p>

</xml_diff>